<commit_message>
integrated started and ended trip
</commit_message>
<xml_diff>
--- a/FMS Presentation.pptx
+++ b/FMS Presentation.pptx
@@ -4895,7 +4895,7 @@
                 <a:spcPct val="100000"/>
               </a:lnSpc>
             </a:pPr>
-            <a:fld id="{978E8581-AEE2-4C3D-8E61-963921C66038}" type="datetime">
+            <a:fld id="{7E2233C1-DD63-4A0B-A263-29DA1C5160FA}" type="datetime">
               <a:rPr b="0" lang="en-ZA" sz="900" spc="-1" strike="noStrike">
                 <a:solidFill>
                   <a:srgbClr val="8b8b8b"/>
@@ -5052,7 +5052,7 @@
                 <a:spcPct val="100000"/>
               </a:lnSpc>
             </a:pPr>
-            <a:fld id="{3127753F-B3CF-453D-B9BE-53847AB0392A}" type="slidenum">
+            <a:fld id="{66326E6F-914C-46BB-9080-28E7DAF7ACBD}" type="slidenum">
               <a:rPr b="0" lang="en-ZA" sz="2000" spc="-1" strike="noStrike">
                 <a:solidFill>
                   <a:srgbClr val="feffff"/>
@@ -7511,7 +7511,7 @@
                 <a:spcPct val="100000"/>
               </a:lnSpc>
             </a:pPr>
-            <a:fld id="{E20B3AB7-9FE1-4BF9-8E23-F7E1C3BE76FA}" type="datetime">
+            <a:fld id="{3AD66B45-6786-45D4-A437-FC02413AA745}" type="datetime">
               <a:rPr b="0" lang="en-ZA" sz="900" spc="-1" strike="noStrike">
                 <a:solidFill>
                   <a:srgbClr val="8b8b8b"/>
@@ -7668,7 +7668,7 @@
                 <a:spcPct val="100000"/>
               </a:lnSpc>
             </a:pPr>
-            <a:fld id="{D3833373-14E3-43E0-B51E-CB135F4F3903}" type="slidenum">
+            <a:fld id="{D40CC35C-9FA0-4DD0-A6B3-939B047AAD2F}" type="slidenum">
               <a:rPr b="0" lang="en-ZA" sz="2000" spc="-1" strike="noStrike">
                 <a:solidFill>
                   <a:srgbClr val="feffff"/>

</xml_diff>

<commit_message>
made delivery.tostring() use json
</commit_message>
<xml_diff>
--- a/FMS Presentation.pptx
+++ b/FMS Presentation.pptx
@@ -56,7 +56,7 @@
       </p:grpSpPr>
       <p:sp>
         <p:nvSpPr>
-          <p:cNvPr id="54" name="PlaceHolder 1"/>
+          <p:cNvPr id="51" name="PlaceHolder 1"/>
           <p:cNvSpPr>
             <a:spLocks noGrp="1"/>
           </p:cNvSpPr>
@@ -66,8 +66,8 @@
         </p:nvSpPr>
         <p:spPr>
           <a:xfrm>
-            <a:off x="2593080" y="624240"/>
-            <a:ext cx="8911440" cy="1280520"/>
+            <a:off x="609480" y="273600"/>
+            <a:ext cx="10972440" cy="1144800"/>
           </a:xfrm>
           <a:prstGeom prst="rect">
             <a:avLst/>
@@ -76,18 +76,16 @@
         <p:txBody>
           <a:bodyPr lIns="0" rIns="0" tIns="0" bIns="0" anchor="ctr"/>
           <a:p>
-            <a:endParaRPr b="0" lang="en-US" sz="1800" spc="-1" strike="noStrike">
-              <a:solidFill>
-                <a:srgbClr val="000000"/>
-              </a:solidFill>
-              <a:latin typeface="Century Gothic"/>
+            <a:pPr algn="ctr"/>
+            <a:endParaRPr b="0" lang="en-ZA" sz="4400" spc="-1" strike="noStrike">
+              <a:latin typeface="Arial"/>
             </a:endParaRPr>
           </a:p>
         </p:txBody>
       </p:sp>
       <p:sp>
         <p:nvSpPr>
-          <p:cNvPr id="55" name="PlaceHolder 2"/>
+          <p:cNvPr id="52" name="PlaceHolder 2"/>
           <p:cNvSpPr>
             <a:spLocks noGrp="1"/>
           </p:cNvSpPr>
@@ -97,8 +95,8 @@
         </p:nvSpPr>
         <p:spPr>
           <a:xfrm>
-            <a:off x="2589120" y="2133720"/>
-            <a:ext cx="8915040" cy="1801440"/>
+            <a:off x="609480" y="1604520"/>
+            <a:ext cx="10972440" cy="1896840"/>
           </a:xfrm>
           <a:prstGeom prst="rect">
             <a:avLst/>
@@ -109,18 +107,15 @@
             <a:normAutofit/>
           </a:bodyPr>
           <a:p>
-            <a:endParaRPr b="0" lang="en-US" sz="1800" spc="-1" strike="noStrike">
-              <a:solidFill>
-                <a:srgbClr val="404040"/>
-              </a:solidFill>
-              <a:latin typeface="Century Gothic"/>
+            <a:endParaRPr b="0" lang="en-ZA" sz="3200" spc="-1" strike="noStrike">
+              <a:latin typeface="Arial"/>
             </a:endParaRPr>
           </a:p>
         </p:txBody>
       </p:sp>
       <p:sp>
         <p:nvSpPr>
-          <p:cNvPr id="56" name="PlaceHolder 3"/>
+          <p:cNvPr id="53" name="PlaceHolder 3"/>
           <p:cNvSpPr>
             <a:spLocks noGrp="1"/>
           </p:cNvSpPr>
@@ -130,8 +125,8 @@
         </p:nvSpPr>
         <p:spPr>
           <a:xfrm>
-            <a:off x="2589120" y="4106520"/>
-            <a:ext cx="8915040" cy="1801440"/>
+            <a:off x="609480" y="3682080"/>
+            <a:ext cx="10972440" cy="1896840"/>
           </a:xfrm>
           <a:prstGeom prst="rect">
             <a:avLst/>
@@ -142,11 +137,8 @@
             <a:normAutofit/>
           </a:bodyPr>
           <a:p>
-            <a:endParaRPr b="0" lang="en-US" sz="1800" spc="-1" strike="noStrike">
-              <a:solidFill>
-                <a:srgbClr val="404040"/>
-              </a:solidFill>
-              <a:latin typeface="Century Gothic"/>
+            <a:endParaRPr b="0" lang="en-ZA" sz="3200" spc="-1" strike="noStrike">
+              <a:latin typeface="Arial"/>
             </a:endParaRPr>
           </a:p>
         </p:txBody>
@@ -175,7 +167,7 @@
       </p:grpSpPr>
       <p:sp>
         <p:nvSpPr>
-          <p:cNvPr id="57" name="PlaceHolder 1"/>
+          <p:cNvPr id="54" name="PlaceHolder 1"/>
           <p:cNvSpPr>
             <a:spLocks noGrp="1"/>
           </p:cNvSpPr>
@@ -185,8 +177,8 @@
         </p:nvSpPr>
         <p:spPr>
           <a:xfrm>
-            <a:off x="2593080" y="624240"/>
-            <a:ext cx="8911440" cy="1280520"/>
+            <a:off x="609480" y="273600"/>
+            <a:ext cx="10972440" cy="1144800"/>
           </a:xfrm>
           <a:prstGeom prst="rect">
             <a:avLst/>
@@ -195,18 +187,16 @@
         <p:txBody>
           <a:bodyPr lIns="0" rIns="0" tIns="0" bIns="0" anchor="ctr"/>
           <a:p>
-            <a:endParaRPr b="0" lang="en-US" sz="1800" spc="-1" strike="noStrike">
-              <a:solidFill>
-                <a:srgbClr val="000000"/>
-              </a:solidFill>
-              <a:latin typeface="Century Gothic"/>
+            <a:pPr algn="ctr"/>
+            <a:endParaRPr b="0" lang="en-ZA" sz="4400" spc="-1" strike="noStrike">
+              <a:latin typeface="Arial"/>
             </a:endParaRPr>
           </a:p>
         </p:txBody>
       </p:sp>
       <p:sp>
         <p:nvSpPr>
-          <p:cNvPr id="58" name="PlaceHolder 2"/>
+          <p:cNvPr id="55" name="PlaceHolder 2"/>
           <p:cNvSpPr>
             <a:spLocks noGrp="1"/>
           </p:cNvSpPr>
@@ -216,8 +206,8 @@
         </p:nvSpPr>
         <p:spPr>
           <a:xfrm>
-            <a:off x="2589120" y="2133720"/>
-            <a:ext cx="4350240" cy="1801440"/>
+            <a:off x="609480" y="1604520"/>
+            <a:ext cx="5354280" cy="1896840"/>
           </a:xfrm>
           <a:prstGeom prst="rect">
             <a:avLst/>
@@ -228,18 +218,15 @@
             <a:normAutofit/>
           </a:bodyPr>
           <a:p>
-            <a:endParaRPr b="0" lang="en-US" sz="1800" spc="-1" strike="noStrike">
-              <a:solidFill>
-                <a:srgbClr val="404040"/>
-              </a:solidFill>
-              <a:latin typeface="Century Gothic"/>
+            <a:endParaRPr b="0" lang="en-ZA" sz="3200" spc="-1" strike="noStrike">
+              <a:latin typeface="Arial"/>
             </a:endParaRPr>
           </a:p>
         </p:txBody>
       </p:sp>
       <p:sp>
         <p:nvSpPr>
-          <p:cNvPr id="59" name="PlaceHolder 3"/>
+          <p:cNvPr id="56" name="PlaceHolder 3"/>
           <p:cNvSpPr>
             <a:spLocks noGrp="1"/>
           </p:cNvSpPr>
@@ -249,8 +236,8 @@
         </p:nvSpPr>
         <p:spPr>
           <a:xfrm>
-            <a:off x="7157160" y="2133720"/>
-            <a:ext cx="4350240" cy="1801440"/>
+            <a:off x="6231960" y="1604520"/>
+            <a:ext cx="5354280" cy="1896840"/>
           </a:xfrm>
           <a:prstGeom prst="rect">
             <a:avLst/>
@@ -261,18 +248,15 @@
             <a:normAutofit/>
           </a:bodyPr>
           <a:p>
-            <a:endParaRPr b="0" lang="en-US" sz="1800" spc="-1" strike="noStrike">
-              <a:solidFill>
-                <a:srgbClr val="404040"/>
-              </a:solidFill>
-              <a:latin typeface="Century Gothic"/>
+            <a:endParaRPr b="0" lang="en-ZA" sz="3200" spc="-1" strike="noStrike">
+              <a:latin typeface="Arial"/>
             </a:endParaRPr>
           </a:p>
         </p:txBody>
       </p:sp>
       <p:sp>
         <p:nvSpPr>
-          <p:cNvPr id="60" name="PlaceHolder 4"/>
+          <p:cNvPr id="57" name="PlaceHolder 4"/>
           <p:cNvSpPr>
             <a:spLocks noGrp="1"/>
           </p:cNvSpPr>
@@ -282,8 +266,8 @@
         </p:nvSpPr>
         <p:spPr>
           <a:xfrm>
-            <a:off x="2589120" y="4106520"/>
-            <a:ext cx="4350240" cy="1801440"/>
+            <a:off x="609480" y="3682080"/>
+            <a:ext cx="5354280" cy="1896840"/>
           </a:xfrm>
           <a:prstGeom prst="rect">
             <a:avLst/>
@@ -294,18 +278,15 @@
             <a:normAutofit/>
           </a:bodyPr>
           <a:p>
-            <a:endParaRPr b="0" lang="en-US" sz="1800" spc="-1" strike="noStrike">
-              <a:solidFill>
-                <a:srgbClr val="404040"/>
-              </a:solidFill>
-              <a:latin typeface="Century Gothic"/>
+            <a:endParaRPr b="0" lang="en-ZA" sz="3200" spc="-1" strike="noStrike">
+              <a:latin typeface="Arial"/>
             </a:endParaRPr>
           </a:p>
         </p:txBody>
       </p:sp>
       <p:sp>
         <p:nvSpPr>
-          <p:cNvPr id="61" name="PlaceHolder 5"/>
+          <p:cNvPr id="58" name="PlaceHolder 5"/>
           <p:cNvSpPr>
             <a:spLocks noGrp="1"/>
           </p:cNvSpPr>
@@ -315,8 +296,8 @@
         </p:nvSpPr>
         <p:spPr>
           <a:xfrm>
-            <a:off x="7157160" y="4106520"/>
-            <a:ext cx="4350240" cy="1801440"/>
+            <a:off x="6231960" y="3682080"/>
+            <a:ext cx="5354280" cy="1896840"/>
           </a:xfrm>
           <a:prstGeom prst="rect">
             <a:avLst/>
@@ -327,11 +308,8 @@
             <a:normAutofit/>
           </a:bodyPr>
           <a:p>
-            <a:endParaRPr b="0" lang="en-US" sz="1800" spc="-1" strike="noStrike">
-              <a:solidFill>
-                <a:srgbClr val="404040"/>
-              </a:solidFill>
-              <a:latin typeface="Century Gothic"/>
+            <a:endParaRPr b="0" lang="en-ZA" sz="3200" spc="-1" strike="noStrike">
+              <a:latin typeface="Arial"/>
             </a:endParaRPr>
           </a:p>
         </p:txBody>
@@ -360,7 +338,7 @@
       </p:grpSpPr>
       <p:sp>
         <p:nvSpPr>
-          <p:cNvPr id="62" name="PlaceHolder 1"/>
+          <p:cNvPr id="59" name="PlaceHolder 1"/>
           <p:cNvSpPr>
             <a:spLocks noGrp="1"/>
           </p:cNvSpPr>
@@ -370,8 +348,8 @@
         </p:nvSpPr>
         <p:spPr>
           <a:xfrm>
-            <a:off x="2593080" y="624240"/>
-            <a:ext cx="8911440" cy="1280520"/>
+            <a:off x="609480" y="273600"/>
+            <a:ext cx="10972440" cy="1144800"/>
           </a:xfrm>
           <a:prstGeom prst="rect">
             <a:avLst/>
@@ -380,18 +358,16 @@
         <p:txBody>
           <a:bodyPr lIns="0" rIns="0" tIns="0" bIns="0" anchor="ctr"/>
           <a:p>
-            <a:endParaRPr b="0" lang="en-US" sz="1800" spc="-1" strike="noStrike">
-              <a:solidFill>
-                <a:srgbClr val="000000"/>
-              </a:solidFill>
-              <a:latin typeface="Century Gothic"/>
+            <a:pPr algn="ctr"/>
+            <a:endParaRPr b="0" lang="en-ZA" sz="4400" spc="-1" strike="noStrike">
+              <a:latin typeface="Arial"/>
             </a:endParaRPr>
           </a:p>
         </p:txBody>
       </p:sp>
       <p:sp>
         <p:nvSpPr>
-          <p:cNvPr id="63" name="PlaceHolder 2"/>
+          <p:cNvPr id="60" name="PlaceHolder 2"/>
           <p:cNvSpPr>
             <a:spLocks noGrp="1"/>
           </p:cNvSpPr>
@@ -401,8 +377,8 @@
         </p:nvSpPr>
         <p:spPr>
           <a:xfrm>
-            <a:off x="2589120" y="2133720"/>
-            <a:ext cx="2870280" cy="1801440"/>
+            <a:off x="609480" y="1604520"/>
+            <a:ext cx="3533040" cy="1896840"/>
           </a:xfrm>
           <a:prstGeom prst="rect">
             <a:avLst/>
@@ -413,18 +389,15 @@
             <a:normAutofit/>
           </a:bodyPr>
           <a:p>
-            <a:endParaRPr b="0" lang="en-US" sz="1800" spc="-1" strike="noStrike">
-              <a:solidFill>
-                <a:srgbClr val="404040"/>
-              </a:solidFill>
-              <a:latin typeface="Century Gothic"/>
+            <a:endParaRPr b="0" lang="en-ZA" sz="3200" spc="-1" strike="noStrike">
+              <a:latin typeface="Arial"/>
             </a:endParaRPr>
           </a:p>
         </p:txBody>
       </p:sp>
       <p:sp>
         <p:nvSpPr>
-          <p:cNvPr id="64" name="PlaceHolder 3"/>
+          <p:cNvPr id="61" name="PlaceHolder 3"/>
           <p:cNvSpPr>
             <a:spLocks noGrp="1"/>
           </p:cNvSpPr>
@@ -434,8 +407,8 @@
         </p:nvSpPr>
         <p:spPr>
           <a:xfrm>
-            <a:off x="5603400" y="2133720"/>
-            <a:ext cx="2870280" cy="1801440"/>
+            <a:off x="4319640" y="1604520"/>
+            <a:ext cx="3533040" cy="1896840"/>
           </a:xfrm>
           <a:prstGeom prst="rect">
             <a:avLst/>
@@ -446,18 +419,15 @@
             <a:normAutofit/>
           </a:bodyPr>
           <a:p>
-            <a:endParaRPr b="0" lang="en-US" sz="1800" spc="-1" strike="noStrike">
-              <a:solidFill>
-                <a:srgbClr val="404040"/>
-              </a:solidFill>
-              <a:latin typeface="Century Gothic"/>
+            <a:endParaRPr b="0" lang="en-ZA" sz="3200" spc="-1" strike="noStrike">
+              <a:latin typeface="Arial"/>
             </a:endParaRPr>
           </a:p>
         </p:txBody>
       </p:sp>
       <p:sp>
         <p:nvSpPr>
-          <p:cNvPr id="65" name="PlaceHolder 4"/>
+          <p:cNvPr id="62" name="PlaceHolder 4"/>
           <p:cNvSpPr>
             <a:spLocks noGrp="1"/>
           </p:cNvSpPr>
@@ -467,8 +437,8 @@
         </p:nvSpPr>
         <p:spPr>
           <a:xfrm>
-            <a:off x="8617320" y="2133720"/>
-            <a:ext cx="2870280" cy="1801440"/>
+            <a:off x="8029800" y="1604520"/>
+            <a:ext cx="3533040" cy="1896840"/>
           </a:xfrm>
           <a:prstGeom prst="rect">
             <a:avLst/>
@@ -479,18 +449,15 @@
             <a:normAutofit/>
           </a:bodyPr>
           <a:p>
-            <a:endParaRPr b="0" lang="en-US" sz="1800" spc="-1" strike="noStrike">
-              <a:solidFill>
-                <a:srgbClr val="404040"/>
-              </a:solidFill>
-              <a:latin typeface="Century Gothic"/>
+            <a:endParaRPr b="0" lang="en-ZA" sz="3200" spc="-1" strike="noStrike">
+              <a:latin typeface="Arial"/>
             </a:endParaRPr>
           </a:p>
         </p:txBody>
       </p:sp>
       <p:sp>
         <p:nvSpPr>
-          <p:cNvPr id="66" name="PlaceHolder 5"/>
+          <p:cNvPr id="63" name="PlaceHolder 5"/>
           <p:cNvSpPr>
             <a:spLocks noGrp="1"/>
           </p:cNvSpPr>
@@ -500,8 +467,8 @@
         </p:nvSpPr>
         <p:spPr>
           <a:xfrm>
-            <a:off x="2589120" y="4106520"/>
-            <a:ext cx="2870280" cy="1801440"/>
+            <a:off x="609480" y="3682080"/>
+            <a:ext cx="3533040" cy="1896840"/>
           </a:xfrm>
           <a:prstGeom prst="rect">
             <a:avLst/>
@@ -512,18 +479,15 @@
             <a:normAutofit/>
           </a:bodyPr>
           <a:p>
-            <a:endParaRPr b="0" lang="en-US" sz="1800" spc="-1" strike="noStrike">
-              <a:solidFill>
-                <a:srgbClr val="404040"/>
-              </a:solidFill>
-              <a:latin typeface="Century Gothic"/>
+            <a:endParaRPr b="0" lang="en-ZA" sz="3200" spc="-1" strike="noStrike">
+              <a:latin typeface="Arial"/>
             </a:endParaRPr>
           </a:p>
         </p:txBody>
       </p:sp>
       <p:sp>
         <p:nvSpPr>
-          <p:cNvPr id="67" name="PlaceHolder 6"/>
+          <p:cNvPr id="64" name="PlaceHolder 6"/>
           <p:cNvSpPr>
             <a:spLocks noGrp="1"/>
           </p:cNvSpPr>
@@ -533,8 +497,8 @@
         </p:nvSpPr>
         <p:spPr>
           <a:xfrm>
-            <a:off x="5603400" y="4106520"/>
-            <a:ext cx="2870280" cy="1801440"/>
+            <a:off x="4319640" y="3682080"/>
+            <a:ext cx="3533040" cy="1896840"/>
           </a:xfrm>
           <a:prstGeom prst="rect">
             <a:avLst/>
@@ -545,18 +509,15 @@
             <a:normAutofit/>
           </a:bodyPr>
           <a:p>
-            <a:endParaRPr b="0" lang="en-US" sz="1800" spc="-1" strike="noStrike">
-              <a:solidFill>
-                <a:srgbClr val="404040"/>
-              </a:solidFill>
-              <a:latin typeface="Century Gothic"/>
+            <a:endParaRPr b="0" lang="en-ZA" sz="3200" spc="-1" strike="noStrike">
+              <a:latin typeface="Arial"/>
             </a:endParaRPr>
           </a:p>
         </p:txBody>
       </p:sp>
       <p:sp>
         <p:nvSpPr>
-          <p:cNvPr id="68" name="PlaceHolder 7"/>
+          <p:cNvPr id="65" name="PlaceHolder 7"/>
           <p:cNvSpPr>
             <a:spLocks noGrp="1"/>
           </p:cNvSpPr>
@@ -566,8 +527,8 @@
         </p:nvSpPr>
         <p:spPr>
           <a:xfrm>
-            <a:off x="8617320" y="4106520"/>
-            <a:ext cx="2870280" cy="1801440"/>
+            <a:off x="8029800" y="3682080"/>
+            <a:ext cx="3533040" cy="1896840"/>
           </a:xfrm>
           <a:prstGeom prst="rect">
             <a:avLst/>
@@ -578,11 +539,8 @@
             <a:normAutofit/>
           </a:bodyPr>
           <a:p>
-            <a:endParaRPr b="0" lang="en-US" sz="1800" spc="-1" strike="noStrike">
-              <a:solidFill>
-                <a:srgbClr val="404040"/>
-              </a:solidFill>
-              <a:latin typeface="Century Gothic"/>
+            <a:endParaRPr b="0" lang="en-ZA" sz="3200" spc="-1" strike="noStrike">
+              <a:latin typeface="Arial"/>
             </a:endParaRPr>
           </a:p>
         </p:txBody>
@@ -633,7 +591,7 @@
       </p:grpSpPr>
       <p:sp>
         <p:nvSpPr>
-          <p:cNvPr id="102" name="PlaceHolder 1"/>
+          <p:cNvPr id="96" name="PlaceHolder 1"/>
           <p:cNvSpPr>
             <a:spLocks noGrp="1"/>
           </p:cNvSpPr>
@@ -643,8 +601,8 @@
         </p:nvSpPr>
         <p:spPr>
           <a:xfrm>
-            <a:off x="2593080" y="624240"/>
-            <a:ext cx="8911440" cy="1280520"/>
+            <a:off x="609480" y="273600"/>
+            <a:ext cx="10972440" cy="1144800"/>
           </a:xfrm>
           <a:prstGeom prst="rect">
             <a:avLst/>
@@ -653,18 +611,16 @@
         <p:txBody>
           <a:bodyPr lIns="0" rIns="0" tIns="0" bIns="0" anchor="ctr"/>
           <a:p>
-            <a:endParaRPr b="0" lang="en-US" sz="1800" spc="-1" strike="noStrike">
-              <a:solidFill>
-                <a:srgbClr val="000000"/>
-              </a:solidFill>
-              <a:latin typeface="Century Gothic"/>
+            <a:pPr algn="ctr"/>
+            <a:endParaRPr b="0" lang="en-ZA" sz="4400" spc="-1" strike="noStrike">
+              <a:latin typeface="Arial"/>
             </a:endParaRPr>
           </a:p>
         </p:txBody>
       </p:sp>
       <p:sp>
         <p:nvSpPr>
-          <p:cNvPr id="103" name="PlaceHolder 2"/>
+          <p:cNvPr id="97" name="PlaceHolder 2"/>
           <p:cNvSpPr>
             <a:spLocks noGrp="1"/>
           </p:cNvSpPr>
@@ -674,8 +630,8 @@
         </p:nvSpPr>
         <p:spPr>
           <a:xfrm>
-            <a:off x="2589120" y="2133720"/>
-            <a:ext cx="8915040" cy="3777120"/>
+            <a:off x="609480" y="1604520"/>
+            <a:ext cx="10972440" cy="3977280"/>
           </a:xfrm>
           <a:prstGeom prst="rect">
             <a:avLst/>
@@ -715,7 +671,7 @@
       </p:grpSpPr>
       <p:sp>
         <p:nvSpPr>
-          <p:cNvPr id="104" name="PlaceHolder 1"/>
+          <p:cNvPr id="98" name="PlaceHolder 1"/>
           <p:cNvSpPr>
             <a:spLocks noGrp="1"/>
           </p:cNvSpPr>
@@ -725,8 +681,8 @@
         </p:nvSpPr>
         <p:spPr>
           <a:xfrm>
-            <a:off x="2593080" y="624240"/>
-            <a:ext cx="8911440" cy="1280520"/>
+            <a:off x="609480" y="273600"/>
+            <a:ext cx="10972440" cy="1144800"/>
           </a:xfrm>
           <a:prstGeom prst="rect">
             <a:avLst/>
@@ -735,18 +691,16 @@
         <p:txBody>
           <a:bodyPr lIns="0" rIns="0" tIns="0" bIns="0" anchor="ctr"/>
           <a:p>
-            <a:endParaRPr b="0" lang="en-US" sz="1800" spc="-1" strike="noStrike">
-              <a:solidFill>
-                <a:srgbClr val="000000"/>
-              </a:solidFill>
-              <a:latin typeface="Century Gothic"/>
+            <a:pPr algn="ctr"/>
+            <a:endParaRPr b="0" lang="en-ZA" sz="4400" spc="-1" strike="noStrike">
+              <a:latin typeface="Arial"/>
             </a:endParaRPr>
           </a:p>
         </p:txBody>
       </p:sp>
       <p:sp>
         <p:nvSpPr>
-          <p:cNvPr id="105" name="PlaceHolder 2"/>
+          <p:cNvPr id="99" name="PlaceHolder 2"/>
           <p:cNvSpPr>
             <a:spLocks noGrp="1"/>
           </p:cNvSpPr>
@@ -756,8 +710,8 @@
         </p:nvSpPr>
         <p:spPr>
           <a:xfrm>
-            <a:off x="2589120" y="2133720"/>
-            <a:ext cx="8915040" cy="3777120"/>
+            <a:off x="609480" y="1604520"/>
+            <a:ext cx="10972440" cy="3977280"/>
           </a:xfrm>
           <a:prstGeom prst="rect">
             <a:avLst/>
@@ -768,11 +722,8 @@
             <a:normAutofit/>
           </a:bodyPr>
           <a:p>
-            <a:endParaRPr b="0" lang="en-US" sz="1800" spc="-1" strike="noStrike">
-              <a:solidFill>
-                <a:srgbClr val="404040"/>
-              </a:solidFill>
-              <a:latin typeface="Century Gothic"/>
+            <a:endParaRPr b="0" lang="en-ZA" sz="3200" spc="-1" strike="noStrike">
+              <a:latin typeface="Arial"/>
             </a:endParaRPr>
           </a:p>
         </p:txBody>
@@ -801,7 +752,7 @@
       </p:grpSpPr>
       <p:sp>
         <p:nvSpPr>
-          <p:cNvPr id="106" name="PlaceHolder 1"/>
+          <p:cNvPr id="100" name="PlaceHolder 1"/>
           <p:cNvSpPr>
             <a:spLocks noGrp="1"/>
           </p:cNvSpPr>
@@ -811,8 +762,8 @@
         </p:nvSpPr>
         <p:spPr>
           <a:xfrm>
-            <a:off x="2593080" y="624240"/>
-            <a:ext cx="8911440" cy="1280520"/>
+            <a:off x="609480" y="273600"/>
+            <a:ext cx="10972440" cy="1144800"/>
           </a:xfrm>
           <a:prstGeom prst="rect">
             <a:avLst/>
@@ -821,18 +772,16 @@
         <p:txBody>
           <a:bodyPr lIns="0" rIns="0" tIns="0" bIns="0" anchor="ctr"/>
           <a:p>
-            <a:endParaRPr b="0" lang="en-US" sz="1800" spc="-1" strike="noStrike">
-              <a:solidFill>
-                <a:srgbClr val="000000"/>
-              </a:solidFill>
-              <a:latin typeface="Century Gothic"/>
+            <a:pPr algn="ctr"/>
+            <a:endParaRPr b="0" lang="en-ZA" sz="4400" spc="-1" strike="noStrike">
+              <a:latin typeface="Arial"/>
             </a:endParaRPr>
           </a:p>
         </p:txBody>
       </p:sp>
       <p:sp>
         <p:nvSpPr>
-          <p:cNvPr id="107" name="PlaceHolder 2"/>
+          <p:cNvPr id="101" name="PlaceHolder 2"/>
           <p:cNvSpPr>
             <a:spLocks noGrp="1"/>
           </p:cNvSpPr>
@@ -842,8 +791,8 @@
         </p:nvSpPr>
         <p:spPr>
           <a:xfrm>
-            <a:off x="2589120" y="2133720"/>
-            <a:ext cx="4350240" cy="3777120"/>
+            <a:off x="609480" y="1604520"/>
+            <a:ext cx="5354280" cy="3977280"/>
           </a:xfrm>
           <a:prstGeom prst="rect">
             <a:avLst/>
@@ -854,18 +803,15 @@
             <a:normAutofit/>
           </a:bodyPr>
           <a:p>
-            <a:endParaRPr b="0" lang="en-US" sz="1800" spc="-1" strike="noStrike">
-              <a:solidFill>
-                <a:srgbClr val="404040"/>
-              </a:solidFill>
-              <a:latin typeface="Century Gothic"/>
+            <a:endParaRPr b="0" lang="en-ZA" sz="3200" spc="-1" strike="noStrike">
+              <a:latin typeface="Arial"/>
             </a:endParaRPr>
           </a:p>
         </p:txBody>
       </p:sp>
       <p:sp>
         <p:nvSpPr>
-          <p:cNvPr id="108" name="PlaceHolder 3"/>
+          <p:cNvPr id="102" name="PlaceHolder 3"/>
           <p:cNvSpPr>
             <a:spLocks noGrp="1"/>
           </p:cNvSpPr>
@@ -875,8 +821,8 @@
         </p:nvSpPr>
         <p:spPr>
           <a:xfrm>
-            <a:off x="7157160" y="2133720"/>
-            <a:ext cx="4350240" cy="3777120"/>
+            <a:off x="6231960" y="1604520"/>
+            <a:ext cx="5354280" cy="3977280"/>
           </a:xfrm>
           <a:prstGeom prst="rect">
             <a:avLst/>
@@ -887,11 +833,8 @@
             <a:normAutofit/>
           </a:bodyPr>
           <a:p>
-            <a:endParaRPr b="0" lang="en-US" sz="1800" spc="-1" strike="noStrike">
-              <a:solidFill>
-                <a:srgbClr val="404040"/>
-              </a:solidFill>
-              <a:latin typeface="Century Gothic"/>
+            <a:endParaRPr b="0" lang="en-ZA" sz="3200" spc="-1" strike="noStrike">
+              <a:latin typeface="Arial"/>
             </a:endParaRPr>
           </a:p>
         </p:txBody>
@@ -920,7 +863,7 @@
       </p:grpSpPr>
       <p:sp>
         <p:nvSpPr>
-          <p:cNvPr id="109" name="PlaceHolder 1"/>
+          <p:cNvPr id="103" name="PlaceHolder 1"/>
           <p:cNvSpPr>
             <a:spLocks noGrp="1"/>
           </p:cNvSpPr>
@@ -930,8 +873,8 @@
         </p:nvSpPr>
         <p:spPr>
           <a:xfrm>
-            <a:off x="2593080" y="624240"/>
-            <a:ext cx="8911440" cy="1280520"/>
+            <a:off x="609480" y="273600"/>
+            <a:ext cx="10972440" cy="1144800"/>
           </a:xfrm>
           <a:prstGeom prst="rect">
             <a:avLst/>
@@ -940,11 +883,9 @@
         <p:txBody>
           <a:bodyPr lIns="0" rIns="0" tIns="0" bIns="0" anchor="ctr"/>
           <a:p>
-            <a:endParaRPr b="0" lang="en-US" sz="1800" spc="-1" strike="noStrike">
-              <a:solidFill>
-                <a:srgbClr val="000000"/>
-              </a:solidFill>
-              <a:latin typeface="Century Gothic"/>
+            <a:pPr algn="ctr"/>
+            <a:endParaRPr b="0" lang="en-ZA" sz="4400" spc="-1" strike="noStrike">
+              <a:latin typeface="Arial"/>
             </a:endParaRPr>
           </a:p>
         </p:txBody>
@@ -973,7 +914,7 @@
       </p:grpSpPr>
       <p:sp>
         <p:nvSpPr>
-          <p:cNvPr id="110" name="PlaceHolder 1"/>
+          <p:cNvPr id="104" name="PlaceHolder 1"/>
           <p:cNvSpPr>
             <a:spLocks noGrp="1"/>
           </p:cNvSpPr>
@@ -983,8 +924,8 @@
         </p:nvSpPr>
         <p:spPr>
           <a:xfrm>
-            <a:off x="2593080" y="624240"/>
-            <a:ext cx="8911440" cy="5937120"/>
+            <a:off x="609480" y="273600"/>
+            <a:ext cx="10972440" cy="5307840"/>
           </a:xfrm>
           <a:prstGeom prst="rect">
             <a:avLst/>
@@ -1024,7 +965,7 @@
       </p:grpSpPr>
       <p:sp>
         <p:nvSpPr>
-          <p:cNvPr id="111" name="PlaceHolder 1"/>
+          <p:cNvPr id="105" name="PlaceHolder 1"/>
           <p:cNvSpPr>
             <a:spLocks noGrp="1"/>
           </p:cNvSpPr>
@@ -1034,8 +975,8 @@
         </p:nvSpPr>
         <p:spPr>
           <a:xfrm>
-            <a:off x="2593080" y="624240"/>
-            <a:ext cx="8911440" cy="1280520"/>
+            <a:off x="609480" y="273600"/>
+            <a:ext cx="10972440" cy="1144800"/>
           </a:xfrm>
           <a:prstGeom prst="rect">
             <a:avLst/>
@@ -1044,18 +985,16 @@
         <p:txBody>
           <a:bodyPr lIns="0" rIns="0" tIns="0" bIns="0" anchor="ctr"/>
           <a:p>
-            <a:endParaRPr b="0" lang="en-US" sz="1800" spc="-1" strike="noStrike">
-              <a:solidFill>
-                <a:srgbClr val="000000"/>
-              </a:solidFill>
-              <a:latin typeface="Century Gothic"/>
+            <a:pPr algn="ctr"/>
+            <a:endParaRPr b="0" lang="en-ZA" sz="4400" spc="-1" strike="noStrike">
+              <a:latin typeface="Arial"/>
             </a:endParaRPr>
           </a:p>
         </p:txBody>
       </p:sp>
       <p:sp>
         <p:nvSpPr>
-          <p:cNvPr id="112" name="PlaceHolder 2"/>
+          <p:cNvPr id="106" name="PlaceHolder 2"/>
           <p:cNvSpPr>
             <a:spLocks noGrp="1"/>
           </p:cNvSpPr>
@@ -1065,8 +1004,8 @@
         </p:nvSpPr>
         <p:spPr>
           <a:xfrm>
-            <a:off x="2589120" y="2133720"/>
-            <a:ext cx="4350240" cy="1801440"/>
+            <a:off x="609480" y="1604520"/>
+            <a:ext cx="5354280" cy="1896840"/>
           </a:xfrm>
           <a:prstGeom prst="rect">
             <a:avLst/>
@@ -1077,18 +1016,15 @@
             <a:normAutofit/>
           </a:bodyPr>
           <a:p>
-            <a:endParaRPr b="0" lang="en-US" sz="1800" spc="-1" strike="noStrike">
-              <a:solidFill>
-                <a:srgbClr val="404040"/>
-              </a:solidFill>
-              <a:latin typeface="Century Gothic"/>
+            <a:endParaRPr b="0" lang="en-ZA" sz="3200" spc="-1" strike="noStrike">
+              <a:latin typeface="Arial"/>
             </a:endParaRPr>
           </a:p>
         </p:txBody>
       </p:sp>
       <p:sp>
         <p:nvSpPr>
-          <p:cNvPr id="113" name="PlaceHolder 3"/>
+          <p:cNvPr id="107" name="PlaceHolder 3"/>
           <p:cNvSpPr>
             <a:spLocks noGrp="1"/>
           </p:cNvSpPr>
@@ -1098,8 +1034,8 @@
         </p:nvSpPr>
         <p:spPr>
           <a:xfrm>
-            <a:off x="7157160" y="2133720"/>
-            <a:ext cx="4350240" cy="3777120"/>
+            <a:off x="6231960" y="1604520"/>
+            <a:ext cx="5354280" cy="3977280"/>
           </a:xfrm>
           <a:prstGeom prst="rect">
             <a:avLst/>
@@ -1110,18 +1046,15 @@
             <a:normAutofit/>
           </a:bodyPr>
           <a:p>
-            <a:endParaRPr b="0" lang="en-US" sz="1800" spc="-1" strike="noStrike">
-              <a:solidFill>
-                <a:srgbClr val="404040"/>
-              </a:solidFill>
-              <a:latin typeface="Century Gothic"/>
+            <a:endParaRPr b="0" lang="en-ZA" sz="3200" spc="-1" strike="noStrike">
+              <a:latin typeface="Arial"/>
             </a:endParaRPr>
           </a:p>
         </p:txBody>
       </p:sp>
       <p:sp>
         <p:nvSpPr>
-          <p:cNvPr id="114" name="PlaceHolder 4"/>
+          <p:cNvPr id="108" name="PlaceHolder 4"/>
           <p:cNvSpPr>
             <a:spLocks noGrp="1"/>
           </p:cNvSpPr>
@@ -1131,8 +1064,8 @@
         </p:nvSpPr>
         <p:spPr>
           <a:xfrm>
-            <a:off x="2589120" y="4106520"/>
-            <a:ext cx="4350240" cy="1801440"/>
+            <a:off x="609480" y="3682080"/>
+            <a:ext cx="5354280" cy="1896840"/>
           </a:xfrm>
           <a:prstGeom prst="rect">
             <a:avLst/>
@@ -1143,11 +1076,8 @@
             <a:normAutofit/>
           </a:bodyPr>
           <a:p>
-            <a:endParaRPr b="0" lang="en-US" sz="1800" spc="-1" strike="noStrike">
-              <a:solidFill>
-                <a:srgbClr val="404040"/>
-              </a:solidFill>
-              <a:latin typeface="Century Gothic"/>
+            <a:endParaRPr b="0" lang="en-ZA" sz="3200" spc="-1" strike="noStrike">
+              <a:latin typeface="Arial"/>
             </a:endParaRPr>
           </a:p>
         </p:txBody>
@@ -1176,7 +1106,7 @@
       </p:grpSpPr>
       <p:sp>
         <p:nvSpPr>
-          <p:cNvPr id="33" name="PlaceHolder 1"/>
+          <p:cNvPr id="30" name="PlaceHolder 1"/>
           <p:cNvSpPr>
             <a:spLocks noGrp="1"/>
           </p:cNvSpPr>
@@ -1186,8 +1116,8 @@
         </p:nvSpPr>
         <p:spPr>
           <a:xfrm>
-            <a:off x="2593080" y="624240"/>
-            <a:ext cx="8911440" cy="1280520"/>
+            <a:off x="609480" y="273600"/>
+            <a:ext cx="10972440" cy="1144800"/>
           </a:xfrm>
           <a:prstGeom prst="rect">
             <a:avLst/>
@@ -1196,18 +1126,16 @@
         <p:txBody>
           <a:bodyPr lIns="0" rIns="0" tIns="0" bIns="0" anchor="ctr"/>
           <a:p>
-            <a:endParaRPr b="0" lang="en-US" sz="1800" spc="-1" strike="noStrike">
-              <a:solidFill>
-                <a:srgbClr val="000000"/>
-              </a:solidFill>
-              <a:latin typeface="Century Gothic"/>
+            <a:pPr algn="ctr"/>
+            <a:endParaRPr b="0" lang="en-ZA" sz="4400" spc="-1" strike="noStrike">
+              <a:latin typeface="Arial"/>
             </a:endParaRPr>
           </a:p>
         </p:txBody>
       </p:sp>
       <p:sp>
         <p:nvSpPr>
-          <p:cNvPr id="34" name="PlaceHolder 2"/>
+          <p:cNvPr id="31" name="PlaceHolder 2"/>
           <p:cNvSpPr>
             <a:spLocks noGrp="1"/>
           </p:cNvSpPr>
@@ -1217,8 +1145,8 @@
         </p:nvSpPr>
         <p:spPr>
           <a:xfrm>
-            <a:off x="2589120" y="2133720"/>
-            <a:ext cx="8915040" cy="3777120"/>
+            <a:off x="609480" y="1604520"/>
+            <a:ext cx="10972440" cy="3977280"/>
           </a:xfrm>
           <a:prstGeom prst="rect">
             <a:avLst/>
@@ -1258,7 +1186,7 @@
       </p:grpSpPr>
       <p:sp>
         <p:nvSpPr>
-          <p:cNvPr id="115" name="PlaceHolder 1"/>
+          <p:cNvPr id="109" name="PlaceHolder 1"/>
           <p:cNvSpPr>
             <a:spLocks noGrp="1"/>
           </p:cNvSpPr>
@@ -1268,8 +1196,8 @@
         </p:nvSpPr>
         <p:spPr>
           <a:xfrm>
-            <a:off x="2593080" y="624240"/>
-            <a:ext cx="8911440" cy="1280520"/>
+            <a:off x="609480" y="273600"/>
+            <a:ext cx="10972440" cy="1144800"/>
           </a:xfrm>
           <a:prstGeom prst="rect">
             <a:avLst/>
@@ -1278,18 +1206,16 @@
         <p:txBody>
           <a:bodyPr lIns="0" rIns="0" tIns="0" bIns="0" anchor="ctr"/>
           <a:p>
-            <a:endParaRPr b="0" lang="en-US" sz="1800" spc="-1" strike="noStrike">
-              <a:solidFill>
-                <a:srgbClr val="000000"/>
-              </a:solidFill>
-              <a:latin typeface="Century Gothic"/>
+            <a:pPr algn="ctr"/>
+            <a:endParaRPr b="0" lang="en-ZA" sz="4400" spc="-1" strike="noStrike">
+              <a:latin typeface="Arial"/>
             </a:endParaRPr>
           </a:p>
         </p:txBody>
       </p:sp>
       <p:sp>
         <p:nvSpPr>
-          <p:cNvPr id="116" name="PlaceHolder 2"/>
+          <p:cNvPr id="110" name="PlaceHolder 2"/>
           <p:cNvSpPr>
             <a:spLocks noGrp="1"/>
           </p:cNvSpPr>
@@ -1299,8 +1225,8 @@
         </p:nvSpPr>
         <p:spPr>
           <a:xfrm>
-            <a:off x="2589120" y="2133720"/>
-            <a:ext cx="4350240" cy="3777120"/>
+            <a:off x="609480" y="1604520"/>
+            <a:ext cx="5354280" cy="3977280"/>
           </a:xfrm>
           <a:prstGeom prst="rect">
             <a:avLst/>
@@ -1311,18 +1237,15 @@
             <a:normAutofit/>
           </a:bodyPr>
           <a:p>
-            <a:endParaRPr b="0" lang="en-US" sz="1800" spc="-1" strike="noStrike">
-              <a:solidFill>
-                <a:srgbClr val="404040"/>
-              </a:solidFill>
-              <a:latin typeface="Century Gothic"/>
+            <a:endParaRPr b="0" lang="en-ZA" sz="3200" spc="-1" strike="noStrike">
+              <a:latin typeface="Arial"/>
             </a:endParaRPr>
           </a:p>
         </p:txBody>
       </p:sp>
       <p:sp>
         <p:nvSpPr>
-          <p:cNvPr id="117" name="PlaceHolder 3"/>
+          <p:cNvPr id="111" name="PlaceHolder 3"/>
           <p:cNvSpPr>
             <a:spLocks noGrp="1"/>
           </p:cNvSpPr>
@@ -1332,8 +1255,8 @@
         </p:nvSpPr>
         <p:spPr>
           <a:xfrm>
-            <a:off x="7157160" y="2133720"/>
-            <a:ext cx="4350240" cy="1801440"/>
+            <a:off x="6231960" y="1604520"/>
+            <a:ext cx="5354280" cy="1896840"/>
           </a:xfrm>
           <a:prstGeom prst="rect">
             <a:avLst/>
@@ -1344,18 +1267,15 @@
             <a:normAutofit/>
           </a:bodyPr>
           <a:p>
-            <a:endParaRPr b="0" lang="en-US" sz="1800" spc="-1" strike="noStrike">
-              <a:solidFill>
-                <a:srgbClr val="404040"/>
-              </a:solidFill>
-              <a:latin typeface="Century Gothic"/>
+            <a:endParaRPr b="0" lang="en-ZA" sz="3200" spc="-1" strike="noStrike">
+              <a:latin typeface="Arial"/>
             </a:endParaRPr>
           </a:p>
         </p:txBody>
       </p:sp>
       <p:sp>
         <p:nvSpPr>
-          <p:cNvPr id="118" name="PlaceHolder 4"/>
+          <p:cNvPr id="112" name="PlaceHolder 4"/>
           <p:cNvSpPr>
             <a:spLocks noGrp="1"/>
           </p:cNvSpPr>
@@ -1365,8 +1285,8 @@
         </p:nvSpPr>
         <p:spPr>
           <a:xfrm>
-            <a:off x="7157160" y="4106520"/>
-            <a:ext cx="4350240" cy="1801440"/>
+            <a:off x="6231960" y="3682080"/>
+            <a:ext cx="5354280" cy="1896840"/>
           </a:xfrm>
           <a:prstGeom prst="rect">
             <a:avLst/>
@@ -1377,11 +1297,8 @@
             <a:normAutofit/>
           </a:bodyPr>
           <a:p>
-            <a:endParaRPr b="0" lang="en-US" sz="1800" spc="-1" strike="noStrike">
-              <a:solidFill>
-                <a:srgbClr val="404040"/>
-              </a:solidFill>
-              <a:latin typeface="Century Gothic"/>
+            <a:endParaRPr b="0" lang="en-ZA" sz="3200" spc="-1" strike="noStrike">
+              <a:latin typeface="Arial"/>
             </a:endParaRPr>
           </a:p>
         </p:txBody>
@@ -1410,7 +1327,7 @@
       </p:grpSpPr>
       <p:sp>
         <p:nvSpPr>
-          <p:cNvPr id="119" name="PlaceHolder 1"/>
+          <p:cNvPr id="113" name="PlaceHolder 1"/>
           <p:cNvSpPr>
             <a:spLocks noGrp="1"/>
           </p:cNvSpPr>
@@ -1420,8 +1337,8 @@
         </p:nvSpPr>
         <p:spPr>
           <a:xfrm>
-            <a:off x="2593080" y="624240"/>
-            <a:ext cx="8911440" cy="1280520"/>
+            <a:off x="609480" y="273600"/>
+            <a:ext cx="10972440" cy="1144800"/>
           </a:xfrm>
           <a:prstGeom prst="rect">
             <a:avLst/>
@@ -1430,18 +1347,16 @@
         <p:txBody>
           <a:bodyPr lIns="0" rIns="0" tIns="0" bIns="0" anchor="ctr"/>
           <a:p>
-            <a:endParaRPr b="0" lang="en-US" sz="1800" spc="-1" strike="noStrike">
-              <a:solidFill>
-                <a:srgbClr val="000000"/>
-              </a:solidFill>
-              <a:latin typeface="Century Gothic"/>
+            <a:pPr algn="ctr"/>
+            <a:endParaRPr b="0" lang="en-ZA" sz="4400" spc="-1" strike="noStrike">
+              <a:latin typeface="Arial"/>
             </a:endParaRPr>
           </a:p>
         </p:txBody>
       </p:sp>
       <p:sp>
         <p:nvSpPr>
-          <p:cNvPr id="120" name="PlaceHolder 2"/>
+          <p:cNvPr id="114" name="PlaceHolder 2"/>
           <p:cNvSpPr>
             <a:spLocks noGrp="1"/>
           </p:cNvSpPr>
@@ -1451,8 +1366,8 @@
         </p:nvSpPr>
         <p:spPr>
           <a:xfrm>
-            <a:off x="2589120" y="2133720"/>
-            <a:ext cx="4350240" cy="1801440"/>
+            <a:off x="609480" y="1604520"/>
+            <a:ext cx="5354280" cy="1896840"/>
           </a:xfrm>
           <a:prstGeom prst="rect">
             <a:avLst/>
@@ -1463,18 +1378,15 @@
             <a:normAutofit/>
           </a:bodyPr>
           <a:p>
-            <a:endParaRPr b="0" lang="en-US" sz="1800" spc="-1" strike="noStrike">
-              <a:solidFill>
-                <a:srgbClr val="404040"/>
-              </a:solidFill>
-              <a:latin typeface="Century Gothic"/>
+            <a:endParaRPr b="0" lang="en-ZA" sz="3200" spc="-1" strike="noStrike">
+              <a:latin typeface="Arial"/>
             </a:endParaRPr>
           </a:p>
         </p:txBody>
       </p:sp>
       <p:sp>
         <p:nvSpPr>
-          <p:cNvPr id="121" name="PlaceHolder 3"/>
+          <p:cNvPr id="115" name="PlaceHolder 3"/>
           <p:cNvSpPr>
             <a:spLocks noGrp="1"/>
           </p:cNvSpPr>
@@ -1484,8 +1396,8 @@
         </p:nvSpPr>
         <p:spPr>
           <a:xfrm>
-            <a:off x="7157160" y="2133720"/>
-            <a:ext cx="4350240" cy="1801440"/>
+            <a:off x="6231960" y="1604520"/>
+            <a:ext cx="5354280" cy="1896840"/>
           </a:xfrm>
           <a:prstGeom prst="rect">
             <a:avLst/>
@@ -1496,18 +1408,15 @@
             <a:normAutofit/>
           </a:bodyPr>
           <a:p>
-            <a:endParaRPr b="0" lang="en-US" sz="1800" spc="-1" strike="noStrike">
-              <a:solidFill>
-                <a:srgbClr val="404040"/>
-              </a:solidFill>
-              <a:latin typeface="Century Gothic"/>
+            <a:endParaRPr b="0" lang="en-ZA" sz="3200" spc="-1" strike="noStrike">
+              <a:latin typeface="Arial"/>
             </a:endParaRPr>
           </a:p>
         </p:txBody>
       </p:sp>
       <p:sp>
         <p:nvSpPr>
-          <p:cNvPr id="122" name="PlaceHolder 4"/>
+          <p:cNvPr id="116" name="PlaceHolder 4"/>
           <p:cNvSpPr>
             <a:spLocks noGrp="1"/>
           </p:cNvSpPr>
@@ -1517,8 +1426,8 @@
         </p:nvSpPr>
         <p:spPr>
           <a:xfrm>
-            <a:off x="2589120" y="4106520"/>
-            <a:ext cx="8915040" cy="1801440"/>
+            <a:off x="609480" y="3682080"/>
+            <a:ext cx="10972440" cy="1896840"/>
           </a:xfrm>
           <a:prstGeom prst="rect">
             <a:avLst/>
@@ -1529,11 +1438,8 @@
             <a:normAutofit/>
           </a:bodyPr>
           <a:p>
-            <a:endParaRPr b="0" lang="en-US" sz="1800" spc="-1" strike="noStrike">
-              <a:solidFill>
-                <a:srgbClr val="404040"/>
-              </a:solidFill>
-              <a:latin typeface="Century Gothic"/>
+            <a:endParaRPr b="0" lang="en-ZA" sz="3200" spc="-1" strike="noStrike">
+              <a:latin typeface="Arial"/>
             </a:endParaRPr>
           </a:p>
         </p:txBody>
@@ -1562,7 +1468,7 @@
       </p:grpSpPr>
       <p:sp>
         <p:nvSpPr>
-          <p:cNvPr id="123" name="PlaceHolder 1"/>
+          <p:cNvPr id="117" name="PlaceHolder 1"/>
           <p:cNvSpPr>
             <a:spLocks noGrp="1"/>
           </p:cNvSpPr>
@@ -1572,8 +1478,8 @@
         </p:nvSpPr>
         <p:spPr>
           <a:xfrm>
-            <a:off x="2593080" y="624240"/>
-            <a:ext cx="8911440" cy="1280520"/>
+            <a:off x="609480" y="273600"/>
+            <a:ext cx="10972440" cy="1144800"/>
           </a:xfrm>
           <a:prstGeom prst="rect">
             <a:avLst/>
@@ -1582,18 +1488,16 @@
         <p:txBody>
           <a:bodyPr lIns="0" rIns="0" tIns="0" bIns="0" anchor="ctr"/>
           <a:p>
-            <a:endParaRPr b="0" lang="en-US" sz="1800" spc="-1" strike="noStrike">
-              <a:solidFill>
-                <a:srgbClr val="000000"/>
-              </a:solidFill>
-              <a:latin typeface="Century Gothic"/>
+            <a:pPr algn="ctr"/>
+            <a:endParaRPr b="0" lang="en-ZA" sz="4400" spc="-1" strike="noStrike">
+              <a:latin typeface="Arial"/>
             </a:endParaRPr>
           </a:p>
         </p:txBody>
       </p:sp>
       <p:sp>
         <p:nvSpPr>
-          <p:cNvPr id="124" name="PlaceHolder 2"/>
+          <p:cNvPr id="118" name="PlaceHolder 2"/>
           <p:cNvSpPr>
             <a:spLocks noGrp="1"/>
           </p:cNvSpPr>
@@ -1603,8 +1507,8 @@
         </p:nvSpPr>
         <p:spPr>
           <a:xfrm>
-            <a:off x="2589120" y="2133720"/>
-            <a:ext cx="8915040" cy="1801440"/>
+            <a:off x="609480" y="1604520"/>
+            <a:ext cx="10972440" cy="1896840"/>
           </a:xfrm>
           <a:prstGeom prst="rect">
             <a:avLst/>
@@ -1615,18 +1519,15 @@
             <a:normAutofit/>
           </a:bodyPr>
           <a:p>
-            <a:endParaRPr b="0" lang="en-US" sz="1800" spc="-1" strike="noStrike">
-              <a:solidFill>
-                <a:srgbClr val="404040"/>
-              </a:solidFill>
-              <a:latin typeface="Century Gothic"/>
+            <a:endParaRPr b="0" lang="en-ZA" sz="3200" spc="-1" strike="noStrike">
+              <a:latin typeface="Arial"/>
             </a:endParaRPr>
           </a:p>
         </p:txBody>
       </p:sp>
       <p:sp>
         <p:nvSpPr>
-          <p:cNvPr id="125" name="PlaceHolder 3"/>
+          <p:cNvPr id="119" name="PlaceHolder 3"/>
           <p:cNvSpPr>
             <a:spLocks noGrp="1"/>
           </p:cNvSpPr>
@@ -1636,8 +1537,8 @@
         </p:nvSpPr>
         <p:spPr>
           <a:xfrm>
-            <a:off x="2589120" y="4106520"/>
-            <a:ext cx="8915040" cy="1801440"/>
+            <a:off x="609480" y="3682080"/>
+            <a:ext cx="10972440" cy="1896840"/>
           </a:xfrm>
           <a:prstGeom prst="rect">
             <a:avLst/>
@@ -1648,11 +1549,8 @@
             <a:normAutofit/>
           </a:bodyPr>
           <a:p>
-            <a:endParaRPr b="0" lang="en-US" sz="1800" spc="-1" strike="noStrike">
-              <a:solidFill>
-                <a:srgbClr val="404040"/>
-              </a:solidFill>
-              <a:latin typeface="Century Gothic"/>
+            <a:endParaRPr b="0" lang="en-ZA" sz="3200" spc="-1" strike="noStrike">
+              <a:latin typeface="Arial"/>
             </a:endParaRPr>
           </a:p>
         </p:txBody>
@@ -1681,7 +1579,7 @@
       </p:grpSpPr>
       <p:sp>
         <p:nvSpPr>
-          <p:cNvPr id="126" name="PlaceHolder 1"/>
+          <p:cNvPr id="120" name="PlaceHolder 1"/>
           <p:cNvSpPr>
             <a:spLocks noGrp="1"/>
           </p:cNvSpPr>
@@ -1691,8 +1589,8 @@
         </p:nvSpPr>
         <p:spPr>
           <a:xfrm>
-            <a:off x="2593080" y="624240"/>
-            <a:ext cx="8911440" cy="1280520"/>
+            <a:off x="609480" y="273600"/>
+            <a:ext cx="10972440" cy="1144800"/>
           </a:xfrm>
           <a:prstGeom prst="rect">
             <a:avLst/>
@@ -1701,18 +1599,16 @@
         <p:txBody>
           <a:bodyPr lIns="0" rIns="0" tIns="0" bIns="0" anchor="ctr"/>
           <a:p>
-            <a:endParaRPr b="0" lang="en-US" sz="1800" spc="-1" strike="noStrike">
-              <a:solidFill>
-                <a:srgbClr val="000000"/>
-              </a:solidFill>
-              <a:latin typeface="Century Gothic"/>
+            <a:pPr algn="ctr"/>
+            <a:endParaRPr b="0" lang="en-ZA" sz="4400" spc="-1" strike="noStrike">
+              <a:latin typeface="Arial"/>
             </a:endParaRPr>
           </a:p>
         </p:txBody>
       </p:sp>
       <p:sp>
         <p:nvSpPr>
-          <p:cNvPr id="127" name="PlaceHolder 2"/>
+          <p:cNvPr id="121" name="PlaceHolder 2"/>
           <p:cNvSpPr>
             <a:spLocks noGrp="1"/>
           </p:cNvSpPr>
@@ -1722,8 +1618,8 @@
         </p:nvSpPr>
         <p:spPr>
           <a:xfrm>
-            <a:off x="2589120" y="2133720"/>
-            <a:ext cx="4350240" cy="1801440"/>
+            <a:off x="609480" y="1604520"/>
+            <a:ext cx="5354280" cy="1896840"/>
           </a:xfrm>
           <a:prstGeom prst="rect">
             <a:avLst/>
@@ -1734,18 +1630,15 @@
             <a:normAutofit/>
           </a:bodyPr>
           <a:p>
-            <a:endParaRPr b="0" lang="en-US" sz="1800" spc="-1" strike="noStrike">
-              <a:solidFill>
-                <a:srgbClr val="404040"/>
-              </a:solidFill>
-              <a:latin typeface="Century Gothic"/>
+            <a:endParaRPr b="0" lang="en-ZA" sz="3200" spc="-1" strike="noStrike">
+              <a:latin typeface="Arial"/>
             </a:endParaRPr>
           </a:p>
         </p:txBody>
       </p:sp>
       <p:sp>
         <p:nvSpPr>
-          <p:cNvPr id="128" name="PlaceHolder 3"/>
+          <p:cNvPr id="122" name="PlaceHolder 3"/>
           <p:cNvSpPr>
             <a:spLocks noGrp="1"/>
           </p:cNvSpPr>
@@ -1755,8 +1648,8 @@
         </p:nvSpPr>
         <p:spPr>
           <a:xfrm>
-            <a:off x="7157160" y="2133720"/>
-            <a:ext cx="4350240" cy="1801440"/>
+            <a:off x="6231960" y="1604520"/>
+            <a:ext cx="5354280" cy="1896840"/>
           </a:xfrm>
           <a:prstGeom prst="rect">
             <a:avLst/>
@@ -1767,18 +1660,15 @@
             <a:normAutofit/>
           </a:bodyPr>
           <a:p>
-            <a:endParaRPr b="0" lang="en-US" sz="1800" spc="-1" strike="noStrike">
-              <a:solidFill>
-                <a:srgbClr val="404040"/>
-              </a:solidFill>
-              <a:latin typeface="Century Gothic"/>
+            <a:endParaRPr b="0" lang="en-ZA" sz="3200" spc="-1" strike="noStrike">
+              <a:latin typeface="Arial"/>
             </a:endParaRPr>
           </a:p>
         </p:txBody>
       </p:sp>
       <p:sp>
         <p:nvSpPr>
-          <p:cNvPr id="129" name="PlaceHolder 4"/>
+          <p:cNvPr id="123" name="PlaceHolder 4"/>
           <p:cNvSpPr>
             <a:spLocks noGrp="1"/>
           </p:cNvSpPr>
@@ -1788,8 +1678,8 @@
         </p:nvSpPr>
         <p:spPr>
           <a:xfrm>
-            <a:off x="2589120" y="4106520"/>
-            <a:ext cx="4350240" cy="1801440"/>
+            <a:off x="609480" y="3682080"/>
+            <a:ext cx="5354280" cy="1896840"/>
           </a:xfrm>
           <a:prstGeom prst="rect">
             <a:avLst/>
@@ -1800,18 +1690,15 @@
             <a:normAutofit/>
           </a:bodyPr>
           <a:p>
-            <a:endParaRPr b="0" lang="en-US" sz="1800" spc="-1" strike="noStrike">
-              <a:solidFill>
-                <a:srgbClr val="404040"/>
-              </a:solidFill>
-              <a:latin typeface="Century Gothic"/>
+            <a:endParaRPr b="0" lang="en-ZA" sz="3200" spc="-1" strike="noStrike">
+              <a:latin typeface="Arial"/>
             </a:endParaRPr>
           </a:p>
         </p:txBody>
       </p:sp>
       <p:sp>
         <p:nvSpPr>
-          <p:cNvPr id="130" name="PlaceHolder 5"/>
+          <p:cNvPr id="124" name="PlaceHolder 5"/>
           <p:cNvSpPr>
             <a:spLocks noGrp="1"/>
           </p:cNvSpPr>
@@ -1821,8 +1708,8 @@
         </p:nvSpPr>
         <p:spPr>
           <a:xfrm>
-            <a:off x="7157160" y="4106520"/>
-            <a:ext cx="4350240" cy="1801440"/>
+            <a:off x="6231960" y="3682080"/>
+            <a:ext cx="5354280" cy="1896840"/>
           </a:xfrm>
           <a:prstGeom prst="rect">
             <a:avLst/>
@@ -1833,11 +1720,8 @@
             <a:normAutofit/>
           </a:bodyPr>
           <a:p>
-            <a:endParaRPr b="0" lang="en-US" sz="1800" spc="-1" strike="noStrike">
-              <a:solidFill>
-                <a:srgbClr val="404040"/>
-              </a:solidFill>
-              <a:latin typeface="Century Gothic"/>
+            <a:endParaRPr b="0" lang="en-ZA" sz="3200" spc="-1" strike="noStrike">
+              <a:latin typeface="Arial"/>
             </a:endParaRPr>
           </a:p>
         </p:txBody>
@@ -1866,7 +1750,7 @@
       </p:grpSpPr>
       <p:sp>
         <p:nvSpPr>
-          <p:cNvPr id="131" name="PlaceHolder 1"/>
+          <p:cNvPr id="125" name="PlaceHolder 1"/>
           <p:cNvSpPr>
             <a:spLocks noGrp="1"/>
           </p:cNvSpPr>
@@ -1876,8 +1760,8 @@
         </p:nvSpPr>
         <p:spPr>
           <a:xfrm>
-            <a:off x="2593080" y="624240"/>
-            <a:ext cx="8911440" cy="1280520"/>
+            <a:off x="609480" y="273600"/>
+            <a:ext cx="10972440" cy="1144800"/>
           </a:xfrm>
           <a:prstGeom prst="rect">
             <a:avLst/>
@@ -1886,18 +1770,16 @@
         <p:txBody>
           <a:bodyPr lIns="0" rIns="0" tIns="0" bIns="0" anchor="ctr"/>
           <a:p>
-            <a:endParaRPr b="0" lang="en-US" sz="1800" spc="-1" strike="noStrike">
-              <a:solidFill>
-                <a:srgbClr val="000000"/>
-              </a:solidFill>
-              <a:latin typeface="Century Gothic"/>
+            <a:pPr algn="ctr"/>
+            <a:endParaRPr b="0" lang="en-ZA" sz="4400" spc="-1" strike="noStrike">
+              <a:latin typeface="Arial"/>
             </a:endParaRPr>
           </a:p>
         </p:txBody>
       </p:sp>
       <p:sp>
         <p:nvSpPr>
-          <p:cNvPr id="132" name="PlaceHolder 2"/>
+          <p:cNvPr id="126" name="PlaceHolder 2"/>
           <p:cNvSpPr>
             <a:spLocks noGrp="1"/>
           </p:cNvSpPr>
@@ -1907,8 +1789,8 @@
         </p:nvSpPr>
         <p:spPr>
           <a:xfrm>
-            <a:off x="2589120" y="2133720"/>
-            <a:ext cx="2870280" cy="1801440"/>
+            <a:off x="609480" y="1604520"/>
+            <a:ext cx="3533040" cy="1896840"/>
           </a:xfrm>
           <a:prstGeom prst="rect">
             <a:avLst/>
@@ -1919,18 +1801,15 @@
             <a:normAutofit/>
           </a:bodyPr>
           <a:p>
-            <a:endParaRPr b="0" lang="en-US" sz="1800" spc="-1" strike="noStrike">
-              <a:solidFill>
-                <a:srgbClr val="404040"/>
-              </a:solidFill>
-              <a:latin typeface="Century Gothic"/>
+            <a:endParaRPr b="0" lang="en-ZA" sz="3200" spc="-1" strike="noStrike">
+              <a:latin typeface="Arial"/>
             </a:endParaRPr>
           </a:p>
         </p:txBody>
       </p:sp>
       <p:sp>
         <p:nvSpPr>
-          <p:cNvPr id="133" name="PlaceHolder 3"/>
+          <p:cNvPr id="127" name="PlaceHolder 3"/>
           <p:cNvSpPr>
             <a:spLocks noGrp="1"/>
           </p:cNvSpPr>
@@ -1940,8 +1819,8 @@
         </p:nvSpPr>
         <p:spPr>
           <a:xfrm>
-            <a:off x="5603400" y="2133720"/>
-            <a:ext cx="2870280" cy="1801440"/>
+            <a:off x="4319640" y="1604520"/>
+            <a:ext cx="3533040" cy="1896840"/>
           </a:xfrm>
           <a:prstGeom prst="rect">
             <a:avLst/>
@@ -1952,18 +1831,15 @@
             <a:normAutofit/>
           </a:bodyPr>
           <a:p>
-            <a:endParaRPr b="0" lang="en-US" sz="1800" spc="-1" strike="noStrike">
-              <a:solidFill>
-                <a:srgbClr val="404040"/>
-              </a:solidFill>
-              <a:latin typeface="Century Gothic"/>
+            <a:endParaRPr b="0" lang="en-ZA" sz="3200" spc="-1" strike="noStrike">
+              <a:latin typeface="Arial"/>
             </a:endParaRPr>
           </a:p>
         </p:txBody>
       </p:sp>
       <p:sp>
         <p:nvSpPr>
-          <p:cNvPr id="134" name="PlaceHolder 4"/>
+          <p:cNvPr id="128" name="PlaceHolder 4"/>
           <p:cNvSpPr>
             <a:spLocks noGrp="1"/>
           </p:cNvSpPr>
@@ -1973,8 +1849,8 @@
         </p:nvSpPr>
         <p:spPr>
           <a:xfrm>
-            <a:off x="8617320" y="2133720"/>
-            <a:ext cx="2870280" cy="1801440"/>
+            <a:off x="8029800" y="1604520"/>
+            <a:ext cx="3533040" cy="1896840"/>
           </a:xfrm>
           <a:prstGeom prst="rect">
             <a:avLst/>
@@ -1985,18 +1861,15 @@
             <a:normAutofit/>
           </a:bodyPr>
           <a:p>
-            <a:endParaRPr b="0" lang="en-US" sz="1800" spc="-1" strike="noStrike">
-              <a:solidFill>
-                <a:srgbClr val="404040"/>
-              </a:solidFill>
-              <a:latin typeface="Century Gothic"/>
+            <a:endParaRPr b="0" lang="en-ZA" sz="3200" spc="-1" strike="noStrike">
+              <a:latin typeface="Arial"/>
             </a:endParaRPr>
           </a:p>
         </p:txBody>
       </p:sp>
       <p:sp>
         <p:nvSpPr>
-          <p:cNvPr id="135" name="PlaceHolder 5"/>
+          <p:cNvPr id="129" name="PlaceHolder 5"/>
           <p:cNvSpPr>
             <a:spLocks noGrp="1"/>
           </p:cNvSpPr>
@@ -2006,8 +1879,8 @@
         </p:nvSpPr>
         <p:spPr>
           <a:xfrm>
-            <a:off x="2589120" y="4106520"/>
-            <a:ext cx="2870280" cy="1801440"/>
+            <a:off x="609480" y="3682080"/>
+            <a:ext cx="3533040" cy="1896840"/>
           </a:xfrm>
           <a:prstGeom prst="rect">
             <a:avLst/>
@@ -2018,18 +1891,15 @@
             <a:normAutofit/>
           </a:bodyPr>
           <a:p>
-            <a:endParaRPr b="0" lang="en-US" sz="1800" spc="-1" strike="noStrike">
-              <a:solidFill>
-                <a:srgbClr val="404040"/>
-              </a:solidFill>
-              <a:latin typeface="Century Gothic"/>
+            <a:endParaRPr b="0" lang="en-ZA" sz="3200" spc="-1" strike="noStrike">
+              <a:latin typeface="Arial"/>
             </a:endParaRPr>
           </a:p>
         </p:txBody>
       </p:sp>
       <p:sp>
         <p:nvSpPr>
-          <p:cNvPr id="136" name="PlaceHolder 6"/>
+          <p:cNvPr id="130" name="PlaceHolder 6"/>
           <p:cNvSpPr>
             <a:spLocks noGrp="1"/>
           </p:cNvSpPr>
@@ -2039,8 +1909,8 @@
         </p:nvSpPr>
         <p:spPr>
           <a:xfrm>
-            <a:off x="5603400" y="4106520"/>
-            <a:ext cx="2870280" cy="1801440"/>
+            <a:off x="4319640" y="3682080"/>
+            <a:ext cx="3533040" cy="1896840"/>
           </a:xfrm>
           <a:prstGeom prst="rect">
             <a:avLst/>
@@ -2051,18 +1921,15 @@
             <a:normAutofit/>
           </a:bodyPr>
           <a:p>
-            <a:endParaRPr b="0" lang="en-US" sz="1800" spc="-1" strike="noStrike">
-              <a:solidFill>
-                <a:srgbClr val="404040"/>
-              </a:solidFill>
-              <a:latin typeface="Century Gothic"/>
+            <a:endParaRPr b="0" lang="en-ZA" sz="3200" spc="-1" strike="noStrike">
+              <a:latin typeface="Arial"/>
             </a:endParaRPr>
           </a:p>
         </p:txBody>
       </p:sp>
       <p:sp>
         <p:nvSpPr>
-          <p:cNvPr id="137" name="PlaceHolder 7"/>
+          <p:cNvPr id="131" name="PlaceHolder 7"/>
           <p:cNvSpPr>
             <a:spLocks noGrp="1"/>
           </p:cNvSpPr>
@@ -2072,8 +1939,8 @@
         </p:nvSpPr>
         <p:spPr>
           <a:xfrm>
-            <a:off x="8617320" y="4106520"/>
-            <a:ext cx="2870280" cy="1801440"/>
+            <a:off x="8029800" y="3682080"/>
+            <a:ext cx="3533040" cy="1896840"/>
           </a:xfrm>
           <a:prstGeom prst="rect">
             <a:avLst/>
@@ -2084,11 +1951,8 @@
             <a:normAutofit/>
           </a:bodyPr>
           <a:p>
-            <a:endParaRPr b="0" lang="en-US" sz="1800" spc="-1" strike="noStrike">
-              <a:solidFill>
-                <a:srgbClr val="404040"/>
-              </a:solidFill>
-              <a:latin typeface="Century Gothic"/>
+            <a:endParaRPr b="0" lang="en-ZA" sz="3200" spc="-1" strike="noStrike">
+              <a:latin typeface="Arial"/>
             </a:endParaRPr>
           </a:p>
         </p:txBody>
@@ -2117,7 +1981,7 @@
       </p:grpSpPr>
       <p:sp>
         <p:nvSpPr>
-          <p:cNvPr id="35" name="PlaceHolder 1"/>
+          <p:cNvPr id="32" name="PlaceHolder 1"/>
           <p:cNvSpPr>
             <a:spLocks noGrp="1"/>
           </p:cNvSpPr>
@@ -2127,8 +1991,8 @@
         </p:nvSpPr>
         <p:spPr>
           <a:xfrm>
-            <a:off x="2593080" y="624240"/>
-            <a:ext cx="8911440" cy="1280520"/>
+            <a:off x="609480" y="273600"/>
+            <a:ext cx="10972440" cy="1144800"/>
           </a:xfrm>
           <a:prstGeom prst="rect">
             <a:avLst/>
@@ -2137,18 +2001,16 @@
         <p:txBody>
           <a:bodyPr lIns="0" rIns="0" tIns="0" bIns="0" anchor="ctr"/>
           <a:p>
-            <a:endParaRPr b="0" lang="en-US" sz="1800" spc="-1" strike="noStrike">
-              <a:solidFill>
-                <a:srgbClr val="000000"/>
-              </a:solidFill>
-              <a:latin typeface="Century Gothic"/>
+            <a:pPr algn="ctr"/>
+            <a:endParaRPr b="0" lang="en-ZA" sz="4400" spc="-1" strike="noStrike">
+              <a:latin typeface="Arial"/>
             </a:endParaRPr>
           </a:p>
         </p:txBody>
       </p:sp>
       <p:sp>
         <p:nvSpPr>
-          <p:cNvPr id="36" name="PlaceHolder 2"/>
+          <p:cNvPr id="33" name="PlaceHolder 2"/>
           <p:cNvSpPr>
             <a:spLocks noGrp="1"/>
           </p:cNvSpPr>
@@ -2158,8 +2020,8 @@
         </p:nvSpPr>
         <p:spPr>
           <a:xfrm>
-            <a:off x="2589120" y="2133720"/>
-            <a:ext cx="8915040" cy="3777120"/>
+            <a:off x="609480" y="1604520"/>
+            <a:ext cx="10972440" cy="3977280"/>
           </a:xfrm>
           <a:prstGeom prst="rect">
             <a:avLst/>
@@ -2170,11 +2032,8 @@
             <a:normAutofit/>
           </a:bodyPr>
           <a:p>
-            <a:endParaRPr b="0" lang="en-US" sz="1800" spc="-1" strike="noStrike">
-              <a:solidFill>
-                <a:srgbClr val="404040"/>
-              </a:solidFill>
-              <a:latin typeface="Century Gothic"/>
+            <a:endParaRPr b="0" lang="en-ZA" sz="3200" spc="-1" strike="noStrike">
+              <a:latin typeface="Arial"/>
             </a:endParaRPr>
           </a:p>
         </p:txBody>
@@ -2203,7 +2062,7 @@
       </p:grpSpPr>
       <p:sp>
         <p:nvSpPr>
-          <p:cNvPr id="37" name="PlaceHolder 1"/>
+          <p:cNvPr id="34" name="PlaceHolder 1"/>
           <p:cNvSpPr>
             <a:spLocks noGrp="1"/>
           </p:cNvSpPr>
@@ -2213,8 +2072,8 @@
         </p:nvSpPr>
         <p:spPr>
           <a:xfrm>
-            <a:off x="2593080" y="624240"/>
-            <a:ext cx="8911440" cy="1280520"/>
+            <a:off x="609480" y="273600"/>
+            <a:ext cx="10972440" cy="1144800"/>
           </a:xfrm>
           <a:prstGeom prst="rect">
             <a:avLst/>
@@ -2223,18 +2082,16 @@
         <p:txBody>
           <a:bodyPr lIns="0" rIns="0" tIns="0" bIns="0" anchor="ctr"/>
           <a:p>
-            <a:endParaRPr b="0" lang="en-US" sz="1800" spc="-1" strike="noStrike">
-              <a:solidFill>
-                <a:srgbClr val="000000"/>
-              </a:solidFill>
-              <a:latin typeface="Century Gothic"/>
+            <a:pPr algn="ctr"/>
+            <a:endParaRPr b="0" lang="en-ZA" sz="4400" spc="-1" strike="noStrike">
+              <a:latin typeface="Arial"/>
             </a:endParaRPr>
           </a:p>
         </p:txBody>
       </p:sp>
       <p:sp>
         <p:nvSpPr>
-          <p:cNvPr id="38" name="PlaceHolder 2"/>
+          <p:cNvPr id="35" name="PlaceHolder 2"/>
           <p:cNvSpPr>
             <a:spLocks noGrp="1"/>
           </p:cNvSpPr>
@@ -2244,8 +2101,8 @@
         </p:nvSpPr>
         <p:spPr>
           <a:xfrm>
-            <a:off x="2589120" y="2133720"/>
-            <a:ext cx="4350240" cy="3777120"/>
+            <a:off x="609480" y="1604520"/>
+            <a:ext cx="5354280" cy="3977280"/>
           </a:xfrm>
           <a:prstGeom prst="rect">
             <a:avLst/>
@@ -2256,18 +2113,15 @@
             <a:normAutofit/>
           </a:bodyPr>
           <a:p>
-            <a:endParaRPr b="0" lang="en-US" sz="1800" spc="-1" strike="noStrike">
-              <a:solidFill>
-                <a:srgbClr val="404040"/>
-              </a:solidFill>
-              <a:latin typeface="Century Gothic"/>
+            <a:endParaRPr b="0" lang="en-ZA" sz="3200" spc="-1" strike="noStrike">
+              <a:latin typeface="Arial"/>
             </a:endParaRPr>
           </a:p>
         </p:txBody>
       </p:sp>
       <p:sp>
         <p:nvSpPr>
-          <p:cNvPr id="39" name="PlaceHolder 3"/>
+          <p:cNvPr id="36" name="PlaceHolder 3"/>
           <p:cNvSpPr>
             <a:spLocks noGrp="1"/>
           </p:cNvSpPr>
@@ -2277,8 +2131,8 @@
         </p:nvSpPr>
         <p:spPr>
           <a:xfrm>
-            <a:off x="7157160" y="2133720"/>
-            <a:ext cx="4350240" cy="3777120"/>
+            <a:off x="6231960" y="1604520"/>
+            <a:ext cx="5354280" cy="3977280"/>
           </a:xfrm>
           <a:prstGeom prst="rect">
             <a:avLst/>
@@ -2289,11 +2143,8 @@
             <a:normAutofit/>
           </a:bodyPr>
           <a:p>
-            <a:endParaRPr b="0" lang="en-US" sz="1800" spc="-1" strike="noStrike">
-              <a:solidFill>
-                <a:srgbClr val="404040"/>
-              </a:solidFill>
-              <a:latin typeface="Century Gothic"/>
+            <a:endParaRPr b="0" lang="en-ZA" sz="3200" spc="-1" strike="noStrike">
+              <a:latin typeface="Arial"/>
             </a:endParaRPr>
           </a:p>
         </p:txBody>
@@ -2322,7 +2173,7 @@
       </p:grpSpPr>
       <p:sp>
         <p:nvSpPr>
-          <p:cNvPr id="40" name="PlaceHolder 1"/>
+          <p:cNvPr id="37" name="PlaceHolder 1"/>
           <p:cNvSpPr>
             <a:spLocks noGrp="1"/>
           </p:cNvSpPr>
@@ -2332,8 +2183,8 @@
         </p:nvSpPr>
         <p:spPr>
           <a:xfrm>
-            <a:off x="2593080" y="624240"/>
-            <a:ext cx="8911440" cy="1280520"/>
+            <a:off x="609480" y="273600"/>
+            <a:ext cx="10972440" cy="1144800"/>
           </a:xfrm>
           <a:prstGeom prst="rect">
             <a:avLst/>
@@ -2342,11 +2193,9 @@
         <p:txBody>
           <a:bodyPr lIns="0" rIns="0" tIns="0" bIns="0" anchor="ctr"/>
           <a:p>
-            <a:endParaRPr b="0" lang="en-US" sz="1800" spc="-1" strike="noStrike">
-              <a:solidFill>
-                <a:srgbClr val="000000"/>
-              </a:solidFill>
-              <a:latin typeface="Century Gothic"/>
+            <a:pPr algn="ctr"/>
+            <a:endParaRPr b="0" lang="en-ZA" sz="4400" spc="-1" strike="noStrike">
+              <a:latin typeface="Arial"/>
             </a:endParaRPr>
           </a:p>
         </p:txBody>
@@ -2375,7 +2224,7 @@
       </p:grpSpPr>
       <p:sp>
         <p:nvSpPr>
-          <p:cNvPr id="41" name="PlaceHolder 1"/>
+          <p:cNvPr id="38" name="PlaceHolder 1"/>
           <p:cNvSpPr>
             <a:spLocks noGrp="1"/>
           </p:cNvSpPr>
@@ -2385,8 +2234,8 @@
         </p:nvSpPr>
         <p:spPr>
           <a:xfrm>
-            <a:off x="2593080" y="624240"/>
-            <a:ext cx="8911440" cy="5937120"/>
+            <a:off x="609480" y="273600"/>
+            <a:ext cx="10972440" cy="5307840"/>
           </a:xfrm>
           <a:prstGeom prst="rect">
             <a:avLst/>
@@ -2426,7 +2275,7 @@
       </p:grpSpPr>
       <p:sp>
         <p:nvSpPr>
-          <p:cNvPr id="42" name="PlaceHolder 1"/>
+          <p:cNvPr id="39" name="PlaceHolder 1"/>
           <p:cNvSpPr>
             <a:spLocks noGrp="1"/>
           </p:cNvSpPr>
@@ -2436,8 +2285,8 @@
         </p:nvSpPr>
         <p:spPr>
           <a:xfrm>
-            <a:off x="2593080" y="624240"/>
-            <a:ext cx="8911440" cy="1280520"/>
+            <a:off x="609480" y="273600"/>
+            <a:ext cx="10972440" cy="1144800"/>
           </a:xfrm>
           <a:prstGeom prst="rect">
             <a:avLst/>
@@ -2446,18 +2295,16 @@
         <p:txBody>
           <a:bodyPr lIns="0" rIns="0" tIns="0" bIns="0" anchor="ctr"/>
           <a:p>
-            <a:endParaRPr b="0" lang="en-US" sz="1800" spc="-1" strike="noStrike">
-              <a:solidFill>
-                <a:srgbClr val="000000"/>
-              </a:solidFill>
-              <a:latin typeface="Century Gothic"/>
+            <a:pPr algn="ctr"/>
+            <a:endParaRPr b="0" lang="en-ZA" sz="4400" spc="-1" strike="noStrike">
+              <a:latin typeface="Arial"/>
             </a:endParaRPr>
           </a:p>
         </p:txBody>
       </p:sp>
       <p:sp>
         <p:nvSpPr>
-          <p:cNvPr id="43" name="PlaceHolder 2"/>
+          <p:cNvPr id="40" name="PlaceHolder 2"/>
           <p:cNvSpPr>
             <a:spLocks noGrp="1"/>
           </p:cNvSpPr>
@@ -2467,8 +2314,8 @@
         </p:nvSpPr>
         <p:spPr>
           <a:xfrm>
-            <a:off x="2589120" y="2133720"/>
-            <a:ext cx="4350240" cy="1801440"/>
+            <a:off x="609480" y="1604520"/>
+            <a:ext cx="5354280" cy="1896840"/>
           </a:xfrm>
           <a:prstGeom prst="rect">
             <a:avLst/>
@@ -2479,18 +2326,15 @@
             <a:normAutofit/>
           </a:bodyPr>
           <a:p>
-            <a:endParaRPr b="0" lang="en-US" sz="1800" spc="-1" strike="noStrike">
-              <a:solidFill>
-                <a:srgbClr val="404040"/>
-              </a:solidFill>
-              <a:latin typeface="Century Gothic"/>
+            <a:endParaRPr b="0" lang="en-ZA" sz="3200" spc="-1" strike="noStrike">
+              <a:latin typeface="Arial"/>
             </a:endParaRPr>
           </a:p>
         </p:txBody>
       </p:sp>
       <p:sp>
         <p:nvSpPr>
-          <p:cNvPr id="44" name="PlaceHolder 3"/>
+          <p:cNvPr id="41" name="PlaceHolder 3"/>
           <p:cNvSpPr>
             <a:spLocks noGrp="1"/>
           </p:cNvSpPr>
@@ -2500,8 +2344,8 @@
         </p:nvSpPr>
         <p:spPr>
           <a:xfrm>
-            <a:off x="7157160" y="2133720"/>
-            <a:ext cx="4350240" cy="3777120"/>
+            <a:off x="6231960" y="1604520"/>
+            <a:ext cx="5354280" cy="3977280"/>
           </a:xfrm>
           <a:prstGeom prst="rect">
             <a:avLst/>
@@ -2512,18 +2356,15 @@
             <a:normAutofit/>
           </a:bodyPr>
           <a:p>
-            <a:endParaRPr b="0" lang="en-US" sz="1800" spc="-1" strike="noStrike">
-              <a:solidFill>
-                <a:srgbClr val="404040"/>
-              </a:solidFill>
-              <a:latin typeface="Century Gothic"/>
+            <a:endParaRPr b="0" lang="en-ZA" sz="3200" spc="-1" strike="noStrike">
+              <a:latin typeface="Arial"/>
             </a:endParaRPr>
           </a:p>
         </p:txBody>
       </p:sp>
       <p:sp>
         <p:nvSpPr>
-          <p:cNvPr id="45" name="PlaceHolder 4"/>
+          <p:cNvPr id="42" name="PlaceHolder 4"/>
           <p:cNvSpPr>
             <a:spLocks noGrp="1"/>
           </p:cNvSpPr>
@@ -2533,8 +2374,8 @@
         </p:nvSpPr>
         <p:spPr>
           <a:xfrm>
-            <a:off x="2589120" y="4106520"/>
-            <a:ext cx="4350240" cy="1801440"/>
+            <a:off x="609480" y="3682080"/>
+            <a:ext cx="5354280" cy="1896840"/>
           </a:xfrm>
           <a:prstGeom prst="rect">
             <a:avLst/>
@@ -2545,11 +2386,8 @@
             <a:normAutofit/>
           </a:bodyPr>
           <a:p>
-            <a:endParaRPr b="0" lang="en-US" sz="1800" spc="-1" strike="noStrike">
-              <a:solidFill>
-                <a:srgbClr val="404040"/>
-              </a:solidFill>
-              <a:latin typeface="Century Gothic"/>
+            <a:endParaRPr b="0" lang="en-ZA" sz="3200" spc="-1" strike="noStrike">
+              <a:latin typeface="Arial"/>
             </a:endParaRPr>
           </a:p>
         </p:txBody>
@@ -2578,7 +2416,7 @@
       </p:grpSpPr>
       <p:sp>
         <p:nvSpPr>
-          <p:cNvPr id="46" name="PlaceHolder 1"/>
+          <p:cNvPr id="43" name="PlaceHolder 1"/>
           <p:cNvSpPr>
             <a:spLocks noGrp="1"/>
           </p:cNvSpPr>
@@ -2588,8 +2426,8 @@
         </p:nvSpPr>
         <p:spPr>
           <a:xfrm>
-            <a:off x="2593080" y="624240"/>
-            <a:ext cx="8911440" cy="1280520"/>
+            <a:off x="609480" y="273600"/>
+            <a:ext cx="10972440" cy="1144800"/>
           </a:xfrm>
           <a:prstGeom prst="rect">
             <a:avLst/>
@@ -2598,18 +2436,16 @@
         <p:txBody>
           <a:bodyPr lIns="0" rIns="0" tIns="0" bIns="0" anchor="ctr"/>
           <a:p>
-            <a:endParaRPr b="0" lang="en-US" sz="1800" spc="-1" strike="noStrike">
-              <a:solidFill>
-                <a:srgbClr val="000000"/>
-              </a:solidFill>
-              <a:latin typeface="Century Gothic"/>
+            <a:pPr algn="ctr"/>
+            <a:endParaRPr b="0" lang="en-ZA" sz="4400" spc="-1" strike="noStrike">
+              <a:latin typeface="Arial"/>
             </a:endParaRPr>
           </a:p>
         </p:txBody>
       </p:sp>
       <p:sp>
         <p:nvSpPr>
-          <p:cNvPr id="47" name="PlaceHolder 2"/>
+          <p:cNvPr id="44" name="PlaceHolder 2"/>
           <p:cNvSpPr>
             <a:spLocks noGrp="1"/>
           </p:cNvSpPr>
@@ -2619,8 +2455,8 @@
         </p:nvSpPr>
         <p:spPr>
           <a:xfrm>
-            <a:off x="2589120" y="2133720"/>
-            <a:ext cx="4350240" cy="3777120"/>
+            <a:off x="609480" y="1604520"/>
+            <a:ext cx="5354280" cy="3977280"/>
           </a:xfrm>
           <a:prstGeom prst="rect">
             <a:avLst/>
@@ -2631,18 +2467,15 @@
             <a:normAutofit/>
           </a:bodyPr>
           <a:p>
-            <a:endParaRPr b="0" lang="en-US" sz="1800" spc="-1" strike="noStrike">
-              <a:solidFill>
-                <a:srgbClr val="404040"/>
-              </a:solidFill>
-              <a:latin typeface="Century Gothic"/>
+            <a:endParaRPr b="0" lang="en-ZA" sz="3200" spc="-1" strike="noStrike">
+              <a:latin typeface="Arial"/>
             </a:endParaRPr>
           </a:p>
         </p:txBody>
       </p:sp>
       <p:sp>
         <p:nvSpPr>
-          <p:cNvPr id="48" name="PlaceHolder 3"/>
+          <p:cNvPr id="45" name="PlaceHolder 3"/>
           <p:cNvSpPr>
             <a:spLocks noGrp="1"/>
           </p:cNvSpPr>
@@ -2652,8 +2485,8 @@
         </p:nvSpPr>
         <p:spPr>
           <a:xfrm>
-            <a:off x="7157160" y="2133720"/>
-            <a:ext cx="4350240" cy="1801440"/>
+            <a:off x="6231960" y="1604520"/>
+            <a:ext cx="5354280" cy="1896840"/>
           </a:xfrm>
           <a:prstGeom prst="rect">
             <a:avLst/>
@@ -2664,18 +2497,15 @@
             <a:normAutofit/>
           </a:bodyPr>
           <a:p>
-            <a:endParaRPr b="0" lang="en-US" sz="1800" spc="-1" strike="noStrike">
-              <a:solidFill>
-                <a:srgbClr val="404040"/>
-              </a:solidFill>
-              <a:latin typeface="Century Gothic"/>
+            <a:endParaRPr b="0" lang="en-ZA" sz="3200" spc="-1" strike="noStrike">
+              <a:latin typeface="Arial"/>
             </a:endParaRPr>
           </a:p>
         </p:txBody>
       </p:sp>
       <p:sp>
         <p:nvSpPr>
-          <p:cNvPr id="49" name="PlaceHolder 4"/>
+          <p:cNvPr id="46" name="PlaceHolder 4"/>
           <p:cNvSpPr>
             <a:spLocks noGrp="1"/>
           </p:cNvSpPr>
@@ -2685,8 +2515,8 @@
         </p:nvSpPr>
         <p:spPr>
           <a:xfrm>
-            <a:off x="7157160" y="4106520"/>
-            <a:ext cx="4350240" cy="1801440"/>
+            <a:off x="6231960" y="3682080"/>
+            <a:ext cx="5354280" cy="1896840"/>
           </a:xfrm>
           <a:prstGeom prst="rect">
             <a:avLst/>
@@ -2697,11 +2527,8 @@
             <a:normAutofit/>
           </a:bodyPr>
           <a:p>
-            <a:endParaRPr b="0" lang="en-US" sz="1800" spc="-1" strike="noStrike">
-              <a:solidFill>
-                <a:srgbClr val="404040"/>
-              </a:solidFill>
-              <a:latin typeface="Century Gothic"/>
+            <a:endParaRPr b="0" lang="en-ZA" sz="3200" spc="-1" strike="noStrike">
+              <a:latin typeface="Arial"/>
             </a:endParaRPr>
           </a:p>
         </p:txBody>
@@ -2730,7 +2557,7 @@
       </p:grpSpPr>
       <p:sp>
         <p:nvSpPr>
-          <p:cNvPr id="50" name="PlaceHolder 1"/>
+          <p:cNvPr id="47" name="PlaceHolder 1"/>
           <p:cNvSpPr>
             <a:spLocks noGrp="1"/>
           </p:cNvSpPr>
@@ -2740,8 +2567,8 @@
         </p:nvSpPr>
         <p:spPr>
           <a:xfrm>
-            <a:off x="2593080" y="624240"/>
-            <a:ext cx="8911440" cy="1280520"/>
+            <a:off x="609480" y="273600"/>
+            <a:ext cx="10972440" cy="1144800"/>
           </a:xfrm>
           <a:prstGeom prst="rect">
             <a:avLst/>
@@ -2750,18 +2577,16 @@
         <p:txBody>
           <a:bodyPr lIns="0" rIns="0" tIns="0" bIns="0" anchor="ctr"/>
           <a:p>
-            <a:endParaRPr b="0" lang="en-US" sz="1800" spc="-1" strike="noStrike">
-              <a:solidFill>
-                <a:srgbClr val="000000"/>
-              </a:solidFill>
-              <a:latin typeface="Century Gothic"/>
+            <a:pPr algn="ctr"/>
+            <a:endParaRPr b="0" lang="en-ZA" sz="4400" spc="-1" strike="noStrike">
+              <a:latin typeface="Arial"/>
             </a:endParaRPr>
           </a:p>
         </p:txBody>
       </p:sp>
       <p:sp>
         <p:nvSpPr>
-          <p:cNvPr id="51" name="PlaceHolder 2"/>
+          <p:cNvPr id="48" name="PlaceHolder 2"/>
           <p:cNvSpPr>
             <a:spLocks noGrp="1"/>
           </p:cNvSpPr>
@@ -2771,8 +2596,8 @@
         </p:nvSpPr>
         <p:spPr>
           <a:xfrm>
-            <a:off x="2589120" y="2133720"/>
-            <a:ext cx="4350240" cy="1801440"/>
+            <a:off x="609480" y="1604520"/>
+            <a:ext cx="5354280" cy="1896840"/>
           </a:xfrm>
           <a:prstGeom prst="rect">
             <a:avLst/>
@@ -2783,18 +2608,15 @@
             <a:normAutofit/>
           </a:bodyPr>
           <a:p>
-            <a:endParaRPr b="0" lang="en-US" sz="1800" spc="-1" strike="noStrike">
-              <a:solidFill>
-                <a:srgbClr val="404040"/>
-              </a:solidFill>
-              <a:latin typeface="Century Gothic"/>
+            <a:endParaRPr b="0" lang="en-ZA" sz="3200" spc="-1" strike="noStrike">
+              <a:latin typeface="Arial"/>
             </a:endParaRPr>
           </a:p>
         </p:txBody>
       </p:sp>
       <p:sp>
         <p:nvSpPr>
-          <p:cNvPr id="52" name="PlaceHolder 3"/>
+          <p:cNvPr id="49" name="PlaceHolder 3"/>
           <p:cNvSpPr>
             <a:spLocks noGrp="1"/>
           </p:cNvSpPr>
@@ -2804,8 +2626,8 @@
         </p:nvSpPr>
         <p:spPr>
           <a:xfrm>
-            <a:off x="7157160" y="2133720"/>
-            <a:ext cx="4350240" cy="1801440"/>
+            <a:off x="6231960" y="1604520"/>
+            <a:ext cx="5354280" cy="1896840"/>
           </a:xfrm>
           <a:prstGeom prst="rect">
             <a:avLst/>
@@ -2816,18 +2638,15 @@
             <a:normAutofit/>
           </a:bodyPr>
           <a:p>
-            <a:endParaRPr b="0" lang="en-US" sz="1800" spc="-1" strike="noStrike">
-              <a:solidFill>
-                <a:srgbClr val="404040"/>
-              </a:solidFill>
-              <a:latin typeface="Century Gothic"/>
+            <a:endParaRPr b="0" lang="en-ZA" sz="3200" spc="-1" strike="noStrike">
+              <a:latin typeface="Arial"/>
             </a:endParaRPr>
           </a:p>
         </p:txBody>
       </p:sp>
       <p:sp>
         <p:nvSpPr>
-          <p:cNvPr id="53" name="PlaceHolder 4"/>
+          <p:cNvPr id="50" name="PlaceHolder 4"/>
           <p:cNvSpPr>
             <a:spLocks noGrp="1"/>
           </p:cNvSpPr>
@@ -2837,8 +2656,8 @@
         </p:nvSpPr>
         <p:spPr>
           <a:xfrm>
-            <a:off x="2589120" y="4106520"/>
-            <a:ext cx="8915040" cy="1801440"/>
+            <a:off x="609480" y="3682080"/>
+            <a:ext cx="10972440" cy="1896840"/>
           </a:xfrm>
           <a:prstGeom prst="rect">
             <a:avLst/>
@@ -2849,11 +2668,8 @@
             <a:normAutofit/>
           </a:bodyPr>
           <a:p>
-            <a:endParaRPr b="0" lang="en-US" sz="1800" spc="-1" strike="noStrike">
-              <a:solidFill>
-                <a:srgbClr val="404040"/>
-              </a:solidFill>
-              <a:latin typeface="Century Gothic"/>
+            <a:endParaRPr b="0" lang="en-ZA" sz="3200" spc="-1" strike="noStrike">
+              <a:latin typeface="Arial"/>
             </a:endParaRPr>
           </a:p>
         </p:txBody>
@@ -2889,9 +2705,9 @@
         <p:grpSpPr>
           <a:xfrm>
             <a:off x="0" y="228600"/>
-            <a:ext cx="2851200" cy="6638400"/>
+            <a:ext cx="2850840" cy="6638040"/>
             <a:chOff x="0" y="228600"/>
-            <a:chExt cx="2851200" cy="6638400"/>
+            <a:chExt cx="2850840" cy="6638040"/>
           </a:xfrm>
         </p:grpSpPr>
         <p:sp>
@@ -2903,7 +2719,7 @@
           <p:spPr>
             <a:xfrm>
               <a:off x="0" y="2575080"/>
-              <a:ext cx="100440" cy="625680"/>
+              <a:ext cx="100080" cy="625320"/>
             </a:xfrm>
             <a:custGeom>
               <a:avLst/>
@@ -2969,7 +2785,7 @@
           <p:spPr>
             <a:xfrm>
               <a:off x="128520" y="3156480"/>
-              <a:ext cx="646200" cy="2322000"/>
+              <a:ext cx="645840" cy="2321640"/>
             </a:xfrm>
             <a:custGeom>
               <a:avLst/>
@@ -3040,7 +2856,7 @@
           <p:spPr>
             <a:xfrm>
               <a:off x="807120" y="5447160"/>
-              <a:ext cx="609120" cy="1419840"/>
+              <a:ext cx="608760" cy="1419480"/>
             </a:xfrm>
             <a:custGeom>
               <a:avLst/>
@@ -3116,7 +2932,7 @@
           <p:spPr>
             <a:xfrm>
               <a:off x="959760" y="6503760"/>
-              <a:ext cx="171000" cy="363240"/>
+              <a:ext cx="170640" cy="362880"/>
             </a:xfrm>
             <a:custGeom>
               <a:avLst/>
@@ -3172,7 +2988,7 @@
           <p:spPr>
             <a:xfrm>
               <a:off x="100800" y="3201120"/>
-              <a:ext cx="821520" cy="3328200"/>
+              <a:ext cx="821160" cy="3327840"/>
             </a:xfrm>
             <a:custGeom>
               <a:avLst/>
@@ -3263,7 +3079,7 @@
           <p:spPr>
             <a:xfrm>
               <a:off x="22320" y="228600"/>
-              <a:ext cx="105840" cy="2927520"/>
+              <a:ext cx="105480" cy="2927160"/>
             </a:xfrm>
             <a:custGeom>
               <a:avLst/>
@@ -3349,7 +3165,7 @@
           <p:spPr>
             <a:xfrm>
               <a:off x="78120" y="2944080"/>
-              <a:ext cx="77760" cy="493560"/>
+              <a:ext cx="77400" cy="493200"/>
             </a:xfrm>
             <a:custGeom>
               <a:avLst/>
@@ -3415,7 +3231,7 @@
           <p:spPr>
             <a:xfrm>
               <a:off x="769680" y="5478840"/>
-              <a:ext cx="189720" cy="1024560"/>
+              <a:ext cx="189360" cy="1024200"/>
             </a:xfrm>
             <a:custGeom>
               <a:avLst/>
@@ -3501,7 +3317,7 @@
           <p:spPr>
             <a:xfrm>
               <a:off x="775440" y="1398960"/>
-              <a:ext cx="2075760" cy="4047840"/>
+              <a:ext cx="2075400" cy="4047480"/>
             </a:xfrm>
             <a:custGeom>
               <a:avLst/>
@@ -3622,7 +3438,7 @@
           <p:spPr>
             <a:xfrm>
               <a:off x="922680" y="6530040"/>
-              <a:ext cx="161640" cy="336960"/>
+              <a:ext cx="161280" cy="336600"/>
             </a:xfrm>
             <a:custGeom>
               <a:avLst/>
@@ -3678,7 +3494,7 @@
           <p:spPr>
             <a:xfrm>
               <a:off x="769680" y="5359320"/>
-              <a:ext cx="37080" cy="221400"/>
+              <a:ext cx="36720" cy="221040"/>
             </a:xfrm>
             <a:custGeom>
               <a:avLst/>
@@ -3744,7 +3560,7 @@
           <p:spPr>
             <a:xfrm>
               <a:off x="849960" y="6244560"/>
-              <a:ext cx="238320" cy="622080"/>
+              <a:ext cx="237960" cy="621720"/>
             </a:xfrm>
             <a:custGeom>
               <a:avLst/>
@@ -3821,9 +3637,9 @@
         <p:grpSpPr>
           <a:xfrm>
             <a:off x="27360" y="-720"/>
-            <a:ext cx="2356200" cy="6853680"/>
+            <a:ext cx="2355840" cy="6853320"/>
             <a:chOff x="27360" y="-720"/>
-            <a:chExt cx="2356200" cy="6853680"/>
+            <a:chExt cx="2355840" cy="6853320"/>
           </a:xfrm>
         </p:grpSpPr>
         <p:sp>
@@ -3835,7 +3651,7 @@
           <p:spPr>
             <a:xfrm>
               <a:off x="27360" y="-720"/>
-              <a:ext cx="493920" cy="4400640"/>
+              <a:ext cx="493560" cy="4400280"/>
             </a:xfrm>
             <a:custGeom>
               <a:avLst/>
@@ -3944,7 +3760,7 @@
           <p:spPr>
             <a:xfrm>
               <a:off x="550440" y="4316400"/>
-              <a:ext cx="423000" cy="1580400"/>
+              <a:ext cx="422640" cy="1580040"/>
             </a:xfrm>
             <a:custGeom>
               <a:avLst/>
@@ -4018,7 +3834,7 @@
           <p:spPr>
             <a:xfrm>
               <a:off x="1006200" y="5862600"/>
-              <a:ext cx="430560" cy="990360"/>
+              <a:ext cx="430200" cy="990000"/>
             </a:xfrm>
             <a:custGeom>
               <a:avLst/>
@@ -4092,7 +3908,7 @@
           <p:spPr>
             <a:xfrm>
               <a:off x="521640" y="4364280"/>
-              <a:ext cx="551520" cy="2235600"/>
+              <a:ext cx="551160" cy="2235240"/>
             </a:xfrm>
             <a:custGeom>
               <a:avLst/>
@@ -4181,7 +3997,7 @@
           <p:spPr>
             <a:xfrm>
               <a:off x="468000" y="1289160"/>
-              <a:ext cx="173880" cy="3026880"/>
+              <a:ext cx="173520" cy="3026520"/>
             </a:xfrm>
             <a:custGeom>
               <a:avLst/>
@@ -4280,7 +4096,7 @@
           <p:spPr>
             <a:xfrm>
               <a:off x="1111680" y="6571440"/>
-              <a:ext cx="133920" cy="281160"/>
+              <a:ext cx="133560" cy="280800"/>
             </a:xfrm>
             <a:custGeom>
               <a:avLst/>
@@ -4334,7 +4150,7 @@
           <p:spPr>
             <a:xfrm>
               <a:off x="502560" y="4107600"/>
-              <a:ext cx="82080" cy="511200"/>
+              <a:ext cx="81720" cy="510840"/>
             </a:xfrm>
             <a:custGeom>
               <a:avLst/>
@@ -4403,7 +4219,7 @@
           <p:spPr>
             <a:xfrm>
               <a:off x="973800" y="3145680"/>
-              <a:ext cx="1409760" cy="2716560"/>
+              <a:ext cx="1409400" cy="2716200"/>
             </a:xfrm>
             <a:custGeom>
               <a:avLst/>
@@ -4517,7 +4333,7 @@
           <p:spPr>
             <a:xfrm>
               <a:off x="1073520" y="6600240"/>
-              <a:ext cx="120240" cy="252720"/>
+              <a:ext cx="119880" cy="252360"/>
             </a:xfrm>
             <a:custGeom>
               <a:avLst/>
@@ -4571,7 +4387,7 @@
           <p:spPr>
             <a:xfrm>
               <a:off x="973800" y="5897160"/>
-              <a:ext cx="137520" cy="673920"/>
+              <a:ext cx="137160" cy="673560"/>
             </a:xfrm>
             <a:custGeom>
               <a:avLst/>
@@ -4645,7 +4461,7 @@
           <p:spPr>
             <a:xfrm>
               <a:off x="973800" y="5772600"/>
-              <a:ext cx="37800" cy="227520"/>
+              <a:ext cx="37440" cy="227160"/>
             </a:xfrm>
             <a:custGeom>
               <a:avLst/>
@@ -4714,7 +4530,7 @@
           <p:spPr>
             <a:xfrm>
               <a:off x="1006200" y="6322680"/>
-              <a:ext cx="210240" cy="530280"/>
+              <a:ext cx="209880" cy="529920"/>
             </a:xfrm>
             <a:custGeom>
               <a:avLst/>
@@ -4789,7 +4605,7 @@
         <p:spPr>
           <a:xfrm>
             <a:off x="0" y="0"/>
-            <a:ext cx="182520" cy="6857640"/>
+            <a:ext cx="182160" cy="6857280"/>
           </a:xfrm>
           <a:prstGeom prst="rect">
             <a:avLst/>
@@ -4823,131 +4639,14 @@
       </p:sp>
       <p:sp>
         <p:nvSpPr>
-          <p:cNvPr id="27" name="PlaceHolder 28"/>
-          <p:cNvSpPr>
-            <a:spLocks noGrp="1"/>
-          </p:cNvSpPr>
-          <p:nvPr>
-            <p:ph type="title"/>
-          </p:nvPr>
-        </p:nvSpPr>
-        <p:spPr>
-          <a:xfrm>
-            <a:off x="2589120" y="2514600"/>
-            <a:ext cx="8915040" cy="2262600"/>
-          </a:xfrm>
-          <a:prstGeom prst="rect">
-            <a:avLst/>
-          </a:prstGeom>
-        </p:spPr>
-        <p:txBody>
-          <a:bodyPr anchor="b">
-            <a:normAutofit/>
-          </a:bodyPr>
-          <a:p>
-            <a:pPr>
-              <a:lnSpc>
-                <a:spcPct val="100000"/>
-              </a:lnSpc>
-            </a:pPr>
-            <a:r>
-              <a:rPr b="0" lang="en-US" sz="5400" spc="-1" strike="noStrike">
-                <a:solidFill>
-                  <a:srgbClr val="262626"/>
-                </a:solidFill>
-                <a:latin typeface="Century Gothic"/>
-              </a:rPr>
-              <a:t>Click to edit Master title style</a:t>
-            </a:r>
-            <a:endParaRPr b="0" lang="en-US" sz="5400" spc="-1" strike="noStrike">
-              <a:solidFill>
-                <a:srgbClr val="000000"/>
-              </a:solidFill>
-              <a:latin typeface="Century Gothic"/>
-            </a:endParaRPr>
-          </a:p>
-        </p:txBody>
-      </p:sp>
-      <p:sp>
-        <p:nvSpPr>
-          <p:cNvPr id="28" name="PlaceHolder 29"/>
-          <p:cNvSpPr>
-            <a:spLocks noGrp="1"/>
-          </p:cNvSpPr>
-          <p:nvPr>
-            <p:ph type="dt"/>
-          </p:nvPr>
-        </p:nvSpPr>
-        <p:spPr>
-          <a:xfrm>
-            <a:off x="10361520" y="6130440"/>
-            <a:ext cx="1145880" cy="370080"/>
-          </a:xfrm>
-          <a:prstGeom prst="rect">
-            <a:avLst/>
-          </a:prstGeom>
-        </p:spPr>
-        <p:txBody>
-          <a:bodyPr anchor="ctr"/>
-          <a:p>
-            <a:pPr algn="r">
-              <a:lnSpc>
-                <a:spcPct val="100000"/>
-              </a:lnSpc>
-            </a:pPr>
-            <a:fld id="{7E2233C1-DD63-4A0B-A263-29DA1C5160FA}" type="datetime">
-              <a:rPr b="0" lang="en-ZA" sz="900" spc="-1" strike="noStrike">
-                <a:solidFill>
-                  <a:srgbClr val="8b8b8b"/>
-                </a:solidFill>
-                <a:latin typeface="Century Gothic"/>
-              </a:rPr>
-              <a:t>18/08/06</a:t>
-            </a:fld>
-            <a:endParaRPr b="0" lang="en-ZA" sz="900" spc="-1" strike="noStrike">
-              <a:latin typeface="Times New Roman"/>
-            </a:endParaRPr>
-          </a:p>
-        </p:txBody>
-      </p:sp>
-      <p:sp>
-        <p:nvSpPr>
-          <p:cNvPr id="29" name="PlaceHolder 30"/>
-          <p:cNvSpPr>
-            <a:spLocks noGrp="1"/>
-          </p:cNvSpPr>
-          <p:nvPr>
-            <p:ph type="ftr"/>
-          </p:nvPr>
-        </p:nvSpPr>
-        <p:spPr>
-          <a:xfrm>
-            <a:off x="2589120" y="6135840"/>
-            <a:ext cx="7619760" cy="364680"/>
-          </a:xfrm>
-          <a:prstGeom prst="rect">
-            <a:avLst/>
-          </a:prstGeom>
-        </p:spPr>
-        <p:txBody>
-          <a:bodyPr anchor="ctr"/>
-          <a:p>
-            <a:endParaRPr b="0" lang="en-ZA" sz="2400" spc="-1" strike="noStrike">
-              <a:latin typeface="Times New Roman"/>
-            </a:endParaRPr>
-          </a:p>
-        </p:txBody>
-      </p:sp>
-      <p:sp>
-        <p:nvSpPr>
-          <p:cNvPr id="30" name="CustomShape 31"/>
+          <p:cNvPr id="27" name="CustomShape 28"/>
           <p:cNvSpPr/>
           <p:nvPr/>
         </p:nvSpPr>
         <p:spPr>
           <a:xfrm>
             <a:off x="0" y="4323960"/>
-            <a:ext cx="1744200" cy="778320"/>
+            <a:ext cx="1743840" cy="777960"/>
           </a:xfrm>
           <a:custGeom>
             <a:avLst/>
@@ -5027,49 +4726,41 @@
       </p:sp>
       <p:sp>
         <p:nvSpPr>
-          <p:cNvPr id="31" name="PlaceHolder 32"/>
+          <p:cNvPr id="28" name="PlaceHolder 29"/>
           <p:cNvSpPr>
             <a:spLocks noGrp="1"/>
           </p:cNvSpPr>
           <p:nvPr>
-            <p:ph type="sldNum"/>
+            <p:ph type="title"/>
           </p:nvPr>
         </p:nvSpPr>
         <p:spPr>
           <a:xfrm>
-            <a:off x="531720" y="4529520"/>
-            <a:ext cx="779400" cy="364680"/>
+            <a:off x="2593080" y="624240"/>
+            <a:ext cx="8911080" cy="1280160"/>
           </a:xfrm>
           <a:prstGeom prst="rect">
             <a:avLst/>
           </a:prstGeom>
         </p:spPr>
         <p:txBody>
-          <a:bodyPr anchor="ctr"/>
-          <a:p>
-            <a:pPr algn="r">
-              <a:lnSpc>
-                <a:spcPct val="100000"/>
-              </a:lnSpc>
-            </a:pPr>
-            <a:fld id="{66326E6F-914C-46BB-9080-28E7DAF7ACBD}" type="slidenum">
-              <a:rPr b="0" lang="en-ZA" sz="2000" spc="-1" strike="noStrike">
-                <a:solidFill>
-                  <a:srgbClr val="feffff"/>
-                </a:solidFill>
-                <a:latin typeface="Century Gothic"/>
+          <a:bodyPr lIns="0" rIns="0" tIns="0" bIns="0" anchor="ctr"/>
+          <a:p>
+            <a:r>
+              <a:rPr b="0" lang="en-ZA" sz="1800" spc="-1" strike="noStrike">
+                <a:latin typeface="Arial"/>
               </a:rPr>
-              <a:t>&lt;number&gt;</a:t>
-            </a:fld>
-            <a:endParaRPr b="0" lang="en-ZA" sz="2000" spc="-1" strike="noStrike">
-              <a:latin typeface="Times New Roman"/>
+              <a:t>Click to edit the title text format</a:t>
+            </a:r>
+            <a:endParaRPr b="0" lang="en-ZA" sz="1800" spc="-1" strike="noStrike">
+              <a:latin typeface="Arial"/>
             </a:endParaRPr>
           </a:p>
         </p:txBody>
       </p:sp>
       <p:sp>
         <p:nvSpPr>
-          <p:cNvPr id="32" name="PlaceHolder 33"/>
+          <p:cNvPr id="29" name="PlaceHolder 30"/>
           <p:cNvSpPr>
             <a:spLocks noGrp="1"/>
           </p:cNvSpPr>
@@ -5103,19 +4794,13 @@
               <a:buChar char=""/>
             </a:pPr>
             <a:r>
-              <a:rPr b="0" lang="en-US" sz="1800" spc="-1" strike="noStrike">
-                <a:solidFill>
-                  <a:srgbClr val="404040"/>
-                </a:solidFill>
-                <a:latin typeface="Century Gothic"/>
+              <a:rPr b="0" lang="en-ZA" sz="3200" spc="-1" strike="noStrike">
+                <a:latin typeface="Arial"/>
               </a:rPr>
               <a:t>Click to edit the outline text format</a:t>
             </a:r>
-            <a:endParaRPr b="0" lang="en-US" sz="1800" spc="-1" strike="noStrike">
-              <a:solidFill>
-                <a:srgbClr val="404040"/>
-              </a:solidFill>
-              <a:latin typeface="Century Gothic"/>
+            <a:endParaRPr b="0" lang="en-ZA" sz="3200" spc="-1" strike="noStrike">
+              <a:latin typeface="Arial"/>
             </a:endParaRPr>
           </a:p>
           <a:p>
@@ -5131,19 +4816,13 @@
               <a:buChar char=""/>
             </a:pPr>
             <a:r>
-              <a:rPr b="0" lang="en-US" sz="1400" spc="-1" strike="noStrike">
-                <a:solidFill>
-                  <a:srgbClr val="404040"/>
-                </a:solidFill>
-                <a:latin typeface="Century Gothic"/>
+              <a:rPr b="0" lang="en-ZA" sz="2800" spc="-1" strike="noStrike">
+                <a:latin typeface="Arial"/>
               </a:rPr>
               <a:t>Second Outline Level</a:t>
             </a:r>
-            <a:endParaRPr b="0" lang="en-US" sz="1400" spc="-1" strike="noStrike">
-              <a:solidFill>
-                <a:srgbClr val="404040"/>
-              </a:solidFill>
-              <a:latin typeface="Century Gothic"/>
+            <a:endParaRPr b="0" lang="en-ZA" sz="2800" spc="-1" strike="noStrike">
+              <a:latin typeface="Arial"/>
             </a:endParaRPr>
           </a:p>
           <a:p>
@@ -5159,19 +4838,13 @@
               <a:buChar char=""/>
             </a:pPr>
             <a:r>
-              <a:rPr b="0" lang="en-US" sz="1200" spc="-1" strike="noStrike">
-                <a:solidFill>
-                  <a:srgbClr val="404040"/>
-                </a:solidFill>
-                <a:latin typeface="Century Gothic"/>
+              <a:rPr b="0" lang="en-ZA" sz="2400" spc="-1" strike="noStrike">
+                <a:latin typeface="Arial"/>
               </a:rPr>
               <a:t>Third Outline Level</a:t>
             </a:r>
-            <a:endParaRPr b="0" lang="en-US" sz="1200" spc="-1" strike="noStrike">
-              <a:solidFill>
-                <a:srgbClr val="404040"/>
-              </a:solidFill>
-              <a:latin typeface="Century Gothic"/>
+            <a:endParaRPr b="0" lang="en-ZA" sz="2400" spc="-1" strike="noStrike">
+              <a:latin typeface="Arial"/>
             </a:endParaRPr>
           </a:p>
           <a:p>
@@ -5187,19 +4860,13 @@
               <a:buChar char=""/>
             </a:pPr>
             <a:r>
-              <a:rPr b="0" lang="en-US" sz="1200" spc="-1" strike="noStrike">
-                <a:solidFill>
-                  <a:srgbClr val="404040"/>
-                </a:solidFill>
-                <a:latin typeface="Century Gothic"/>
+              <a:rPr b="0" lang="en-ZA" sz="2000" spc="-1" strike="noStrike">
+                <a:latin typeface="Arial"/>
               </a:rPr>
               <a:t>Fourth Outline Level</a:t>
             </a:r>
-            <a:endParaRPr b="0" lang="en-US" sz="1200" spc="-1" strike="noStrike">
-              <a:solidFill>
-                <a:srgbClr val="404040"/>
-              </a:solidFill>
-              <a:latin typeface="Century Gothic"/>
+            <a:endParaRPr b="0" lang="en-ZA" sz="2000" spc="-1" strike="noStrike">
+              <a:latin typeface="Arial"/>
             </a:endParaRPr>
           </a:p>
           <a:p>
@@ -5215,19 +4882,13 @@
               <a:buChar char=""/>
             </a:pPr>
             <a:r>
-              <a:rPr b="0" lang="en-US" sz="2000" spc="-1" strike="noStrike">
-                <a:solidFill>
-                  <a:srgbClr val="404040"/>
-                </a:solidFill>
-                <a:latin typeface="Century Gothic"/>
+              <a:rPr b="0" lang="en-ZA" sz="2000" spc="-1" strike="noStrike">
+                <a:latin typeface="Arial"/>
               </a:rPr>
               <a:t>Fifth Outline Level</a:t>
             </a:r>
-            <a:endParaRPr b="0" lang="en-US" sz="2000" spc="-1" strike="noStrike">
-              <a:solidFill>
-                <a:srgbClr val="404040"/>
-              </a:solidFill>
-              <a:latin typeface="Century Gothic"/>
+            <a:endParaRPr b="0" lang="en-ZA" sz="2000" spc="-1" strike="noStrike">
+              <a:latin typeface="Arial"/>
             </a:endParaRPr>
           </a:p>
           <a:p>
@@ -5243,19 +4904,13 @@
               <a:buChar char=""/>
             </a:pPr>
             <a:r>
-              <a:rPr b="0" lang="en-US" sz="2000" spc="-1" strike="noStrike">
-                <a:solidFill>
-                  <a:srgbClr val="404040"/>
-                </a:solidFill>
-                <a:latin typeface="Century Gothic"/>
+              <a:rPr b="0" lang="en-ZA" sz="2000" spc="-1" strike="noStrike">
+                <a:latin typeface="Arial"/>
               </a:rPr>
               <a:t>Sixth Outline Level</a:t>
             </a:r>
-            <a:endParaRPr b="0" lang="en-US" sz="2000" spc="-1" strike="noStrike">
-              <a:solidFill>
-                <a:srgbClr val="404040"/>
-              </a:solidFill>
-              <a:latin typeface="Century Gothic"/>
+            <a:endParaRPr b="0" lang="en-ZA" sz="2000" spc="-1" strike="noStrike">
+              <a:latin typeface="Arial"/>
             </a:endParaRPr>
           </a:p>
           <a:p>
@@ -5271,19 +4926,13 @@
               <a:buChar char=""/>
             </a:pPr>
             <a:r>
-              <a:rPr b="0" lang="en-US" sz="2000" spc="-1" strike="noStrike">
-                <a:solidFill>
-                  <a:srgbClr val="404040"/>
-                </a:solidFill>
-                <a:latin typeface="Century Gothic"/>
+              <a:rPr b="0" lang="en-ZA" sz="2000" spc="-1" strike="noStrike">
+                <a:latin typeface="Arial"/>
               </a:rPr>
               <a:t>Seventh Outline Level</a:t>
             </a:r>
-            <a:endParaRPr b="0" lang="en-US" sz="2000" spc="-1" strike="noStrike">
-              <a:solidFill>
-                <a:srgbClr val="404040"/>
-              </a:solidFill>
-              <a:latin typeface="Century Gothic"/>
+            <a:endParaRPr b="0" lang="en-ZA" sz="2000" spc="-1" strike="noStrike">
+              <a:latin typeface="Arial"/>
             </a:endParaRPr>
           </a:p>
         </p:txBody>
@@ -5327,28 +4976,28 @@
       </p:grpSpPr>
       <p:grpSp>
         <p:nvGrpSpPr>
-          <p:cNvPr id="69" name="Group 1"/>
+          <p:cNvPr id="66" name="Group 1"/>
           <p:cNvGrpSpPr/>
           <p:nvPr/>
         </p:nvGrpSpPr>
         <p:grpSpPr>
           <a:xfrm>
             <a:off x="0" y="228600"/>
-            <a:ext cx="2851200" cy="6638400"/>
+            <a:ext cx="2850840" cy="6638040"/>
             <a:chOff x="0" y="228600"/>
-            <a:chExt cx="2851200" cy="6638400"/>
+            <a:chExt cx="2850840" cy="6638040"/>
           </a:xfrm>
         </p:grpSpPr>
         <p:sp>
           <p:nvSpPr>
-            <p:cNvPr id="70" name="CustomShape 2"/>
+            <p:cNvPr id="67" name="CustomShape 2"/>
             <p:cNvSpPr/>
             <p:nvPr/>
           </p:nvSpPr>
           <p:spPr>
             <a:xfrm>
               <a:off x="0" y="2575080"/>
-              <a:ext cx="100440" cy="625680"/>
+              <a:ext cx="100080" cy="625320"/>
             </a:xfrm>
             <a:custGeom>
               <a:avLst/>
@@ -5407,14 +5056,14 @@
         </p:sp>
         <p:sp>
           <p:nvSpPr>
-            <p:cNvPr id="71" name="CustomShape 3"/>
+            <p:cNvPr id="68" name="CustomShape 3"/>
             <p:cNvSpPr/>
             <p:nvPr/>
           </p:nvSpPr>
           <p:spPr>
             <a:xfrm>
               <a:off x="128520" y="3156480"/>
-              <a:ext cx="646200" cy="2322000"/>
+              <a:ext cx="645840" cy="2321640"/>
             </a:xfrm>
             <a:custGeom>
               <a:avLst/>
@@ -5478,14 +5127,14 @@
         </p:sp>
         <p:sp>
           <p:nvSpPr>
-            <p:cNvPr id="72" name="CustomShape 4"/>
+            <p:cNvPr id="69" name="CustomShape 4"/>
             <p:cNvSpPr/>
             <p:nvPr/>
           </p:nvSpPr>
           <p:spPr>
             <a:xfrm>
               <a:off x="807120" y="5447160"/>
-              <a:ext cx="609120" cy="1419840"/>
+              <a:ext cx="608760" cy="1419480"/>
             </a:xfrm>
             <a:custGeom>
               <a:avLst/>
@@ -5554,14 +5203,14 @@
         </p:sp>
         <p:sp>
           <p:nvSpPr>
-            <p:cNvPr id="73" name="CustomShape 5"/>
+            <p:cNvPr id="70" name="CustomShape 5"/>
             <p:cNvSpPr/>
             <p:nvPr/>
           </p:nvSpPr>
           <p:spPr>
             <a:xfrm>
               <a:off x="959760" y="6503760"/>
-              <a:ext cx="171000" cy="363240"/>
+              <a:ext cx="170640" cy="362880"/>
             </a:xfrm>
             <a:custGeom>
               <a:avLst/>
@@ -5610,14 +5259,14 @@
         </p:sp>
         <p:sp>
           <p:nvSpPr>
-            <p:cNvPr id="74" name="CustomShape 6"/>
+            <p:cNvPr id="71" name="CustomShape 6"/>
             <p:cNvSpPr/>
             <p:nvPr/>
           </p:nvSpPr>
           <p:spPr>
             <a:xfrm>
               <a:off x="100800" y="3201120"/>
-              <a:ext cx="821520" cy="3328200"/>
+              <a:ext cx="821160" cy="3327840"/>
             </a:xfrm>
             <a:custGeom>
               <a:avLst/>
@@ -5701,14 +5350,14 @@
         </p:sp>
         <p:sp>
           <p:nvSpPr>
-            <p:cNvPr id="75" name="CustomShape 7"/>
+            <p:cNvPr id="72" name="CustomShape 7"/>
             <p:cNvSpPr/>
             <p:nvPr/>
           </p:nvSpPr>
           <p:spPr>
             <a:xfrm>
               <a:off x="22320" y="228600"/>
-              <a:ext cx="105840" cy="2927520"/>
+              <a:ext cx="105480" cy="2927160"/>
             </a:xfrm>
             <a:custGeom>
               <a:avLst/>
@@ -5787,14 +5436,14 @@
         </p:sp>
         <p:sp>
           <p:nvSpPr>
-            <p:cNvPr id="76" name="CustomShape 8"/>
+            <p:cNvPr id="73" name="CustomShape 8"/>
             <p:cNvSpPr/>
             <p:nvPr/>
           </p:nvSpPr>
           <p:spPr>
             <a:xfrm>
               <a:off x="78120" y="2944080"/>
-              <a:ext cx="77760" cy="493560"/>
+              <a:ext cx="77400" cy="493200"/>
             </a:xfrm>
             <a:custGeom>
               <a:avLst/>
@@ -5853,14 +5502,14 @@
         </p:sp>
         <p:sp>
           <p:nvSpPr>
-            <p:cNvPr id="77" name="CustomShape 9"/>
+            <p:cNvPr id="74" name="CustomShape 9"/>
             <p:cNvSpPr/>
             <p:nvPr/>
           </p:nvSpPr>
           <p:spPr>
             <a:xfrm>
               <a:off x="769680" y="5478840"/>
-              <a:ext cx="189720" cy="1024560"/>
+              <a:ext cx="189360" cy="1024200"/>
             </a:xfrm>
             <a:custGeom>
               <a:avLst/>
@@ -5939,14 +5588,14 @@
         </p:sp>
         <p:sp>
           <p:nvSpPr>
-            <p:cNvPr id="78" name="CustomShape 10"/>
+            <p:cNvPr id="75" name="CustomShape 10"/>
             <p:cNvSpPr/>
             <p:nvPr/>
           </p:nvSpPr>
           <p:spPr>
             <a:xfrm>
               <a:off x="775440" y="1398960"/>
-              <a:ext cx="2075760" cy="4047840"/>
+              <a:ext cx="2075400" cy="4047480"/>
             </a:xfrm>
             <a:custGeom>
               <a:avLst/>
@@ -6060,14 +5709,14 @@
         </p:sp>
         <p:sp>
           <p:nvSpPr>
-            <p:cNvPr id="79" name="CustomShape 11"/>
+            <p:cNvPr id="76" name="CustomShape 11"/>
             <p:cNvSpPr/>
             <p:nvPr/>
           </p:nvSpPr>
           <p:spPr>
             <a:xfrm>
               <a:off x="922680" y="6530040"/>
-              <a:ext cx="161640" cy="336960"/>
+              <a:ext cx="161280" cy="336600"/>
             </a:xfrm>
             <a:custGeom>
               <a:avLst/>
@@ -6116,14 +5765,14 @@
         </p:sp>
         <p:sp>
           <p:nvSpPr>
-            <p:cNvPr id="80" name="CustomShape 12"/>
+            <p:cNvPr id="77" name="CustomShape 12"/>
             <p:cNvSpPr/>
             <p:nvPr/>
           </p:nvSpPr>
           <p:spPr>
             <a:xfrm>
               <a:off x="769680" y="5359320"/>
-              <a:ext cx="37080" cy="221400"/>
+              <a:ext cx="36720" cy="221040"/>
             </a:xfrm>
             <a:custGeom>
               <a:avLst/>
@@ -6182,14 +5831,14 @@
         </p:sp>
         <p:sp>
           <p:nvSpPr>
-            <p:cNvPr id="81" name="CustomShape 13"/>
+            <p:cNvPr id="78" name="CustomShape 13"/>
             <p:cNvSpPr/>
             <p:nvPr/>
           </p:nvSpPr>
           <p:spPr>
             <a:xfrm>
               <a:off x="849960" y="6244560"/>
-              <a:ext cx="238320" cy="622080"/>
+              <a:ext cx="237960" cy="621720"/>
             </a:xfrm>
             <a:custGeom>
               <a:avLst/>
@@ -6259,28 +5908,28 @@
       </p:grpSp>
       <p:grpSp>
         <p:nvGrpSpPr>
-          <p:cNvPr id="82" name="Group 14"/>
+          <p:cNvPr id="79" name="Group 14"/>
           <p:cNvGrpSpPr/>
           <p:nvPr/>
         </p:nvGrpSpPr>
         <p:grpSpPr>
           <a:xfrm>
             <a:off x="27360" y="-720"/>
-            <a:ext cx="2356200" cy="6853680"/>
+            <a:ext cx="2355840" cy="6853320"/>
             <a:chOff x="27360" y="-720"/>
-            <a:chExt cx="2356200" cy="6853680"/>
+            <a:chExt cx="2355840" cy="6853320"/>
           </a:xfrm>
         </p:grpSpPr>
         <p:sp>
           <p:nvSpPr>
-            <p:cNvPr id="83" name="CustomShape 15"/>
+            <p:cNvPr id="80" name="CustomShape 15"/>
             <p:cNvSpPr/>
             <p:nvPr/>
           </p:nvSpPr>
           <p:spPr>
             <a:xfrm>
               <a:off x="27360" y="-720"/>
-              <a:ext cx="493920" cy="4400640"/>
+              <a:ext cx="493560" cy="4400280"/>
             </a:xfrm>
             <a:custGeom>
               <a:avLst/>
@@ -6382,14 +6031,14 @@
         </p:sp>
         <p:sp>
           <p:nvSpPr>
-            <p:cNvPr id="84" name="CustomShape 16"/>
+            <p:cNvPr id="81" name="CustomShape 16"/>
             <p:cNvSpPr/>
             <p:nvPr/>
           </p:nvSpPr>
           <p:spPr>
             <a:xfrm>
               <a:off x="550440" y="4316400"/>
-              <a:ext cx="423000" cy="1580400"/>
+              <a:ext cx="422640" cy="1580040"/>
             </a:xfrm>
             <a:custGeom>
               <a:avLst/>
@@ -6456,14 +6105,14 @@
         </p:sp>
         <p:sp>
           <p:nvSpPr>
-            <p:cNvPr id="85" name="CustomShape 17"/>
+            <p:cNvPr id="82" name="CustomShape 17"/>
             <p:cNvSpPr/>
             <p:nvPr/>
           </p:nvSpPr>
           <p:spPr>
             <a:xfrm>
               <a:off x="1006200" y="5862600"/>
-              <a:ext cx="430560" cy="990360"/>
+              <a:ext cx="430200" cy="990000"/>
             </a:xfrm>
             <a:custGeom>
               <a:avLst/>
@@ -6530,14 +6179,14 @@
         </p:sp>
         <p:sp>
           <p:nvSpPr>
-            <p:cNvPr id="86" name="CustomShape 18"/>
+            <p:cNvPr id="83" name="CustomShape 18"/>
             <p:cNvSpPr/>
             <p:nvPr/>
           </p:nvSpPr>
           <p:spPr>
             <a:xfrm>
               <a:off x="521640" y="4364280"/>
-              <a:ext cx="551520" cy="2235600"/>
+              <a:ext cx="551160" cy="2235240"/>
             </a:xfrm>
             <a:custGeom>
               <a:avLst/>
@@ -6619,14 +6268,14 @@
         </p:sp>
         <p:sp>
           <p:nvSpPr>
-            <p:cNvPr id="87" name="CustomShape 19"/>
+            <p:cNvPr id="84" name="CustomShape 19"/>
             <p:cNvSpPr/>
             <p:nvPr/>
           </p:nvSpPr>
           <p:spPr>
             <a:xfrm>
               <a:off x="468000" y="1289160"/>
-              <a:ext cx="173880" cy="3026880"/>
+              <a:ext cx="173520" cy="3026520"/>
             </a:xfrm>
             <a:custGeom>
               <a:avLst/>
@@ -6718,14 +6367,14 @@
         </p:sp>
         <p:sp>
           <p:nvSpPr>
-            <p:cNvPr id="88" name="CustomShape 20"/>
+            <p:cNvPr id="85" name="CustomShape 20"/>
             <p:cNvSpPr/>
             <p:nvPr/>
           </p:nvSpPr>
           <p:spPr>
             <a:xfrm>
               <a:off x="1111680" y="6571440"/>
-              <a:ext cx="133920" cy="281160"/>
+              <a:ext cx="133560" cy="280800"/>
             </a:xfrm>
             <a:custGeom>
               <a:avLst/>
@@ -6772,14 +6421,14 @@
         </p:sp>
         <p:sp>
           <p:nvSpPr>
-            <p:cNvPr id="89" name="CustomShape 21"/>
+            <p:cNvPr id="86" name="CustomShape 21"/>
             <p:cNvSpPr/>
             <p:nvPr/>
           </p:nvSpPr>
           <p:spPr>
             <a:xfrm>
               <a:off x="502560" y="4107600"/>
-              <a:ext cx="82080" cy="511200"/>
+              <a:ext cx="81720" cy="510840"/>
             </a:xfrm>
             <a:custGeom>
               <a:avLst/>
@@ -6841,14 +6490,14 @@
         </p:sp>
         <p:sp>
           <p:nvSpPr>
-            <p:cNvPr id="90" name="CustomShape 22"/>
+            <p:cNvPr id="87" name="CustomShape 22"/>
             <p:cNvSpPr/>
             <p:nvPr/>
           </p:nvSpPr>
           <p:spPr>
             <a:xfrm>
               <a:off x="973800" y="3145680"/>
-              <a:ext cx="1409760" cy="2716560"/>
+              <a:ext cx="1409400" cy="2716200"/>
             </a:xfrm>
             <a:custGeom>
               <a:avLst/>
@@ -6955,14 +6604,14 @@
         </p:sp>
         <p:sp>
           <p:nvSpPr>
-            <p:cNvPr id="91" name="CustomShape 23"/>
+            <p:cNvPr id="88" name="CustomShape 23"/>
             <p:cNvSpPr/>
             <p:nvPr/>
           </p:nvSpPr>
           <p:spPr>
             <a:xfrm>
               <a:off x="1073520" y="6600240"/>
-              <a:ext cx="120240" cy="252720"/>
+              <a:ext cx="119880" cy="252360"/>
             </a:xfrm>
             <a:custGeom>
               <a:avLst/>
@@ -7009,14 +6658,14 @@
         </p:sp>
         <p:sp>
           <p:nvSpPr>
-            <p:cNvPr id="92" name="CustomShape 24"/>
+            <p:cNvPr id="89" name="CustomShape 24"/>
             <p:cNvSpPr/>
             <p:nvPr/>
           </p:nvSpPr>
           <p:spPr>
             <a:xfrm>
               <a:off x="973800" y="5897160"/>
-              <a:ext cx="137520" cy="673920"/>
+              <a:ext cx="137160" cy="673560"/>
             </a:xfrm>
             <a:custGeom>
               <a:avLst/>
@@ -7083,14 +6732,14 @@
         </p:sp>
         <p:sp>
           <p:nvSpPr>
-            <p:cNvPr id="93" name="CustomShape 25"/>
+            <p:cNvPr id="90" name="CustomShape 25"/>
             <p:cNvSpPr/>
             <p:nvPr/>
           </p:nvSpPr>
           <p:spPr>
             <a:xfrm>
               <a:off x="973800" y="5772600"/>
-              <a:ext cx="37800" cy="227520"/>
+              <a:ext cx="37440" cy="227160"/>
             </a:xfrm>
             <a:custGeom>
               <a:avLst/>
@@ -7152,14 +6801,14 @@
         </p:sp>
         <p:sp>
           <p:nvSpPr>
-            <p:cNvPr id="94" name="CustomShape 26"/>
+            <p:cNvPr id="91" name="CustomShape 26"/>
             <p:cNvSpPr/>
             <p:nvPr/>
           </p:nvSpPr>
           <p:spPr>
             <a:xfrm>
               <a:off x="1006200" y="6322680"/>
-              <a:ext cx="210240" cy="530280"/>
+              <a:ext cx="209880" cy="529920"/>
             </a:xfrm>
             <a:custGeom>
               <a:avLst/>
@@ -7227,14 +6876,14 @@
       </p:grpSp>
       <p:sp>
         <p:nvSpPr>
-          <p:cNvPr id="95" name="CustomShape 27"/>
+          <p:cNvPr id="92" name="CustomShape 27"/>
           <p:cNvSpPr/>
           <p:nvPr/>
         </p:nvSpPr>
         <p:spPr>
           <a:xfrm>
             <a:off x="0" y="0"/>
-            <a:ext cx="182520" cy="6857640"/>
+            <a:ext cx="182160" cy="6857280"/>
           </a:xfrm>
           <a:prstGeom prst="rect">
             <a:avLst/>
@@ -7268,302 +6917,14 @@
       </p:sp>
       <p:sp>
         <p:nvSpPr>
-          <p:cNvPr id="96" name="PlaceHolder 28"/>
-          <p:cNvSpPr>
-            <a:spLocks noGrp="1"/>
-          </p:cNvSpPr>
-          <p:nvPr>
-            <p:ph type="title"/>
-          </p:nvPr>
-        </p:nvSpPr>
-        <p:spPr>
-          <a:xfrm>
-            <a:off x="2593080" y="624240"/>
-            <a:ext cx="8911440" cy="1280520"/>
-          </a:xfrm>
-          <a:prstGeom prst="rect">
-            <a:avLst/>
-          </a:prstGeom>
-        </p:spPr>
-        <p:txBody>
-          <a:bodyPr/>
-          <a:p>
-            <a:pPr>
-              <a:lnSpc>
-                <a:spcPct val="100000"/>
-              </a:lnSpc>
-            </a:pPr>
-            <a:r>
-              <a:rPr b="0" lang="en-US" sz="3600" spc="-1" strike="noStrike">
-                <a:solidFill>
-                  <a:srgbClr val="262626"/>
-                </a:solidFill>
-                <a:latin typeface="Century Gothic"/>
-              </a:rPr>
-              <a:t>Click to edit Master title style</a:t>
-            </a:r>
-            <a:endParaRPr b="0" lang="en-US" sz="3600" spc="-1" strike="noStrike">
-              <a:solidFill>
-                <a:srgbClr val="000000"/>
-              </a:solidFill>
-              <a:latin typeface="Century Gothic"/>
-            </a:endParaRPr>
-          </a:p>
-        </p:txBody>
-      </p:sp>
-      <p:sp>
-        <p:nvSpPr>
-          <p:cNvPr id="97" name="PlaceHolder 29"/>
-          <p:cNvSpPr>
-            <a:spLocks noGrp="1"/>
-          </p:cNvSpPr>
-          <p:nvPr>
-            <p:ph type="body"/>
-          </p:nvPr>
-        </p:nvSpPr>
-        <p:spPr>
-          <a:xfrm>
-            <a:off x="2589120" y="2133720"/>
-            <a:ext cx="8915040" cy="3777120"/>
-          </a:xfrm>
-          <a:prstGeom prst="rect">
-            <a:avLst/>
-          </a:prstGeom>
-        </p:spPr>
-        <p:txBody>
-          <a:bodyPr/>
-          <a:p>
-            <a:pPr marL="343080" indent="-342720">
-              <a:lnSpc>
-                <a:spcPct val="100000"/>
-              </a:lnSpc>
-              <a:spcBef>
-                <a:spcPts val="1001"/>
-              </a:spcBef>
-              <a:buClr>
-                <a:srgbClr val="dddddd"/>
-              </a:buClr>
-              <a:buFont typeface="Wingdings 3" charset="2"/>
-              <a:buChar char=""/>
-            </a:pPr>
-            <a:r>
-              <a:rPr b="0" lang="en-US" sz="1800" spc="-1" strike="noStrike">
-                <a:solidFill>
-                  <a:srgbClr val="404040"/>
-                </a:solidFill>
-                <a:latin typeface="Century Gothic"/>
-              </a:rPr>
-              <a:t>Click to edit Master text styles</a:t>
-            </a:r>
-            <a:endParaRPr b="0" lang="en-US" sz="1800" spc="-1" strike="noStrike">
-              <a:solidFill>
-                <a:srgbClr val="404040"/>
-              </a:solidFill>
-              <a:latin typeface="Century Gothic"/>
-            </a:endParaRPr>
-          </a:p>
-          <a:p>
-            <a:pPr lvl="1" marL="743040" indent="-285480">
-              <a:lnSpc>
-                <a:spcPct val="100000"/>
-              </a:lnSpc>
-              <a:spcBef>
-                <a:spcPts val="1001"/>
-              </a:spcBef>
-              <a:buClr>
-                <a:srgbClr val="dddddd"/>
-              </a:buClr>
-              <a:buFont typeface="Wingdings 3" charset="2"/>
-              <a:buChar char=""/>
-            </a:pPr>
-            <a:r>
-              <a:rPr b="0" lang="en-US" sz="1600" spc="-1" strike="noStrike">
-                <a:solidFill>
-                  <a:srgbClr val="404040"/>
-                </a:solidFill>
-                <a:latin typeface="Century Gothic"/>
-              </a:rPr>
-              <a:t>Second level</a:t>
-            </a:r>
-            <a:endParaRPr b="0" lang="en-US" sz="1600" spc="-1" strike="noStrike">
-              <a:solidFill>
-                <a:srgbClr val="404040"/>
-              </a:solidFill>
-              <a:latin typeface="Century Gothic"/>
-            </a:endParaRPr>
-          </a:p>
-          <a:p>
-            <a:pPr lvl="2" marL="1143000" indent="-228240">
-              <a:lnSpc>
-                <a:spcPct val="100000"/>
-              </a:lnSpc>
-              <a:spcBef>
-                <a:spcPts val="1001"/>
-              </a:spcBef>
-              <a:buClr>
-                <a:srgbClr val="dddddd"/>
-              </a:buClr>
-              <a:buFont typeface="Wingdings 3" charset="2"/>
-              <a:buChar char=""/>
-            </a:pPr>
-            <a:r>
-              <a:rPr b="0" lang="en-US" sz="1400" spc="-1" strike="noStrike">
-                <a:solidFill>
-                  <a:srgbClr val="404040"/>
-                </a:solidFill>
-                <a:latin typeface="Century Gothic"/>
-              </a:rPr>
-              <a:t>Third level</a:t>
-            </a:r>
-            <a:endParaRPr b="0" lang="en-US" sz="1400" spc="-1" strike="noStrike">
-              <a:solidFill>
-                <a:srgbClr val="404040"/>
-              </a:solidFill>
-              <a:latin typeface="Century Gothic"/>
-            </a:endParaRPr>
-          </a:p>
-          <a:p>
-            <a:pPr lvl="3" marL="1600200" indent="-228240">
-              <a:lnSpc>
-                <a:spcPct val="100000"/>
-              </a:lnSpc>
-              <a:spcBef>
-                <a:spcPts val="1001"/>
-              </a:spcBef>
-              <a:buClr>
-                <a:srgbClr val="dddddd"/>
-              </a:buClr>
-              <a:buFont typeface="Wingdings 3" charset="2"/>
-              <a:buChar char=""/>
-            </a:pPr>
-            <a:r>
-              <a:rPr b="0" lang="en-US" sz="1200" spc="-1" strike="noStrike">
-                <a:solidFill>
-                  <a:srgbClr val="404040"/>
-                </a:solidFill>
-                <a:latin typeface="Century Gothic"/>
-              </a:rPr>
-              <a:t>Fourth level</a:t>
-            </a:r>
-            <a:endParaRPr b="0" lang="en-US" sz="1200" spc="-1" strike="noStrike">
-              <a:solidFill>
-                <a:srgbClr val="404040"/>
-              </a:solidFill>
-              <a:latin typeface="Century Gothic"/>
-            </a:endParaRPr>
-          </a:p>
-          <a:p>
-            <a:pPr lvl="4" marL="2057400" indent="-228240">
-              <a:lnSpc>
-                <a:spcPct val="100000"/>
-              </a:lnSpc>
-              <a:spcBef>
-                <a:spcPts val="1001"/>
-              </a:spcBef>
-              <a:buClr>
-                <a:srgbClr val="dddddd"/>
-              </a:buClr>
-              <a:buFont typeface="Wingdings 3" charset="2"/>
-              <a:buChar char=""/>
-            </a:pPr>
-            <a:r>
-              <a:rPr b="0" lang="en-US" sz="1200" spc="-1" strike="noStrike">
-                <a:solidFill>
-                  <a:srgbClr val="404040"/>
-                </a:solidFill>
-                <a:latin typeface="Century Gothic"/>
-              </a:rPr>
-              <a:t>Fifth level</a:t>
-            </a:r>
-            <a:endParaRPr b="0" lang="en-US" sz="1200" spc="-1" strike="noStrike">
-              <a:solidFill>
-                <a:srgbClr val="404040"/>
-              </a:solidFill>
-              <a:latin typeface="Century Gothic"/>
-            </a:endParaRPr>
-          </a:p>
-        </p:txBody>
-      </p:sp>
-      <p:sp>
-        <p:nvSpPr>
-          <p:cNvPr id="98" name="PlaceHolder 30"/>
-          <p:cNvSpPr>
-            <a:spLocks noGrp="1"/>
-          </p:cNvSpPr>
-          <p:nvPr>
-            <p:ph type="dt"/>
-          </p:nvPr>
-        </p:nvSpPr>
-        <p:spPr>
-          <a:xfrm>
-            <a:off x="10361520" y="6130440"/>
-            <a:ext cx="1145880" cy="370080"/>
-          </a:xfrm>
-          <a:prstGeom prst="rect">
-            <a:avLst/>
-          </a:prstGeom>
-        </p:spPr>
-        <p:txBody>
-          <a:bodyPr anchor="ctr"/>
-          <a:p>
-            <a:pPr algn="r">
-              <a:lnSpc>
-                <a:spcPct val="100000"/>
-              </a:lnSpc>
-            </a:pPr>
-            <a:fld id="{3AD66B45-6786-45D4-A437-FC02413AA745}" type="datetime">
-              <a:rPr b="0" lang="en-ZA" sz="900" spc="-1" strike="noStrike">
-                <a:solidFill>
-                  <a:srgbClr val="8b8b8b"/>
-                </a:solidFill>
-                <a:latin typeface="Century Gothic"/>
-              </a:rPr>
-              <a:t>18/08/06</a:t>
-            </a:fld>
-            <a:endParaRPr b="0" lang="en-ZA" sz="900" spc="-1" strike="noStrike">
-              <a:latin typeface="Times New Roman"/>
-            </a:endParaRPr>
-          </a:p>
-        </p:txBody>
-      </p:sp>
-      <p:sp>
-        <p:nvSpPr>
-          <p:cNvPr id="99" name="PlaceHolder 31"/>
-          <p:cNvSpPr>
-            <a:spLocks noGrp="1"/>
-          </p:cNvSpPr>
-          <p:nvPr>
-            <p:ph type="ftr"/>
-          </p:nvPr>
-        </p:nvSpPr>
-        <p:spPr>
-          <a:xfrm>
-            <a:off x="2589120" y="6135840"/>
-            <a:ext cx="7619760" cy="364680"/>
-          </a:xfrm>
-          <a:prstGeom prst="rect">
-            <a:avLst/>
-          </a:prstGeom>
-        </p:spPr>
-        <p:txBody>
-          <a:bodyPr anchor="ctr"/>
-          <a:p>
-            <a:endParaRPr b="0" lang="en-ZA" sz="2400" spc="-1" strike="noStrike">
-              <a:latin typeface="Times New Roman"/>
-            </a:endParaRPr>
-          </a:p>
-        </p:txBody>
-      </p:sp>
-      <p:sp>
-        <p:nvSpPr>
-          <p:cNvPr id="100" name="CustomShape 32"/>
+          <p:cNvPr id="93" name="CustomShape 28"/>
           <p:cNvSpPr/>
           <p:nvPr/>
         </p:nvSpPr>
         <p:spPr>
           <a:xfrm flipV="1">
-            <a:off x="-4320" y="207360"/>
-            <a:ext cx="1588320" cy="506880"/>
+            <a:off x="-4320" y="-299880"/>
+            <a:ext cx="1587960" cy="506520"/>
           </a:xfrm>
           <a:custGeom>
             <a:avLst/>
@@ -7643,42 +7004,214 @@
       </p:sp>
       <p:sp>
         <p:nvSpPr>
-          <p:cNvPr id="101" name="PlaceHolder 33"/>
+          <p:cNvPr id="94" name="PlaceHolder 29"/>
           <p:cNvSpPr>
             <a:spLocks noGrp="1"/>
           </p:cNvSpPr>
           <p:nvPr>
-            <p:ph type="sldNum"/>
+            <p:ph type="title"/>
           </p:nvPr>
         </p:nvSpPr>
         <p:spPr>
           <a:xfrm>
-            <a:off x="531720" y="787680"/>
-            <a:ext cx="779400" cy="364680"/>
+            <a:off x="609480" y="273600"/>
+            <a:ext cx="10972440" cy="1144800"/>
           </a:xfrm>
           <a:prstGeom prst="rect">
             <a:avLst/>
           </a:prstGeom>
         </p:spPr>
         <p:txBody>
-          <a:bodyPr anchor="ctr"/>
-          <a:p>
-            <a:pPr algn="r">
-              <a:lnSpc>
-                <a:spcPct val="100000"/>
-              </a:lnSpc>
+          <a:bodyPr lIns="0" rIns="0" tIns="0" bIns="0" anchor="ctr"/>
+          <a:p>
+            <a:pPr algn="ctr"/>
+            <a:r>
+              <a:rPr b="0" lang="en-ZA" sz="4400" spc="-1" strike="noStrike">
+                <a:latin typeface="Arial"/>
+              </a:rPr>
+              <a:t>Click to edit the title text format</a:t>
+            </a:r>
+            <a:endParaRPr b="0" lang="en-ZA" sz="4400" spc="-1" strike="noStrike">
+              <a:latin typeface="Arial"/>
+            </a:endParaRPr>
+          </a:p>
+        </p:txBody>
+      </p:sp>
+      <p:sp>
+        <p:nvSpPr>
+          <p:cNvPr id="95" name="PlaceHolder 30"/>
+          <p:cNvSpPr>
+            <a:spLocks noGrp="1"/>
+          </p:cNvSpPr>
+          <p:nvPr>
+            <p:ph type="body"/>
+          </p:nvPr>
+        </p:nvSpPr>
+        <p:spPr>
+          <a:xfrm>
+            <a:off x="609480" y="1604520"/>
+            <a:ext cx="10972440" cy="3977280"/>
+          </a:xfrm>
+          <a:prstGeom prst="rect">
+            <a:avLst/>
+          </a:prstGeom>
+        </p:spPr>
+        <p:txBody>
+          <a:bodyPr lIns="0" rIns="0" tIns="0" bIns="0">
+            <a:normAutofit/>
+          </a:bodyPr>
+          <a:p>
+            <a:pPr marL="432000" indent="-324000">
+              <a:spcBef>
+                <a:spcPts val="1417"/>
+              </a:spcBef>
+              <a:buClr>
+                <a:srgbClr val="000000"/>
+              </a:buClr>
+              <a:buSzPct val="45000"/>
+              <a:buFont typeface="Wingdings" charset="2"/>
+              <a:buChar char=""/>
             </a:pPr>
-            <a:fld id="{D40CC35C-9FA0-4DD0-A6B3-939B047AAD2F}" type="slidenum">
+            <a:r>
+              <a:rPr b="0" lang="en-ZA" sz="3200" spc="-1" strike="noStrike">
+                <a:latin typeface="Arial"/>
+              </a:rPr>
+              <a:t>Click to edit the outline text format</a:t>
+            </a:r>
+            <a:endParaRPr b="0" lang="en-ZA" sz="3200" spc="-1" strike="noStrike">
+              <a:latin typeface="Arial"/>
+            </a:endParaRPr>
+          </a:p>
+          <a:p>
+            <a:pPr lvl="1" marL="864000" indent="-324000">
+              <a:spcBef>
+                <a:spcPts val="1134"/>
+              </a:spcBef>
+              <a:buClr>
+                <a:srgbClr val="000000"/>
+              </a:buClr>
+              <a:buSzPct val="75000"/>
+              <a:buFont typeface="Symbol" charset="2"/>
+              <a:buChar char=""/>
+            </a:pPr>
+            <a:r>
+              <a:rPr b="0" lang="en-ZA" sz="2800" spc="-1" strike="noStrike">
+                <a:latin typeface="Arial"/>
+              </a:rPr>
+              <a:t>Second Outline Level</a:t>
+            </a:r>
+            <a:endParaRPr b="0" lang="en-ZA" sz="2800" spc="-1" strike="noStrike">
+              <a:latin typeface="Arial"/>
+            </a:endParaRPr>
+          </a:p>
+          <a:p>
+            <a:pPr lvl="2" marL="1296000" indent="-288000">
+              <a:spcBef>
+                <a:spcPts val="850"/>
+              </a:spcBef>
+              <a:buClr>
+                <a:srgbClr val="000000"/>
+              </a:buClr>
+              <a:buSzPct val="45000"/>
+              <a:buFont typeface="Wingdings" charset="2"/>
+              <a:buChar char=""/>
+            </a:pPr>
+            <a:r>
+              <a:rPr b="0" lang="en-ZA" sz="2400" spc="-1" strike="noStrike">
+                <a:latin typeface="Arial"/>
+              </a:rPr>
+              <a:t>Third Outline Level</a:t>
+            </a:r>
+            <a:endParaRPr b="0" lang="en-ZA" sz="2400" spc="-1" strike="noStrike">
+              <a:latin typeface="Arial"/>
+            </a:endParaRPr>
+          </a:p>
+          <a:p>
+            <a:pPr lvl="3" marL="1728000" indent="-216000">
+              <a:spcBef>
+                <a:spcPts val="567"/>
+              </a:spcBef>
+              <a:buClr>
+                <a:srgbClr val="000000"/>
+              </a:buClr>
+              <a:buSzPct val="75000"/>
+              <a:buFont typeface="Symbol" charset="2"/>
+              <a:buChar char=""/>
+            </a:pPr>
+            <a:r>
               <a:rPr b="0" lang="en-ZA" sz="2000" spc="-1" strike="noStrike">
-                <a:solidFill>
-                  <a:srgbClr val="feffff"/>
-                </a:solidFill>
-                <a:latin typeface="Century Gothic"/>
+                <a:latin typeface="Arial"/>
               </a:rPr>
-              <a:t>1</a:t>
-            </a:fld>
+              <a:t>Fourth Outline Level</a:t>
+            </a:r>
             <a:endParaRPr b="0" lang="en-ZA" sz="2000" spc="-1" strike="noStrike">
-              <a:latin typeface="Times New Roman"/>
+              <a:latin typeface="Arial"/>
+            </a:endParaRPr>
+          </a:p>
+          <a:p>
+            <a:pPr lvl="4" marL="2160000" indent="-216000">
+              <a:spcBef>
+                <a:spcPts val="283"/>
+              </a:spcBef>
+              <a:buClr>
+                <a:srgbClr val="000000"/>
+              </a:buClr>
+              <a:buSzPct val="45000"/>
+              <a:buFont typeface="Wingdings" charset="2"/>
+              <a:buChar char=""/>
+            </a:pPr>
+            <a:r>
+              <a:rPr b="0" lang="en-ZA" sz="2000" spc="-1" strike="noStrike">
+                <a:latin typeface="Arial"/>
+              </a:rPr>
+              <a:t>Fifth Outline Level</a:t>
+            </a:r>
+            <a:endParaRPr b="0" lang="en-ZA" sz="2000" spc="-1" strike="noStrike">
+              <a:latin typeface="Arial"/>
+            </a:endParaRPr>
+          </a:p>
+          <a:p>
+            <a:pPr lvl="5" marL="2592000" indent="-216000">
+              <a:spcBef>
+                <a:spcPts val="283"/>
+              </a:spcBef>
+              <a:buClr>
+                <a:srgbClr val="000000"/>
+              </a:buClr>
+              <a:buSzPct val="45000"/>
+              <a:buFont typeface="Wingdings" charset="2"/>
+              <a:buChar char=""/>
+            </a:pPr>
+            <a:r>
+              <a:rPr b="0" lang="en-ZA" sz="2000" spc="-1" strike="noStrike">
+                <a:latin typeface="Arial"/>
+              </a:rPr>
+              <a:t>Sixth Outline Level</a:t>
+            </a:r>
+            <a:endParaRPr b="0" lang="en-ZA" sz="2000" spc="-1" strike="noStrike">
+              <a:latin typeface="Arial"/>
+            </a:endParaRPr>
+          </a:p>
+          <a:p>
+            <a:pPr lvl="6" marL="3024000" indent="-216000">
+              <a:spcBef>
+                <a:spcPts val="283"/>
+              </a:spcBef>
+              <a:buClr>
+                <a:srgbClr val="000000"/>
+              </a:buClr>
+              <a:buSzPct val="45000"/>
+              <a:buFont typeface="Wingdings" charset="2"/>
+              <a:buChar char=""/>
+            </a:pPr>
+            <a:r>
+              <a:rPr b="0" lang="en-ZA" sz="2000" spc="-1" strike="noStrike">
+                <a:latin typeface="Arial"/>
+              </a:rPr>
+              <a:t>Seventh Outline Level</a:t>
+            </a:r>
+            <a:endParaRPr b="0" lang="en-ZA" sz="2000" spc="-1" strike="noStrike">
+              <a:latin typeface="Arial"/>
             </a:endParaRPr>
           </a:p>
         </p:txBody>
@@ -7722,14 +7255,14 @@
       </p:grpSpPr>
       <p:sp>
         <p:nvSpPr>
-          <p:cNvPr id="138" name="TextShape 1"/>
-          <p:cNvSpPr txBox="1"/>
+          <p:cNvPr id="132" name="CustomShape 1"/>
+          <p:cNvSpPr/>
           <p:nvPr/>
         </p:nvSpPr>
         <p:spPr>
           <a:xfrm>
             <a:off x="1627200" y="233640"/>
-            <a:ext cx="9143640" cy="2387160"/>
+            <a:ext cx="9143280" cy="2386800"/>
           </a:xfrm>
           <a:prstGeom prst="rect">
             <a:avLst/>
@@ -7739,8 +7272,14 @@
             <a:noFill/>
           </a:ln>
         </p:spPr>
+        <p:style>
+          <a:lnRef idx="0"/>
+          <a:fillRef idx="0"/>
+          <a:effectRef idx="0"/>
+          <a:fontRef idx="minor"/>
+        </p:style>
         <p:txBody>
-          <a:bodyPr anchor="b"/>
+          <a:bodyPr lIns="90000" rIns="90000" tIns="45000" bIns="45000" anchor="b"/>
           <a:p>
             <a:pPr>
               <a:lnSpc>
@@ -7748,33 +7287,39 @@
               </a:lnSpc>
             </a:pPr>
             <a:r>
-              <a:rPr b="0" lang="en-US" sz="5400" spc="-1" strike="noStrike">
+              <a:rPr b="0" lang="en-ZA" sz="5400" spc="-1" strike="noStrike">
                 <a:solidFill>
                   <a:srgbClr val="262626"/>
                 </a:solidFill>
                 <a:latin typeface="Century Gothic"/>
               </a:rPr>
-              <a:t>Fleet Management System</a:t>
+              <a:t> </a:t>
             </a:r>
-            <a:endParaRPr b="0" lang="en-US" sz="5400" spc="-1" strike="noStrike">
-              <a:solidFill>
-                <a:srgbClr val="000000"/>
-              </a:solidFill>
-              <a:latin typeface="Century Gothic"/>
+            <a:r>
+              <a:rPr b="0" lang="en-ZA" sz="5400" spc="-1" strike="noStrike">
+                <a:solidFill>
+                  <a:srgbClr val="262626"/>
+                </a:solidFill>
+                <a:latin typeface="Century Gothic"/>
+              </a:rPr>
+              <a:t>Delivery Manager System </a:t>
+            </a:r>
+            <a:endParaRPr b="0" lang="en-ZA" sz="5400" spc="-1" strike="noStrike">
+              <a:latin typeface="Arial"/>
             </a:endParaRPr>
           </a:p>
         </p:txBody>
       </p:sp>
       <p:sp>
         <p:nvSpPr>
-          <p:cNvPr id="139" name="TextShape 2"/>
-          <p:cNvSpPr txBox="1"/>
+          <p:cNvPr id="133" name="CustomShape 2"/>
+          <p:cNvSpPr/>
           <p:nvPr/>
         </p:nvSpPr>
         <p:spPr>
           <a:xfrm>
             <a:off x="1627200" y="3496680"/>
-            <a:ext cx="6027120" cy="1655280"/>
+            <a:ext cx="6026760" cy="1654920"/>
           </a:xfrm>
           <a:prstGeom prst="rect">
             <a:avLst/>
@@ -7784,8 +7329,14 @@
             <a:noFill/>
           </a:ln>
         </p:spPr>
+        <p:style>
+          <a:lnRef idx="0"/>
+          <a:fillRef idx="0"/>
+          <a:effectRef idx="0"/>
+          <a:fontRef idx="minor"/>
+        </p:style>
         <p:txBody>
-          <a:bodyPr>
+          <a:bodyPr lIns="90000" rIns="90000" tIns="45000" bIns="45000">
             <a:normAutofit/>
           </a:bodyPr>
           <a:p>
@@ -7871,14 +7422,14 @@
       </p:sp>
       <p:sp>
         <p:nvSpPr>
-          <p:cNvPr id="140" name="CustomShape 3"/>
+          <p:cNvPr id="134" name="CustomShape 3"/>
           <p:cNvSpPr/>
           <p:nvPr/>
         </p:nvSpPr>
         <p:spPr>
           <a:xfrm>
             <a:off x="7186320" y="3496680"/>
-            <a:ext cx="4161600" cy="1655280"/>
+            <a:ext cx="4161240" cy="1654920"/>
           </a:xfrm>
           <a:prstGeom prst="rect">
             <a:avLst/>
@@ -7895,7 +7446,7 @@
           <a:fontRef idx="minor"/>
         </p:style>
         <p:txBody>
-          <a:bodyPr>
+          <a:bodyPr lIns="90000" rIns="90000" tIns="45000" bIns="45000">
             <a:normAutofit/>
           </a:bodyPr>
           <a:p>
@@ -7913,6 +7464,7 @@
                   <a:srgbClr val="000000"/>
                 </a:solidFill>
                 <a:latin typeface="Century Gothic"/>
+                <a:ea typeface="DejaVu Sans"/>
               </a:rPr>
               <a:t>Members</a:t>
             </a:r>
@@ -7935,6 +7487,7 @@
                   <a:srgbClr val="000000"/>
                 </a:solidFill>
                 <a:latin typeface="Century Gothic"/>
+                <a:ea typeface="DejaVu Sans"/>
               </a:rPr>
               <a:t>Mavuso Mmeli 216016565</a:t>
             </a:r>
@@ -7957,6 +7510,7 @@
                   <a:srgbClr val="000000"/>
                 </a:solidFill>
                 <a:latin typeface="Century Gothic"/>
+                <a:ea typeface="DejaVu Sans"/>
               </a:rPr>
               <a:t>Morudu Khanyisile 216090091</a:t>
             </a:r>
@@ -7979,6 +7533,7 @@
                   <a:srgbClr val="000000"/>
                 </a:solidFill>
                 <a:latin typeface="Century Gothic"/>
+                <a:ea typeface="DejaVu Sans"/>
               </a:rPr>
               <a:t>Motuba Prince 201302881</a:t>
             </a:r>
@@ -8001,6 +7556,7 @@
                   <a:srgbClr val="000000"/>
                 </a:solidFill>
                 <a:latin typeface="Century Gothic"/>
+                <a:ea typeface="DejaVu Sans"/>
               </a:rPr>
               <a:t>Taliwe Thina 216009615</a:t>
             </a:r>
@@ -8074,14 +7630,14 @@
       </p:grpSpPr>
       <p:sp>
         <p:nvSpPr>
-          <p:cNvPr id="141" name="TextShape 1"/>
-          <p:cNvSpPr txBox="1"/>
+          <p:cNvPr id="135" name="CustomShape 1"/>
+          <p:cNvSpPr/>
           <p:nvPr/>
         </p:nvSpPr>
         <p:spPr>
           <a:xfrm>
             <a:off x="2593080" y="624240"/>
-            <a:ext cx="8911440" cy="1280520"/>
+            <a:ext cx="8911080" cy="1280160"/>
           </a:xfrm>
           <a:prstGeom prst="rect">
             <a:avLst/>
@@ -8091,8 +7647,14 @@
             <a:noFill/>
           </a:ln>
         </p:spPr>
+        <p:style>
+          <a:lnRef idx="0"/>
+          <a:fillRef idx="0"/>
+          <a:effectRef idx="0"/>
+          <a:fontRef idx="minor"/>
+        </p:style>
         <p:txBody>
-          <a:bodyPr/>
+          <a:bodyPr lIns="90000" rIns="90000" tIns="45000" bIns="45000"/>
           <a:p>
             <a:pPr>
               <a:lnSpc>
@@ -8100,7 +7662,7 @@
               </a:lnSpc>
             </a:pPr>
             <a:r>
-              <a:rPr b="0" lang="en-US" sz="3600" spc="-1" strike="noStrike">
+              <a:rPr b="0" lang="en-ZA" sz="3600" spc="-1" strike="noStrike">
                 <a:solidFill>
                   <a:srgbClr val="262626"/>
                 </a:solidFill>
@@ -8108,25 +7670,22 @@
               </a:rPr>
               <a:t>Problem</a:t>
             </a:r>
-            <a:endParaRPr b="0" lang="en-US" sz="3600" spc="-1" strike="noStrike">
-              <a:solidFill>
-                <a:srgbClr val="000000"/>
-              </a:solidFill>
-              <a:latin typeface="Century Gothic"/>
+            <a:endParaRPr b="0" lang="en-ZA" sz="3600" spc="-1" strike="noStrike">
+              <a:latin typeface="Arial"/>
             </a:endParaRPr>
           </a:p>
         </p:txBody>
       </p:sp>
       <p:sp>
         <p:nvSpPr>
-          <p:cNvPr id="142" name="TextShape 2"/>
-          <p:cNvSpPr txBox="1"/>
+          <p:cNvPr id="136" name="CustomShape 2"/>
+          <p:cNvSpPr/>
           <p:nvPr/>
         </p:nvSpPr>
         <p:spPr>
           <a:xfrm>
             <a:off x="2589120" y="1721520"/>
-            <a:ext cx="8915040" cy="3777120"/>
+            <a:ext cx="8914680" cy="3776760"/>
           </a:xfrm>
           <a:prstGeom prst="rect">
             <a:avLst/>
@@ -8136,10 +7695,16 @@
             <a:noFill/>
           </a:ln>
         </p:spPr>
+        <p:style>
+          <a:lnRef idx="0"/>
+          <a:fillRef idx="0"/>
+          <a:effectRef idx="0"/>
+          <a:fontRef idx="minor"/>
+        </p:style>
         <p:txBody>
-          <a:bodyPr/>
-          <a:p>
-            <a:pPr marL="343080" indent="-342720">
+          <a:bodyPr lIns="90000" rIns="90000" tIns="45000" bIns="45000"/>
+          <a:p>
+            <a:pPr marL="343080" indent="-342360">
               <a:lnSpc>
                 <a:spcPct val="100000"/>
               </a:lnSpc>
@@ -8153,7 +7718,7 @@
               <a:buChar char=""/>
             </a:pPr>
             <a:r>
-              <a:rPr b="0" lang="en-US" sz="1800" spc="-1" strike="noStrike">
+              <a:rPr b="0" lang="en-ZA" sz="1800" spc="-1" strike="noStrike">
                 <a:solidFill>
                   <a:srgbClr val="404040"/>
                 </a:solidFill>
@@ -8161,15 +7726,12 @@
               </a:rPr>
               <a:t>New Era Commerce</a:t>
             </a:r>
-            <a:endParaRPr b="0" lang="en-US" sz="1800" spc="-1" strike="noStrike">
-              <a:solidFill>
-                <a:srgbClr val="404040"/>
-              </a:solidFill>
-              <a:latin typeface="Century Gothic"/>
-            </a:endParaRPr>
-          </a:p>
-          <a:p>
-            <a:pPr marL="343080" indent="-342720">
+            <a:endParaRPr b="0" lang="en-ZA" sz="1800" spc="-1" strike="noStrike">
+              <a:latin typeface="Arial"/>
+            </a:endParaRPr>
+          </a:p>
+          <a:p>
+            <a:pPr marL="343080" indent="-342360">
               <a:lnSpc>
                 <a:spcPct val="100000"/>
               </a:lnSpc>
@@ -8183,7 +7745,7 @@
               <a:buChar char=""/>
             </a:pPr>
             <a:r>
-              <a:rPr b="0" lang="en-US" sz="1800" spc="-1" strike="noStrike">
+              <a:rPr b="0" lang="en-ZA" sz="1800" spc="-1" strike="noStrike">
                 <a:solidFill>
                   <a:srgbClr val="404040"/>
                 </a:solidFill>
@@ -8191,15 +7753,12 @@
               </a:rPr>
               <a:t>Problem with current system</a:t>
             </a:r>
-            <a:endParaRPr b="0" lang="en-US" sz="1800" spc="-1" strike="noStrike">
-              <a:solidFill>
-                <a:srgbClr val="404040"/>
-              </a:solidFill>
-              <a:latin typeface="Century Gothic"/>
-            </a:endParaRPr>
-          </a:p>
-          <a:p>
-            <a:pPr lvl="1" marL="743040" indent="-285480">
+            <a:endParaRPr b="0" lang="en-ZA" sz="1800" spc="-1" strike="noStrike">
+              <a:latin typeface="Arial"/>
+            </a:endParaRPr>
+          </a:p>
+          <a:p>
+            <a:pPr lvl="1" marL="743040" indent="-285120">
               <a:lnSpc>
                 <a:spcPct val="100000"/>
               </a:lnSpc>
@@ -8213,23 +7772,20 @@
               <a:buChar char=""/>
             </a:pPr>
             <a:r>
-              <a:rPr b="0" lang="en-US" sz="1600" spc="-1" strike="noStrike">
+              <a:rPr b="0" lang="en-ZA" sz="1600" spc="-1" strike="noStrike">
                 <a:solidFill>
                   <a:srgbClr val="404040"/>
                 </a:solidFill>
                 <a:latin typeface="Century Gothic"/>
               </a:rPr>
-              <a:t>Driver Monitoring</a:t>
+              <a:t>Assignment allocation</a:t>
             </a:r>
-            <a:endParaRPr b="0" lang="en-US" sz="1600" spc="-1" strike="noStrike">
-              <a:solidFill>
-                <a:srgbClr val="404040"/>
-              </a:solidFill>
-              <a:latin typeface="Century Gothic"/>
-            </a:endParaRPr>
-          </a:p>
-          <a:p>
-            <a:pPr lvl="2" marL="1143000" indent="-228240">
+            <a:endParaRPr b="0" lang="en-ZA" sz="1600" spc="-1" strike="noStrike">
+              <a:latin typeface="Arial"/>
+            </a:endParaRPr>
+          </a:p>
+          <a:p>
+            <a:pPr lvl="1" marL="743040" indent="-285120">
               <a:lnSpc>
                 <a:spcPct val="100000"/>
               </a:lnSpc>
@@ -8243,23 +7799,20 @@
               <a:buChar char=""/>
             </a:pPr>
             <a:r>
-              <a:rPr b="0" lang="en-US" sz="1400" spc="-1" strike="noStrike">
+              <a:rPr b="0" lang="en-ZA" sz="1600" spc="-1" strike="noStrike">
                 <a:solidFill>
                   <a:srgbClr val="404040"/>
                 </a:solidFill>
                 <a:latin typeface="Century Gothic"/>
               </a:rPr>
-              <a:t>DynaFleet limited to 2 trucks</a:t>
+              <a:t>Different truck, different system</a:t>
             </a:r>
-            <a:endParaRPr b="0" lang="en-US" sz="1400" spc="-1" strike="noStrike">
-              <a:solidFill>
-                <a:srgbClr val="404040"/>
-              </a:solidFill>
-              <a:latin typeface="Century Gothic"/>
-            </a:endParaRPr>
-          </a:p>
-          <a:p>
-            <a:pPr lvl="2" marL="1143000" indent="-228240">
+            <a:endParaRPr b="0" lang="en-ZA" sz="1600" spc="-1" strike="noStrike">
+              <a:latin typeface="Arial"/>
+            </a:endParaRPr>
+          </a:p>
+          <a:p>
+            <a:pPr lvl="2" marL="1143000" indent="-227880">
               <a:lnSpc>
                 <a:spcPct val="100000"/>
               </a:lnSpc>
@@ -8273,23 +7826,20 @@
               <a:buChar char=""/>
             </a:pPr>
             <a:r>
-              <a:rPr b="0" lang="en-US" sz="1400" spc="-1" strike="noStrike">
+              <a:rPr b="0" lang="en-ZA" sz="1400" spc="-1" strike="noStrike">
                 <a:solidFill>
                   <a:srgbClr val="404040"/>
                 </a:solidFill>
                 <a:latin typeface="Century Gothic"/>
               </a:rPr>
-              <a:t>CarTrack is slow and inefficient</a:t>
+              <a:t>DynaFleet for Volvo</a:t>
             </a:r>
-            <a:endParaRPr b="0" lang="en-US" sz="1400" spc="-1" strike="noStrike">
-              <a:solidFill>
-                <a:srgbClr val="404040"/>
-              </a:solidFill>
-              <a:latin typeface="Century Gothic"/>
-            </a:endParaRPr>
-          </a:p>
-          <a:p>
-            <a:pPr lvl="1" marL="743040" indent="-285480">
+            <a:endParaRPr b="0" lang="en-ZA" sz="1400" spc="-1" strike="noStrike">
+              <a:latin typeface="Arial"/>
+            </a:endParaRPr>
+          </a:p>
+          <a:p>
+            <a:pPr lvl="2" marL="1143000" indent="-227880">
               <a:lnSpc>
                 <a:spcPct val="100000"/>
               </a:lnSpc>
@@ -8303,23 +7853,20 @@
               <a:buChar char=""/>
             </a:pPr>
             <a:r>
-              <a:rPr b="0" lang="en-US" sz="1600" spc="-1" strike="noStrike">
+              <a:rPr b="0" lang="en-ZA" sz="1400" spc="-1" strike="noStrike">
                 <a:solidFill>
                   <a:srgbClr val="404040"/>
                 </a:solidFill>
                 <a:latin typeface="Century Gothic"/>
               </a:rPr>
-              <a:t>Driver Allocation/Assignment</a:t>
+              <a:t>CarTrack for other trucks </a:t>
             </a:r>
-            <a:endParaRPr b="0" lang="en-US" sz="1600" spc="-1" strike="noStrike">
-              <a:solidFill>
-                <a:srgbClr val="404040"/>
-              </a:solidFill>
-              <a:latin typeface="Century Gothic"/>
-            </a:endParaRPr>
-          </a:p>
-          <a:p>
-            <a:pPr lvl="2" marL="1143000" indent="-228240">
+            <a:endParaRPr b="0" lang="en-ZA" sz="1400" spc="-1" strike="noStrike">
+              <a:latin typeface="Arial"/>
+            </a:endParaRPr>
+          </a:p>
+          <a:p>
+            <a:pPr lvl="1" marL="743040" indent="-285120">
               <a:lnSpc>
                 <a:spcPct val="100000"/>
               </a:lnSpc>
@@ -8333,23 +7880,20 @@
               <a:buChar char=""/>
             </a:pPr>
             <a:r>
-              <a:rPr b="0" lang="en-US" sz="1400" spc="-1" strike="noStrike">
+              <a:rPr b="0" lang="en-ZA" sz="1600" spc="-1" strike="noStrike">
                 <a:solidFill>
                   <a:srgbClr val="404040"/>
                 </a:solidFill>
                 <a:latin typeface="Century Gothic"/>
               </a:rPr>
-              <a:t>Manual assigning of assignments </a:t>
+              <a:t>Start and end time for trips not available</a:t>
             </a:r>
-            <a:endParaRPr b="0" lang="en-US" sz="1400" spc="-1" strike="noStrike">
-              <a:solidFill>
-                <a:srgbClr val="404040"/>
-              </a:solidFill>
-              <a:latin typeface="Century Gothic"/>
-            </a:endParaRPr>
-          </a:p>
-          <a:p>
-            <a:pPr lvl="2" marL="1143000" indent="-228240">
+            <a:endParaRPr b="0" lang="en-ZA" sz="1600" spc="-1" strike="noStrike">
+              <a:latin typeface="Arial"/>
+            </a:endParaRPr>
+          </a:p>
+          <a:p>
+            <a:pPr lvl="1" marL="743040" indent="-285120">
               <a:lnSpc>
                 <a:spcPct val="100000"/>
               </a:lnSpc>
@@ -8363,34 +7907,33 @@
               <a:buChar char=""/>
             </a:pPr>
             <a:r>
-              <a:rPr b="0" lang="en-US" sz="1400" spc="-1" strike="noStrike">
+              <a:rPr b="0" lang="en-ZA" sz="1600" spc="-1" strike="noStrike">
                 <a:solidFill>
                   <a:srgbClr val="404040"/>
                 </a:solidFill>
                 <a:latin typeface="Century Gothic"/>
               </a:rPr>
-              <a:t>Creating Delivery</a:t>
+              <a:t>No details of current delivery</a:t>
             </a:r>
-            <a:endParaRPr b="0" lang="en-US" sz="1400" spc="-1" strike="noStrike">
-              <a:solidFill>
-                <a:srgbClr val="404040"/>
-              </a:solidFill>
-              <a:latin typeface="Century Gothic"/>
-            </a:endParaRPr>
-          </a:p>
-          <a:p>
-            <a:endParaRPr b="0" lang="en-US" sz="1400" spc="-1" strike="noStrike">
-              <a:solidFill>
-                <a:srgbClr val="404040"/>
-              </a:solidFill>
-              <a:latin typeface="Century Gothic"/>
+            <a:endParaRPr b="0" lang="en-ZA" sz="1600" spc="-1" strike="noStrike">
+              <a:latin typeface="Arial"/>
+            </a:endParaRPr>
+          </a:p>
+          <a:p>
+            <a:pPr>
+              <a:lnSpc>
+                <a:spcPct val="100000"/>
+              </a:lnSpc>
+            </a:pPr>
+            <a:endParaRPr b="0" lang="en-ZA" sz="1600" spc="-1" strike="noStrike">
+              <a:latin typeface="Arial"/>
             </a:endParaRPr>
           </a:p>
         </p:txBody>
       </p:sp>
       <p:pic>
         <p:nvPicPr>
-          <p:cNvPr id="143" name="Picture 8" descr=""/>
+          <p:cNvPr id="137" name="Picture 8" descr=""/>
           <p:cNvPicPr/>
           <p:nvPr/>
         </p:nvPicPr>
@@ -8401,7 +7944,7 @@
         <p:spPr>
           <a:xfrm>
             <a:off x="7776000" y="1917720"/>
-            <a:ext cx="3177000" cy="2114280"/>
+            <a:ext cx="3176640" cy="2113920"/>
           </a:xfrm>
           <a:prstGeom prst="rect">
             <a:avLst/>
@@ -8462,14 +8005,14 @@
       </p:grpSpPr>
       <p:sp>
         <p:nvSpPr>
-          <p:cNvPr id="144" name="TextShape 1"/>
-          <p:cNvSpPr txBox="1"/>
+          <p:cNvPr id="138" name="CustomShape 1"/>
+          <p:cNvSpPr/>
           <p:nvPr/>
         </p:nvSpPr>
         <p:spPr>
           <a:xfrm>
             <a:off x="2593080" y="624240"/>
-            <a:ext cx="8911440" cy="1280520"/>
+            <a:ext cx="8911080" cy="1280160"/>
           </a:xfrm>
           <a:prstGeom prst="rect">
             <a:avLst/>
@@ -8479,8 +8022,14 @@
             <a:noFill/>
           </a:ln>
         </p:spPr>
+        <p:style>
+          <a:lnRef idx="0"/>
+          <a:fillRef idx="0"/>
+          <a:effectRef idx="0"/>
+          <a:fontRef idx="minor"/>
+        </p:style>
         <p:txBody>
-          <a:bodyPr/>
+          <a:bodyPr lIns="90000" rIns="90000" tIns="45000" bIns="45000"/>
           <a:p>
             <a:pPr>
               <a:lnSpc>
@@ -8488,33 +8037,30 @@
               </a:lnSpc>
             </a:pPr>
             <a:r>
-              <a:rPr b="0" lang="en-US" sz="3600" spc="-1" strike="noStrike">
+              <a:rPr b="0" lang="en-ZA" sz="3600" spc="-1" strike="noStrike">
                 <a:solidFill>
                   <a:srgbClr val="262626"/>
                 </a:solidFill>
                 <a:latin typeface="Century Gothic"/>
               </a:rPr>
-              <a:t>Solution Statement: Fleet Management System</a:t>
+              <a:t>Solution Statement: Delivery Manager System</a:t>
             </a:r>
-            <a:endParaRPr b="0" lang="en-US" sz="3600" spc="-1" strike="noStrike">
-              <a:solidFill>
-                <a:srgbClr val="000000"/>
-              </a:solidFill>
-              <a:latin typeface="Century Gothic"/>
+            <a:endParaRPr b="0" lang="en-ZA" sz="3600" spc="-1" strike="noStrike">
+              <a:latin typeface="Arial"/>
             </a:endParaRPr>
           </a:p>
         </p:txBody>
       </p:sp>
       <p:sp>
         <p:nvSpPr>
-          <p:cNvPr id="145" name="TextShape 2"/>
-          <p:cNvSpPr txBox="1"/>
+          <p:cNvPr id="139" name="CustomShape 2"/>
+          <p:cNvSpPr/>
           <p:nvPr/>
         </p:nvSpPr>
         <p:spPr>
           <a:xfrm>
             <a:off x="2589120" y="2133720"/>
-            <a:ext cx="8915040" cy="3777120"/>
+            <a:ext cx="8914680" cy="3776760"/>
           </a:xfrm>
           <a:prstGeom prst="rect">
             <a:avLst/>
@@ -8524,10 +8070,16 @@
             <a:noFill/>
           </a:ln>
         </p:spPr>
+        <p:style>
+          <a:lnRef idx="0"/>
+          <a:fillRef idx="0"/>
+          <a:effectRef idx="0"/>
+          <a:fontRef idx="minor"/>
+        </p:style>
         <p:txBody>
-          <a:bodyPr/>
-          <a:p>
-            <a:pPr marL="343080" indent="-342720">
+          <a:bodyPr lIns="90000" rIns="90000" tIns="45000" bIns="45000"/>
+          <a:p>
+            <a:pPr marL="343080" indent="-342360">
               <a:lnSpc>
                 <a:spcPct val="100000"/>
               </a:lnSpc>
@@ -8541,7 +8093,7 @@
               <a:buChar char=""/>
             </a:pPr>
             <a:r>
-              <a:rPr b="0" lang="en-US" sz="1800" spc="-1" strike="noStrike">
+              <a:rPr b="0" lang="en-ZA" sz="1800" spc="-1" strike="noStrike">
                 <a:solidFill>
                   <a:srgbClr val="404040"/>
                 </a:solidFill>
@@ -8549,15 +8101,12 @@
               </a:rPr>
               <a:t>What it is?</a:t>
             </a:r>
-            <a:endParaRPr b="0" lang="en-US" sz="1800" spc="-1" strike="noStrike">
-              <a:solidFill>
-                <a:srgbClr val="404040"/>
-              </a:solidFill>
-              <a:latin typeface="Century Gothic"/>
-            </a:endParaRPr>
-          </a:p>
-          <a:p>
-            <a:pPr lvl="1" marL="743040" indent="-285480">
+            <a:endParaRPr b="0" lang="en-ZA" sz="1800" spc="-1" strike="noStrike">
+              <a:latin typeface="Arial"/>
+            </a:endParaRPr>
+          </a:p>
+          <a:p>
+            <a:pPr lvl="1" marL="743040" indent="-285120">
               <a:lnSpc>
                 <a:spcPct val="100000"/>
               </a:lnSpc>
@@ -8571,23 +8120,20 @@
               <a:buChar char=""/>
             </a:pPr>
             <a:r>
-              <a:rPr b="0" lang="en-US" sz="1600" spc="-1" strike="noStrike">
+              <a:rPr b="0" lang="en-ZA" sz="1600" spc="-1" strike="noStrike">
                 <a:solidFill>
                   <a:srgbClr val="404040"/>
                 </a:solidFill>
                 <a:latin typeface="Century Gothic"/>
               </a:rPr>
-              <a:t>All-in-one solution</a:t>
+              <a:t>Consists of:</a:t>
             </a:r>
-            <a:endParaRPr b="0" lang="en-US" sz="1600" spc="-1" strike="noStrike">
-              <a:solidFill>
-                <a:srgbClr val="404040"/>
-              </a:solidFill>
-              <a:latin typeface="Century Gothic"/>
-            </a:endParaRPr>
-          </a:p>
-          <a:p>
-            <a:pPr lvl="2" marL="1143000" indent="-228240">
+            <a:endParaRPr b="0" lang="en-ZA" sz="1600" spc="-1" strike="noStrike">
+              <a:latin typeface="Arial"/>
+            </a:endParaRPr>
+          </a:p>
+          <a:p>
+            <a:pPr lvl="2" marL="1143000" indent="-227880">
               <a:lnSpc>
                 <a:spcPct val="100000"/>
               </a:lnSpc>
@@ -8601,23 +8147,160 @@
               <a:buChar char=""/>
             </a:pPr>
             <a:r>
-              <a:rPr b="0" lang="en-US" sz="1400" spc="-1" strike="noStrike">
+              <a:rPr b="0" lang="en-ZA" sz="1400" spc="-1" strike="noStrike">
                 <a:solidFill>
                   <a:srgbClr val="404040"/>
                 </a:solidFill>
                 <a:latin typeface="Century Gothic"/>
               </a:rPr>
-              <a:t>Mobile Application for drivers to communicate with</a:t>
+              <a:t>Web based system for office personnel </a:t>
             </a:r>
-            <a:endParaRPr b="0" lang="en-US" sz="1400" spc="-1" strike="noStrike">
-              <a:solidFill>
-                <a:srgbClr val="404040"/>
-              </a:solidFill>
-              <a:latin typeface="Century Gothic"/>
-            </a:endParaRPr>
-          </a:p>
-          <a:p>
-            <a:pPr lvl="2" marL="1143000" indent="-228240">
+            <a:endParaRPr b="0" lang="en-ZA" sz="1400" spc="-1" strike="noStrike">
+              <a:latin typeface="Arial"/>
+            </a:endParaRPr>
+          </a:p>
+          <a:p>
+            <a:pPr lvl="6" marL="1512000" indent="-216000">
+              <a:lnSpc>
+                <a:spcPct val="100000"/>
+              </a:lnSpc>
+              <a:spcBef>
+                <a:spcPts val="1001"/>
+              </a:spcBef>
+              <a:buClr>
+                <a:srgbClr val="000000"/>
+              </a:buClr>
+              <a:buSzPct val="45000"/>
+              <a:buFont typeface="Wingdings" charset="2"/>
+              <a:buChar char=""/>
+            </a:pPr>
+            <a:r>
+              <a:rPr b="0" lang="en-ZA" sz="1400" spc="-1" strike="noStrike">
+                <a:solidFill>
+                  <a:srgbClr val="404040"/>
+                </a:solidFill>
+                <a:latin typeface="Century Gothic"/>
+              </a:rPr>
+              <a:t>Create deliveries</a:t>
+            </a:r>
+            <a:endParaRPr b="0" lang="en-ZA" sz="1400" spc="-1" strike="noStrike">
+              <a:latin typeface="Arial"/>
+            </a:endParaRPr>
+          </a:p>
+          <a:p>
+            <a:pPr lvl="6" marL="1512000" indent="-216000">
+              <a:lnSpc>
+                <a:spcPct val="100000"/>
+              </a:lnSpc>
+              <a:spcBef>
+                <a:spcPts val="1001"/>
+              </a:spcBef>
+              <a:buClr>
+                <a:srgbClr val="000000"/>
+              </a:buClr>
+              <a:buSzPct val="45000"/>
+              <a:buFont typeface="Wingdings" charset="2"/>
+              <a:buChar char=""/>
+            </a:pPr>
+            <a:r>
+              <a:rPr b="0" lang="en-ZA" sz="1400" spc="-1" strike="noStrike">
+                <a:solidFill>
+                  <a:srgbClr val="404040"/>
+                </a:solidFill>
+                <a:latin typeface="Century Gothic"/>
+              </a:rPr>
+              <a:t>Assign drivers to deliveries</a:t>
+            </a:r>
+            <a:endParaRPr b="0" lang="en-ZA" sz="1400" spc="-1" strike="noStrike">
+              <a:latin typeface="Arial"/>
+            </a:endParaRPr>
+          </a:p>
+          <a:p>
+            <a:pPr lvl="6" marL="1512000" indent="-216000">
+              <a:lnSpc>
+                <a:spcPct val="100000"/>
+              </a:lnSpc>
+              <a:spcBef>
+                <a:spcPts val="1001"/>
+              </a:spcBef>
+              <a:buClr>
+                <a:srgbClr val="000000"/>
+              </a:buClr>
+              <a:buSzPct val="45000"/>
+              <a:buFont typeface="Wingdings" charset="2"/>
+              <a:buChar char=""/>
+            </a:pPr>
+            <a:r>
+              <a:rPr b="0" lang="en-ZA" sz="1400" spc="-1" strike="noStrike">
+                <a:solidFill>
+                  <a:srgbClr val="404040"/>
+                </a:solidFill>
+                <a:latin typeface="Century Gothic"/>
+              </a:rPr>
+              <a:t>View start and end time of delivery</a:t>
+            </a:r>
+            <a:endParaRPr b="0" lang="en-ZA" sz="1400" spc="-1" strike="noStrike">
+              <a:latin typeface="Arial"/>
+            </a:endParaRPr>
+          </a:p>
+          <a:p>
+            <a:pPr lvl="6" marL="1512000" indent="-216000">
+              <a:lnSpc>
+                <a:spcPct val="100000"/>
+              </a:lnSpc>
+              <a:spcBef>
+                <a:spcPts val="1001"/>
+              </a:spcBef>
+              <a:buClr>
+                <a:srgbClr val="000000"/>
+              </a:buClr>
+              <a:buSzPct val="45000"/>
+              <a:buFont typeface="Wingdings" charset="2"/>
+              <a:buChar char=""/>
+            </a:pPr>
+            <a:r>
+              <a:rPr b="0" lang="en-ZA" sz="1400" spc="-1" strike="noStrike">
+                <a:solidFill>
+                  <a:srgbClr val="404040"/>
+                </a:solidFill>
+                <a:latin typeface="Century Gothic"/>
+              </a:rPr>
+              <a:t>Track driver location during delivery</a:t>
+            </a:r>
+            <a:endParaRPr b="0" lang="en-ZA" sz="1400" spc="-1" strike="noStrike">
+              <a:latin typeface="Arial"/>
+            </a:endParaRPr>
+          </a:p>
+          <a:p>
+            <a:pPr lvl="6" marL="1512000" indent="-216000">
+              <a:lnSpc>
+                <a:spcPct val="100000"/>
+              </a:lnSpc>
+              <a:spcBef>
+                <a:spcPts val="1001"/>
+              </a:spcBef>
+              <a:buClr>
+                <a:srgbClr val="000000"/>
+              </a:buClr>
+              <a:buSzPct val="45000"/>
+              <a:buFont typeface="Wingdings" charset="2"/>
+              <a:buChar char=""/>
+            </a:pPr>
+            <a:r>
+              <a:rPr b="0" lang="en-ZA" sz="1400" spc="-1" strike="noStrike">
+                <a:solidFill>
+                  <a:srgbClr val="404040"/>
+                </a:solidFill>
+                <a:latin typeface="Century Gothic"/>
+              </a:rPr>
+              <a:t>View details of the current delivery</a:t>
+            </a:r>
+            <a:endParaRPr b="0" lang="en-ZA" sz="1400" spc="-1" strike="noStrike">
+              <a:latin typeface="Arial"/>
+            </a:endParaRPr>
+          </a:p>
+          <a:p>
+            <a:pPr lvl="2" marL="1143000" indent="-227880">
               <a:lnSpc>
                 <a:spcPct val="100000"/>
               </a:lnSpc>
@@ -8631,23 +8314,20 @@
               <a:buChar char=""/>
             </a:pPr>
             <a:r>
-              <a:rPr b="0" lang="en-US" sz="1400" spc="-1" strike="noStrike">
+              <a:rPr b="0" lang="en-ZA" sz="1400" spc="-1" strike="noStrike">
                 <a:solidFill>
                   <a:srgbClr val="404040"/>
                 </a:solidFill>
                 <a:latin typeface="Century Gothic"/>
               </a:rPr>
-              <a:t>Web Based system for the stakeholders to effectively monitor, assign drivers and generate reports</a:t>
+              <a:t>Mobile application for drivers </a:t>
             </a:r>
-            <a:endParaRPr b="0" lang="en-US" sz="1400" spc="-1" strike="noStrike">
-              <a:solidFill>
-                <a:srgbClr val="404040"/>
-              </a:solidFill>
-              <a:latin typeface="Century Gothic"/>
-            </a:endParaRPr>
-          </a:p>
-          <a:p>
-            <a:pPr lvl="1" marL="743040" indent="-285480">
+            <a:endParaRPr b="0" lang="en-ZA" sz="1400" spc="-1" strike="noStrike">
+              <a:latin typeface="Arial"/>
+            </a:endParaRPr>
+          </a:p>
+          <a:p>
+            <a:pPr lvl="6" marL="1512000" indent="-216000">
               <a:lnSpc>
                 <a:spcPct val="100000"/>
               </a:lnSpc>
@@ -8655,29 +8335,27 @@
                 <a:spcPts val="1001"/>
               </a:spcBef>
               <a:buClr>
-                <a:srgbClr val="dddddd"/>
+                <a:srgbClr val="000000"/>
               </a:buClr>
-              <a:buFont typeface="Wingdings 3" charset="2"/>
-              <a:buChar char=""/>
+              <a:buSzPct val="45000"/>
+              <a:buFont typeface="Wingdings" charset="2"/>
+              <a:buChar char=""/>
             </a:pPr>
             <a:r>
-              <a:rPr b="0" lang="en-US" sz="1600" spc="-1" strike="noStrike">
+              <a:rPr b="0" lang="en-ZA" sz="1400" spc="-1" strike="noStrike">
                 <a:solidFill>
                   <a:srgbClr val="404040"/>
                 </a:solidFill>
                 <a:latin typeface="Century Gothic"/>
               </a:rPr>
-              <a:t>More user friendly and interactive</a:t>
+              <a:t>Receive delivery information</a:t>
             </a:r>
-            <a:endParaRPr b="0" lang="en-US" sz="1600" spc="-1" strike="noStrike">
-              <a:solidFill>
-                <a:srgbClr val="404040"/>
-              </a:solidFill>
-              <a:latin typeface="Century Gothic"/>
-            </a:endParaRPr>
-          </a:p>
-          <a:p>
-            <a:pPr lvl="1" marL="743040" indent="-285480">
+            <a:endParaRPr b="0" lang="en-ZA" sz="1400" spc="-1" strike="noStrike">
+              <a:latin typeface="Arial"/>
+            </a:endParaRPr>
+          </a:p>
+          <a:p>
+            <a:pPr lvl="6" marL="1512000" indent="-216000">
               <a:lnSpc>
                 <a:spcPct val="100000"/>
               </a:lnSpc>
@@ -8685,25 +8363,23 @@
                 <a:spcPts val="1001"/>
               </a:spcBef>
               <a:buClr>
-                <a:srgbClr val="dddddd"/>
+                <a:srgbClr val="000000"/>
               </a:buClr>
-              <a:buFont typeface="Wingdings 3" charset="2"/>
-              <a:buChar char=""/>
+              <a:buSzPct val="45000"/>
+              <a:buFont typeface="Wingdings" charset="2"/>
+              <a:buChar char=""/>
             </a:pPr>
             <a:r>
-              <a:rPr b="0" lang="en-US" sz="1600" spc="-1" strike="noStrike">
+              <a:rPr b="0" lang="en-ZA" sz="1400" spc="-1" strike="noStrike">
                 <a:solidFill>
                   <a:srgbClr val="404040"/>
                 </a:solidFill>
                 <a:latin typeface="Century Gothic"/>
               </a:rPr>
-              <a:t>Faster</a:t>
+              <a:t>Start and end trips</a:t>
             </a:r>
-            <a:endParaRPr b="0" lang="en-US" sz="1600" spc="-1" strike="noStrike">
-              <a:solidFill>
-                <a:srgbClr val="404040"/>
-              </a:solidFill>
-              <a:latin typeface="Century Gothic"/>
+            <a:endParaRPr b="0" lang="en-ZA" sz="1400" spc="-1" strike="noStrike">
+              <a:latin typeface="Arial"/>
             </a:endParaRPr>
           </a:p>
         </p:txBody>

</xml_diff>

<commit_message>
added ajax counter in site master
</commit_message>
<xml_diff>
--- a/FMS Presentation.pptx
+++ b/FMS Presentation.pptx
@@ -2705,9 +2705,9 @@
         <p:grpSpPr>
           <a:xfrm>
             <a:off x="0" y="228600"/>
-            <a:ext cx="2850840" cy="6638040"/>
+            <a:ext cx="2850480" cy="6637680"/>
             <a:chOff x="0" y="228600"/>
-            <a:chExt cx="2850840" cy="6638040"/>
+            <a:chExt cx="2850480" cy="6637680"/>
           </a:xfrm>
         </p:grpSpPr>
         <p:sp>
@@ -2719,7 +2719,7 @@
           <p:spPr>
             <a:xfrm>
               <a:off x="0" y="2575080"/>
-              <a:ext cx="100080" cy="625320"/>
+              <a:ext cx="99720" cy="624960"/>
             </a:xfrm>
             <a:custGeom>
               <a:avLst/>
@@ -2785,7 +2785,7 @@
           <p:spPr>
             <a:xfrm>
               <a:off x="128520" y="3156480"/>
-              <a:ext cx="645840" cy="2321640"/>
+              <a:ext cx="645480" cy="2321280"/>
             </a:xfrm>
             <a:custGeom>
               <a:avLst/>
@@ -2856,7 +2856,7 @@
           <p:spPr>
             <a:xfrm>
               <a:off x="807120" y="5447160"/>
-              <a:ext cx="608760" cy="1419480"/>
+              <a:ext cx="608400" cy="1419120"/>
             </a:xfrm>
             <a:custGeom>
               <a:avLst/>
@@ -2932,7 +2932,7 @@
           <p:spPr>
             <a:xfrm>
               <a:off x="959760" y="6503760"/>
-              <a:ext cx="170640" cy="362880"/>
+              <a:ext cx="170280" cy="362520"/>
             </a:xfrm>
             <a:custGeom>
               <a:avLst/>
@@ -2988,7 +2988,7 @@
           <p:spPr>
             <a:xfrm>
               <a:off x="100800" y="3201120"/>
-              <a:ext cx="821160" cy="3327840"/>
+              <a:ext cx="820800" cy="3327480"/>
             </a:xfrm>
             <a:custGeom>
               <a:avLst/>
@@ -3079,7 +3079,7 @@
           <p:spPr>
             <a:xfrm>
               <a:off x="22320" y="228600"/>
-              <a:ext cx="105480" cy="2927160"/>
+              <a:ext cx="105120" cy="2926800"/>
             </a:xfrm>
             <a:custGeom>
               <a:avLst/>
@@ -3165,7 +3165,7 @@
           <p:spPr>
             <a:xfrm>
               <a:off x="78120" y="2944080"/>
-              <a:ext cx="77400" cy="493200"/>
+              <a:ext cx="77040" cy="492840"/>
             </a:xfrm>
             <a:custGeom>
               <a:avLst/>
@@ -3231,7 +3231,7 @@
           <p:spPr>
             <a:xfrm>
               <a:off x="769680" y="5478840"/>
-              <a:ext cx="189360" cy="1024200"/>
+              <a:ext cx="189000" cy="1023840"/>
             </a:xfrm>
             <a:custGeom>
               <a:avLst/>
@@ -3317,7 +3317,7 @@
           <p:spPr>
             <a:xfrm>
               <a:off x="775440" y="1398960"/>
-              <a:ext cx="2075400" cy="4047480"/>
+              <a:ext cx="2075040" cy="4047120"/>
             </a:xfrm>
             <a:custGeom>
               <a:avLst/>
@@ -3438,7 +3438,7 @@
           <p:spPr>
             <a:xfrm>
               <a:off x="922680" y="6530040"/>
-              <a:ext cx="161280" cy="336600"/>
+              <a:ext cx="160920" cy="336240"/>
             </a:xfrm>
             <a:custGeom>
               <a:avLst/>
@@ -3494,7 +3494,7 @@
           <p:spPr>
             <a:xfrm>
               <a:off x="769680" y="5359320"/>
-              <a:ext cx="36720" cy="221040"/>
+              <a:ext cx="36360" cy="220680"/>
             </a:xfrm>
             <a:custGeom>
               <a:avLst/>
@@ -3560,7 +3560,7 @@
           <p:spPr>
             <a:xfrm>
               <a:off x="849960" y="6244560"/>
-              <a:ext cx="237960" cy="621720"/>
+              <a:ext cx="237600" cy="621360"/>
             </a:xfrm>
             <a:custGeom>
               <a:avLst/>
@@ -3637,9 +3637,9 @@
         <p:grpSpPr>
           <a:xfrm>
             <a:off x="27360" y="-720"/>
-            <a:ext cx="2355840" cy="6853320"/>
+            <a:ext cx="2355480" cy="6852960"/>
             <a:chOff x="27360" y="-720"/>
-            <a:chExt cx="2355840" cy="6853320"/>
+            <a:chExt cx="2355480" cy="6852960"/>
           </a:xfrm>
         </p:grpSpPr>
         <p:sp>
@@ -3651,7 +3651,7 @@
           <p:spPr>
             <a:xfrm>
               <a:off x="27360" y="-720"/>
-              <a:ext cx="493560" cy="4400280"/>
+              <a:ext cx="493200" cy="4399920"/>
             </a:xfrm>
             <a:custGeom>
               <a:avLst/>
@@ -3760,7 +3760,7 @@
           <p:spPr>
             <a:xfrm>
               <a:off x="550440" y="4316400"/>
-              <a:ext cx="422640" cy="1580040"/>
+              <a:ext cx="422280" cy="1579680"/>
             </a:xfrm>
             <a:custGeom>
               <a:avLst/>
@@ -3834,7 +3834,7 @@
           <p:spPr>
             <a:xfrm>
               <a:off x="1006200" y="5862600"/>
-              <a:ext cx="430200" cy="990000"/>
+              <a:ext cx="429840" cy="989640"/>
             </a:xfrm>
             <a:custGeom>
               <a:avLst/>
@@ -3908,7 +3908,7 @@
           <p:spPr>
             <a:xfrm>
               <a:off x="521640" y="4364280"/>
-              <a:ext cx="551160" cy="2235240"/>
+              <a:ext cx="550800" cy="2234880"/>
             </a:xfrm>
             <a:custGeom>
               <a:avLst/>
@@ -3997,7 +3997,7 @@
           <p:spPr>
             <a:xfrm>
               <a:off x="468000" y="1289160"/>
-              <a:ext cx="173520" cy="3026520"/>
+              <a:ext cx="173160" cy="3026160"/>
             </a:xfrm>
             <a:custGeom>
               <a:avLst/>
@@ -4096,7 +4096,7 @@
           <p:spPr>
             <a:xfrm>
               <a:off x="1111680" y="6571440"/>
-              <a:ext cx="133560" cy="280800"/>
+              <a:ext cx="133200" cy="280440"/>
             </a:xfrm>
             <a:custGeom>
               <a:avLst/>
@@ -4150,7 +4150,7 @@
           <p:spPr>
             <a:xfrm>
               <a:off x="502560" y="4107600"/>
-              <a:ext cx="81720" cy="510840"/>
+              <a:ext cx="81360" cy="510480"/>
             </a:xfrm>
             <a:custGeom>
               <a:avLst/>
@@ -4219,7 +4219,7 @@
           <p:spPr>
             <a:xfrm>
               <a:off x="973800" y="3145680"/>
-              <a:ext cx="1409400" cy="2716200"/>
+              <a:ext cx="1409040" cy="2715840"/>
             </a:xfrm>
             <a:custGeom>
               <a:avLst/>
@@ -4333,7 +4333,7 @@
           <p:spPr>
             <a:xfrm>
               <a:off x="1073520" y="6600240"/>
-              <a:ext cx="119880" cy="252360"/>
+              <a:ext cx="119520" cy="252000"/>
             </a:xfrm>
             <a:custGeom>
               <a:avLst/>
@@ -4387,7 +4387,7 @@
           <p:spPr>
             <a:xfrm>
               <a:off x="973800" y="5897160"/>
-              <a:ext cx="137160" cy="673560"/>
+              <a:ext cx="136800" cy="673200"/>
             </a:xfrm>
             <a:custGeom>
               <a:avLst/>
@@ -4461,7 +4461,7 @@
           <p:spPr>
             <a:xfrm>
               <a:off x="973800" y="5772600"/>
-              <a:ext cx="37440" cy="227160"/>
+              <a:ext cx="37080" cy="226800"/>
             </a:xfrm>
             <a:custGeom>
               <a:avLst/>
@@ -4530,7 +4530,7 @@
           <p:spPr>
             <a:xfrm>
               <a:off x="1006200" y="6322680"/>
-              <a:ext cx="209880" cy="529920"/>
+              <a:ext cx="209520" cy="529560"/>
             </a:xfrm>
             <a:custGeom>
               <a:avLst/>
@@ -4605,7 +4605,7 @@
         <p:spPr>
           <a:xfrm>
             <a:off x="0" y="0"/>
-            <a:ext cx="182160" cy="6857280"/>
+            <a:ext cx="181800" cy="6856920"/>
           </a:xfrm>
           <a:prstGeom prst="rect">
             <a:avLst/>
@@ -4646,7 +4646,7 @@
         <p:spPr>
           <a:xfrm>
             <a:off x="0" y="4323960"/>
-            <a:ext cx="1743840" cy="777960"/>
+            <a:ext cx="1743480" cy="777600"/>
           </a:xfrm>
           <a:custGeom>
             <a:avLst/>
@@ -4736,8 +4736,8 @@
         </p:nvSpPr>
         <p:spPr>
           <a:xfrm>
-            <a:off x="2593080" y="624240"/>
-            <a:ext cx="8911080" cy="1280160"/>
+            <a:off x="609480" y="273600"/>
+            <a:ext cx="10972080" cy="1144440"/>
           </a:xfrm>
           <a:prstGeom prst="rect">
             <a:avLst/>
@@ -4771,7 +4771,7 @@
         <p:spPr>
           <a:xfrm>
             <a:off x="609480" y="1604520"/>
-            <a:ext cx="10972440" cy="3977280"/>
+            <a:ext cx="10972080" cy="3976920"/>
           </a:xfrm>
           <a:prstGeom prst="rect">
             <a:avLst/>
@@ -4794,12 +4794,12 @@
               <a:buChar char=""/>
             </a:pPr>
             <a:r>
-              <a:rPr b="0" lang="en-ZA" sz="3200" spc="-1" strike="noStrike">
+              <a:rPr b="0" lang="en-ZA" sz="1800" spc="-1" strike="noStrike">
                 <a:latin typeface="Arial"/>
               </a:rPr>
               <a:t>Click to edit the outline text format</a:t>
             </a:r>
-            <a:endParaRPr b="0" lang="en-ZA" sz="3200" spc="-1" strike="noStrike">
+            <a:endParaRPr b="0" lang="en-ZA" sz="1800" spc="-1" strike="noStrike">
               <a:latin typeface="Arial"/>
             </a:endParaRPr>
           </a:p>
@@ -4816,12 +4816,12 @@
               <a:buChar char=""/>
             </a:pPr>
             <a:r>
-              <a:rPr b="0" lang="en-ZA" sz="2800" spc="-1" strike="noStrike">
+              <a:rPr b="0" lang="en-ZA" sz="1800" spc="-1" strike="noStrike">
                 <a:latin typeface="Arial"/>
               </a:rPr>
               <a:t>Second Outline Level</a:t>
             </a:r>
-            <a:endParaRPr b="0" lang="en-ZA" sz="2800" spc="-1" strike="noStrike">
+            <a:endParaRPr b="0" lang="en-ZA" sz="1800" spc="-1" strike="noStrike">
               <a:latin typeface="Arial"/>
             </a:endParaRPr>
           </a:p>
@@ -4838,12 +4838,12 @@
               <a:buChar char=""/>
             </a:pPr>
             <a:r>
-              <a:rPr b="0" lang="en-ZA" sz="2400" spc="-1" strike="noStrike">
+              <a:rPr b="0" lang="en-ZA" sz="1800" spc="-1" strike="noStrike">
                 <a:latin typeface="Arial"/>
               </a:rPr>
               <a:t>Third Outline Level</a:t>
             </a:r>
-            <a:endParaRPr b="0" lang="en-ZA" sz="2400" spc="-1" strike="noStrike">
+            <a:endParaRPr b="0" lang="en-ZA" sz="1800" spc="-1" strike="noStrike">
               <a:latin typeface="Arial"/>
             </a:endParaRPr>
           </a:p>
@@ -4860,12 +4860,12 @@
               <a:buChar char=""/>
             </a:pPr>
             <a:r>
-              <a:rPr b="0" lang="en-ZA" sz="2000" spc="-1" strike="noStrike">
+              <a:rPr b="0" lang="en-ZA" sz="1800" spc="-1" strike="noStrike">
                 <a:latin typeface="Arial"/>
               </a:rPr>
               <a:t>Fourth Outline Level</a:t>
             </a:r>
-            <a:endParaRPr b="0" lang="en-ZA" sz="2000" spc="-1" strike="noStrike">
+            <a:endParaRPr b="0" lang="en-ZA" sz="1800" spc="-1" strike="noStrike">
               <a:latin typeface="Arial"/>
             </a:endParaRPr>
           </a:p>
@@ -4882,12 +4882,12 @@
               <a:buChar char=""/>
             </a:pPr>
             <a:r>
-              <a:rPr b="0" lang="en-ZA" sz="2000" spc="-1" strike="noStrike">
+              <a:rPr b="0" lang="en-ZA" sz="1800" spc="-1" strike="noStrike">
                 <a:latin typeface="Arial"/>
               </a:rPr>
               <a:t>Fifth Outline Level</a:t>
             </a:r>
-            <a:endParaRPr b="0" lang="en-ZA" sz="2000" spc="-1" strike="noStrike">
+            <a:endParaRPr b="0" lang="en-ZA" sz="1800" spc="-1" strike="noStrike">
               <a:latin typeface="Arial"/>
             </a:endParaRPr>
           </a:p>
@@ -4904,12 +4904,12 @@
               <a:buChar char=""/>
             </a:pPr>
             <a:r>
-              <a:rPr b="0" lang="en-ZA" sz="2000" spc="-1" strike="noStrike">
+              <a:rPr b="0" lang="en-ZA" sz="1800" spc="-1" strike="noStrike">
                 <a:latin typeface="Arial"/>
               </a:rPr>
               <a:t>Sixth Outline Level</a:t>
             </a:r>
-            <a:endParaRPr b="0" lang="en-ZA" sz="2000" spc="-1" strike="noStrike">
+            <a:endParaRPr b="0" lang="en-ZA" sz="1800" spc="-1" strike="noStrike">
               <a:latin typeface="Arial"/>
             </a:endParaRPr>
           </a:p>
@@ -4926,12 +4926,12 @@
               <a:buChar char=""/>
             </a:pPr>
             <a:r>
-              <a:rPr b="0" lang="en-ZA" sz="2000" spc="-1" strike="noStrike">
+              <a:rPr b="0" lang="en-ZA" sz="1800" spc="-1" strike="noStrike">
                 <a:latin typeface="Arial"/>
               </a:rPr>
               <a:t>Seventh Outline Level</a:t>
             </a:r>
-            <a:endParaRPr b="0" lang="en-ZA" sz="2000" spc="-1" strike="noStrike">
+            <a:endParaRPr b="0" lang="en-ZA" sz="1800" spc="-1" strike="noStrike">
               <a:latin typeface="Arial"/>
             </a:endParaRPr>
           </a:p>
@@ -4983,9 +4983,9 @@
         <p:grpSpPr>
           <a:xfrm>
             <a:off x="0" y="228600"/>
-            <a:ext cx="2850840" cy="6638040"/>
+            <a:ext cx="2850480" cy="6637680"/>
             <a:chOff x="0" y="228600"/>
-            <a:chExt cx="2850840" cy="6638040"/>
+            <a:chExt cx="2850480" cy="6637680"/>
           </a:xfrm>
         </p:grpSpPr>
         <p:sp>
@@ -4997,7 +4997,7 @@
           <p:spPr>
             <a:xfrm>
               <a:off x="0" y="2575080"/>
-              <a:ext cx="100080" cy="625320"/>
+              <a:ext cx="99720" cy="624960"/>
             </a:xfrm>
             <a:custGeom>
               <a:avLst/>
@@ -5063,7 +5063,7 @@
           <p:spPr>
             <a:xfrm>
               <a:off x="128520" y="3156480"/>
-              <a:ext cx="645840" cy="2321640"/>
+              <a:ext cx="645480" cy="2321280"/>
             </a:xfrm>
             <a:custGeom>
               <a:avLst/>
@@ -5134,7 +5134,7 @@
           <p:spPr>
             <a:xfrm>
               <a:off x="807120" y="5447160"/>
-              <a:ext cx="608760" cy="1419480"/>
+              <a:ext cx="608400" cy="1419120"/>
             </a:xfrm>
             <a:custGeom>
               <a:avLst/>
@@ -5210,7 +5210,7 @@
           <p:spPr>
             <a:xfrm>
               <a:off x="959760" y="6503760"/>
-              <a:ext cx="170640" cy="362880"/>
+              <a:ext cx="170280" cy="362520"/>
             </a:xfrm>
             <a:custGeom>
               <a:avLst/>
@@ -5266,7 +5266,7 @@
           <p:spPr>
             <a:xfrm>
               <a:off x="100800" y="3201120"/>
-              <a:ext cx="821160" cy="3327840"/>
+              <a:ext cx="820800" cy="3327480"/>
             </a:xfrm>
             <a:custGeom>
               <a:avLst/>
@@ -5357,7 +5357,7 @@
           <p:spPr>
             <a:xfrm>
               <a:off x="22320" y="228600"/>
-              <a:ext cx="105480" cy="2927160"/>
+              <a:ext cx="105120" cy="2926800"/>
             </a:xfrm>
             <a:custGeom>
               <a:avLst/>
@@ -5443,7 +5443,7 @@
           <p:spPr>
             <a:xfrm>
               <a:off x="78120" y="2944080"/>
-              <a:ext cx="77400" cy="493200"/>
+              <a:ext cx="77040" cy="492840"/>
             </a:xfrm>
             <a:custGeom>
               <a:avLst/>
@@ -5509,7 +5509,7 @@
           <p:spPr>
             <a:xfrm>
               <a:off x="769680" y="5478840"/>
-              <a:ext cx="189360" cy="1024200"/>
+              <a:ext cx="189000" cy="1023840"/>
             </a:xfrm>
             <a:custGeom>
               <a:avLst/>
@@ -5595,7 +5595,7 @@
           <p:spPr>
             <a:xfrm>
               <a:off x="775440" y="1398960"/>
-              <a:ext cx="2075400" cy="4047480"/>
+              <a:ext cx="2075040" cy="4047120"/>
             </a:xfrm>
             <a:custGeom>
               <a:avLst/>
@@ -5716,7 +5716,7 @@
           <p:spPr>
             <a:xfrm>
               <a:off x="922680" y="6530040"/>
-              <a:ext cx="161280" cy="336600"/>
+              <a:ext cx="160920" cy="336240"/>
             </a:xfrm>
             <a:custGeom>
               <a:avLst/>
@@ -5772,7 +5772,7 @@
           <p:spPr>
             <a:xfrm>
               <a:off x="769680" y="5359320"/>
-              <a:ext cx="36720" cy="221040"/>
+              <a:ext cx="36360" cy="220680"/>
             </a:xfrm>
             <a:custGeom>
               <a:avLst/>
@@ -5838,7 +5838,7 @@
           <p:spPr>
             <a:xfrm>
               <a:off x="849960" y="6244560"/>
-              <a:ext cx="237960" cy="621720"/>
+              <a:ext cx="237600" cy="621360"/>
             </a:xfrm>
             <a:custGeom>
               <a:avLst/>
@@ -5915,9 +5915,9 @@
         <p:grpSpPr>
           <a:xfrm>
             <a:off x="27360" y="-720"/>
-            <a:ext cx="2355840" cy="6853320"/>
+            <a:ext cx="2355480" cy="6852960"/>
             <a:chOff x="27360" y="-720"/>
-            <a:chExt cx="2355840" cy="6853320"/>
+            <a:chExt cx="2355480" cy="6852960"/>
           </a:xfrm>
         </p:grpSpPr>
         <p:sp>
@@ -5929,7 +5929,7 @@
           <p:spPr>
             <a:xfrm>
               <a:off x="27360" y="-720"/>
-              <a:ext cx="493560" cy="4400280"/>
+              <a:ext cx="493200" cy="4399920"/>
             </a:xfrm>
             <a:custGeom>
               <a:avLst/>
@@ -6038,7 +6038,7 @@
           <p:spPr>
             <a:xfrm>
               <a:off x="550440" y="4316400"/>
-              <a:ext cx="422640" cy="1580040"/>
+              <a:ext cx="422280" cy="1579680"/>
             </a:xfrm>
             <a:custGeom>
               <a:avLst/>
@@ -6112,7 +6112,7 @@
           <p:spPr>
             <a:xfrm>
               <a:off x="1006200" y="5862600"/>
-              <a:ext cx="430200" cy="990000"/>
+              <a:ext cx="429840" cy="989640"/>
             </a:xfrm>
             <a:custGeom>
               <a:avLst/>
@@ -6186,7 +6186,7 @@
           <p:spPr>
             <a:xfrm>
               <a:off x="521640" y="4364280"/>
-              <a:ext cx="551160" cy="2235240"/>
+              <a:ext cx="550800" cy="2234880"/>
             </a:xfrm>
             <a:custGeom>
               <a:avLst/>
@@ -6275,7 +6275,7 @@
           <p:spPr>
             <a:xfrm>
               <a:off x="468000" y="1289160"/>
-              <a:ext cx="173520" cy="3026520"/>
+              <a:ext cx="173160" cy="3026160"/>
             </a:xfrm>
             <a:custGeom>
               <a:avLst/>
@@ -6374,7 +6374,7 @@
           <p:spPr>
             <a:xfrm>
               <a:off x="1111680" y="6571440"/>
-              <a:ext cx="133560" cy="280800"/>
+              <a:ext cx="133200" cy="280440"/>
             </a:xfrm>
             <a:custGeom>
               <a:avLst/>
@@ -6428,7 +6428,7 @@
           <p:spPr>
             <a:xfrm>
               <a:off x="502560" y="4107600"/>
-              <a:ext cx="81720" cy="510840"/>
+              <a:ext cx="81360" cy="510480"/>
             </a:xfrm>
             <a:custGeom>
               <a:avLst/>
@@ -6497,7 +6497,7 @@
           <p:spPr>
             <a:xfrm>
               <a:off x="973800" y="3145680"/>
-              <a:ext cx="1409400" cy="2716200"/>
+              <a:ext cx="1409040" cy="2715840"/>
             </a:xfrm>
             <a:custGeom>
               <a:avLst/>
@@ -6611,7 +6611,7 @@
           <p:spPr>
             <a:xfrm>
               <a:off x="1073520" y="6600240"/>
-              <a:ext cx="119880" cy="252360"/>
+              <a:ext cx="119520" cy="252000"/>
             </a:xfrm>
             <a:custGeom>
               <a:avLst/>
@@ -6665,7 +6665,7 @@
           <p:spPr>
             <a:xfrm>
               <a:off x="973800" y="5897160"/>
-              <a:ext cx="137160" cy="673560"/>
+              <a:ext cx="136800" cy="673200"/>
             </a:xfrm>
             <a:custGeom>
               <a:avLst/>
@@ -6739,7 +6739,7 @@
           <p:spPr>
             <a:xfrm>
               <a:off x="973800" y="5772600"/>
-              <a:ext cx="37440" cy="227160"/>
+              <a:ext cx="37080" cy="226800"/>
             </a:xfrm>
             <a:custGeom>
               <a:avLst/>
@@ -6808,7 +6808,7 @@
           <p:spPr>
             <a:xfrm>
               <a:off x="1006200" y="6322680"/>
-              <a:ext cx="209880" cy="529920"/>
+              <a:ext cx="209520" cy="529560"/>
             </a:xfrm>
             <a:custGeom>
               <a:avLst/>
@@ -6883,7 +6883,7 @@
         <p:spPr>
           <a:xfrm>
             <a:off x="0" y="0"/>
-            <a:ext cx="182160" cy="6857280"/>
+            <a:ext cx="181800" cy="6856920"/>
           </a:xfrm>
           <a:prstGeom prst="rect">
             <a:avLst/>
@@ -6923,8 +6923,8 @@
         </p:nvSpPr>
         <p:spPr>
           <a:xfrm flipV="1">
-            <a:off x="-4320" y="-299880"/>
-            <a:ext cx="1587960" cy="506520"/>
+            <a:off x="-4320" y="-806040"/>
+            <a:ext cx="1587600" cy="506160"/>
           </a:xfrm>
           <a:custGeom>
             <a:avLst/>
@@ -7262,7 +7262,7 @@
         <p:spPr>
           <a:xfrm>
             <a:off x="1627200" y="233640"/>
-            <a:ext cx="9143280" cy="2386800"/>
+            <a:ext cx="9142920" cy="2386440"/>
           </a:xfrm>
           <a:prstGeom prst="rect">
             <a:avLst/>
@@ -7292,6 +7292,7 @@
                   <a:srgbClr val="262626"/>
                 </a:solidFill>
                 <a:latin typeface="Century Gothic"/>
+                <a:ea typeface="DejaVu Sans"/>
               </a:rPr>
               <a:t> </a:t>
             </a:r>
@@ -7301,6 +7302,7 @@
                   <a:srgbClr val="262626"/>
                 </a:solidFill>
                 <a:latin typeface="Century Gothic"/>
+                <a:ea typeface="DejaVu Sans"/>
               </a:rPr>
               <a:t>Delivery Manager System </a:t>
             </a:r>
@@ -7319,7 +7321,7 @@
         <p:spPr>
           <a:xfrm>
             <a:off x="1627200" y="3496680"/>
-            <a:ext cx="6026760" cy="1654920"/>
+            <a:ext cx="6026400" cy="1654560"/>
           </a:xfrm>
           <a:prstGeom prst="rect">
             <a:avLst/>
@@ -7354,6 +7356,7 @@
                   <a:srgbClr val="595959"/>
                 </a:solidFill>
                 <a:latin typeface="Century Gothic"/>
+                <a:ea typeface="DejaVu Sans"/>
               </a:rPr>
               <a:t>Team Name: Colloid</a:t>
             </a:r>
@@ -7376,6 +7379,7 @@
                   <a:srgbClr val="595959"/>
                 </a:solidFill>
                 <a:latin typeface="Century Gothic"/>
+                <a:ea typeface="DejaVu Sans"/>
               </a:rPr>
               <a:t>Team Number: 43</a:t>
             </a:r>
@@ -7398,6 +7402,7 @@
                   <a:srgbClr val="595959"/>
                 </a:solidFill>
                 <a:latin typeface="Century Gothic"/>
+                <a:ea typeface="DejaVu Sans"/>
               </a:rPr>
               <a:t>Project Supervisor: Mr HJC van Der Westhuizen</a:t>
             </a:r>
@@ -7429,7 +7434,7 @@
         <p:spPr>
           <a:xfrm>
             <a:off x="7186320" y="3496680"/>
-            <a:ext cx="4161240" cy="1654920"/>
+            <a:ext cx="4160880" cy="1654560"/>
           </a:xfrm>
           <a:prstGeom prst="rect">
             <a:avLst/>
@@ -7489,7 +7494,7 @@
                 <a:latin typeface="Century Gothic"/>
                 <a:ea typeface="DejaVu Sans"/>
               </a:rPr>
-              <a:t>Mavuso Mmeli 216016565</a:t>
+              <a:t>Mavuso Mmeli </a:t>
             </a:r>
             <a:endParaRPr b="0" lang="en-ZA" sz="2400" spc="-1" strike="noStrike">
               <a:latin typeface="Arial"/>
@@ -7512,7 +7517,7 @@
                 <a:latin typeface="Century Gothic"/>
                 <a:ea typeface="DejaVu Sans"/>
               </a:rPr>
-              <a:t>Morudu Khanyisile 216090091</a:t>
+              <a:t>216016565</a:t>
             </a:r>
             <a:endParaRPr b="0" lang="en-ZA" sz="2400" spc="-1" strike="noStrike">
               <a:latin typeface="Arial"/>
@@ -7535,7 +7540,7 @@
                 <a:latin typeface="Century Gothic"/>
                 <a:ea typeface="DejaVu Sans"/>
               </a:rPr>
-              <a:t>Motuba Prince 201302881</a:t>
+              <a:t>Morudu Khanyisile </a:t>
             </a:r>
             <a:endParaRPr b="0" lang="en-ZA" sz="2400" spc="-1" strike="noStrike">
               <a:latin typeface="Arial"/>
@@ -7558,7 +7563,7 @@
                 <a:latin typeface="Century Gothic"/>
                 <a:ea typeface="DejaVu Sans"/>
               </a:rPr>
-              <a:t>Taliwe Thina 216009615</a:t>
+              <a:t>216090091</a:t>
             </a:r>
             <a:endParaRPr b="0" lang="en-ZA" sz="2400" spc="-1" strike="noStrike">
               <a:latin typeface="Arial"/>
@@ -7637,7 +7642,7 @@
         <p:spPr>
           <a:xfrm>
             <a:off x="2593080" y="624240"/>
-            <a:ext cx="8911080" cy="1280160"/>
+            <a:ext cx="8910720" cy="1279800"/>
           </a:xfrm>
           <a:prstGeom prst="rect">
             <a:avLst/>
@@ -7667,6 +7672,7 @@
                   <a:srgbClr val="262626"/>
                 </a:solidFill>
                 <a:latin typeface="Century Gothic"/>
+                <a:ea typeface="DejaVu Sans"/>
               </a:rPr>
               <a:t>Problem</a:t>
             </a:r>
@@ -7685,7 +7691,7 @@
         <p:spPr>
           <a:xfrm>
             <a:off x="2589120" y="1721520"/>
-            <a:ext cx="8914680" cy="3776760"/>
+            <a:ext cx="8914320" cy="3776400"/>
           </a:xfrm>
           <a:prstGeom prst="rect">
             <a:avLst/>
@@ -7704,7 +7710,7 @@
         <p:txBody>
           <a:bodyPr lIns="90000" rIns="90000" tIns="45000" bIns="45000"/>
           <a:p>
-            <a:pPr marL="343080" indent="-342360">
+            <a:pPr marL="343080" indent="-342000">
               <a:lnSpc>
                 <a:spcPct val="100000"/>
               </a:lnSpc>
@@ -7723,6 +7729,7 @@
                   <a:srgbClr val="404040"/>
                 </a:solidFill>
                 <a:latin typeface="Century Gothic"/>
+                <a:ea typeface="DejaVu Sans"/>
               </a:rPr>
               <a:t>New Era Commerce</a:t>
             </a:r>
@@ -7731,7 +7738,7 @@
             </a:endParaRPr>
           </a:p>
           <a:p>
-            <a:pPr marL="343080" indent="-342360">
+            <a:pPr marL="343080" indent="-342000">
               <a:lnSpc>
                 <a:spcPct val="100000"/>
               </a:lnSpc>
@@ -7750,6 +7757,7 @@
                   <a:srgbClr val="404040"/>
                 </a:solidFill>
                 <a:latin typeface="Century Gothic"/>
+                <a:ea typeface="DejaVu Sans"/>
               </a:rPr>
               <a:t>Problem with current system</a:t>
             </a:r>
@@ -7758,7 +7766,7 @@
             </a:endParaRPr>
           </a:p>
           <a:p>
-            <a:pPr lvl="1" marL="743040" indent="-285120">
+            <a:pPr lvl="1" marL="743040" indent="-284760">
               <a:lnSpc>
                 <a:spcPct val="100000"/>
               </a:lnSpc>
@@ -7777,6 +7785,7 @@
                   <a:srgbClr val="404040"/>
                 </a:solidFill>
                 <a:latin typeface="Century Gothic"/>
+                <a:ea typeface="DejaVu Sans"/>
               </a:rPr>
               <a:t>Assignment allocation</a:t>
             </a:r>
@@ -7785,7 +7794,7 @@
             </a:endParaRPr>
           </a:p>
           <a:p>
-            <a:pPr lvl="1" marL="743040" indent="-285120">
+            <a:pPr lvl="1" marL="743040" indent="-284760">
               <a:lnSpc>
                 <a:spcPct val="100000"/>
               </a:lnSpc>
@@ -7804,6 +7813,7 @@
                   <a:srgbClr val="404040"/>
                 </a:solidFill>
                 <a:latin typeface="Century Gothic"/>
+                <a:ea typeface="DejaVu Sans"/>
               </a:rPr>
               <a:t>Different truck, different system</a:t>
             </a:r>
@@ -7812,7 +7822,7 @@
             </a:endParaRPr>
           </a:p>
           <a:p>
-            <a:pPr lvl="2" marL="1143000" indent="-227880">
+            <a:pPr lvl="2" marL="1143000" indent="-227520">
               <a:lnSpc>
                 <a:spcPct val="100000"/>
               </a:lnSpc>
@@ -7831,6 +7841,7 @@
                   <a:srgbClr val="404040"/>
                 </a:solidFill>
                 <a:latin typeface="Century Gothic"/>
+                <a:ea typeface="DejaVu Sans"/>
               </a:rPr>
               <a:t>DynaFleet for Volvo</a:t>
             </a:r>
@@ -7839,7 +7850,7 @@
             </a:endParaRPr>
           </a:p>
           <a:p>
-            <a:pPr lvl="2" marL="1143000" indent="-227880">
+            <a:pPr lvl="2" marL="1143000" indent="-227520">
               <a:lnSpc>
                 <a:spcPct val="100000"/>
               </a:lnSpc>
@@ -7858,6 +7869,7 @@
                   <a:srgbClr val="404040"/>
                 </a:solidFill>
                 <a:latin typeface="Century Gothic"/>
+                <a:ea typeface="DejaVu Sans"/>
               </a:rPr>
               <a:t>CarTrack for other trucks </a:t>
             </a:r>
@@ -7866,7 +7878,7 @@
             </a:endParaRPr>
           </a:p>
           <a:p>
-            <a:pPr lvl="1" marL="743040" indent="-285120">
+            <a:pPr lvl="1" marL="743040" indent="-284760">
               <a:lnSpc>
                 <a:spcPct val="100000"/>
               </a:lnSpc>
@@ -7885,6 +7897,7 @@
                   <a:srgbClr val="404040"/>
                 </a:solidFill>
                 <a:latin typeface="Century Gothic"/>
+                <a:ea typeface="DejaVu Sans"/>
               </a:rPr>
               <a:t>Start and end time for trips not available</a:t>
             </a:r>
@@ -7893,7 +7906,7 @@
             </a:endParaRPr>
           </a:p>
           <a:p>
-            <a:pPr lvl="1" marL="743040" indent="-285120">
+            <a:pPr lvl="1" marL="743040" indent="-284760">
               <a:lnSpc>
                 <a:spcPct val="100000"/>
               </a:lnSpc>
@@ -7912,8 +7925,9 @@
                   <a:srgbClr val="404040"/>
                 </a:solidFill>
                 <a:latin typeface="Century Gothic"/>
+                <a:ea typeface="DejaVu Sans"/>
               </a:rPr>
-              <a:t>No details of current delivery</a:t>
+              <a:t>Monitoring of previous deliveries is difficult</a:t>
             </a:r>
             <a:endParaRPr b="0" lang="en-ZA" sz="1600" spc="-1" strike="noStrike">
               <a:latin typeface="Arial"/>
@@ -7944,7 +7958,7 @@
         <p:spPr>
           <a:xfrm>
             <a:off x="7776000" y="1917720"/>
-            <a:ext cx="3176640" cy="2113920"/>
+            <a:ext cx="3176280" cy="2113560"/>
           </a:xfrm>
           <a:prstGeom prst="rect">
             <a:avLst/>
@@ -8012,7 +8026,7 @@
         <p:spPr>
           <a:xfrm>
             <a:off x="2593080" y="624240"/>
-            <a:ext cx="8911080" cy="1280160"/>
+            <a:ext cx="8910720" cy="1279800"/>
           </a:xfrm>
           <a:prstGeom prst="rect">
             <a:avLst/>
@@ -8042,6 +8056,7 @@
                   <a:srgbClr val="262626"/>
                 </a:solidFill>
                 <a:latin typeface="Century Gothic"/>
+                <a:ea typeface="DejaVu Sans"/>
               </a:rPr>
               <a:t>Solution Statement: Delivery Manager System</a:t>
             </a:r>
@@ -8060,7 +8075,7 @@
         <p:spPr>
           <a:xfrm>
             <a:off x="2589120" y="2133720"/>
-            <a:ext cx="8914680" cy="3776760"/>
+            <a:ext cx="8914320" cy="3776400"/>
           </a:xfrm>
           <a:prstGeom prst="rect">
             <a:avLst/>
@@ -8079,7 +8094,7 @@
         <p:txBody>
           <a:bodyPr lIns="90000" rIns="90000" tIns="45000" bIns="45000"/>
           <a:p>
-            <a:pPr marL="343080" indent="-342360">
+            <a:pPr marL="343080" indent="-342000">
               <a:lnSpc>
                 <a:spcPct val="100000"/>
               </a:lnSpc>
@@ -8098,6 +8113,7 @@
                   <a:srgbClr val="404040"/>
                 </a:solidFill>
                 <a:latin typeface="Century Gothic"/>
+                <a:ea typeface="DejaVu Sans"/>
               </a:rPr>
               <a:t>What it is?</a:t>
             </a:r>
@@ -8106,7 +8122,7 @@
             </a:endParaRPr>
           </a:p>
           <a:p>
-            <a:pPr lvl="1" marL="743040" indent="-285120">
+            <a:pPr lvl="1" marL="743040" indent="-284760">
               <a:lnSpc>
                 <a:spcPct val="100000"/>
               </a:lnSpc>
@@ -8125,6 +8141,7 @@
                   <a:srgbClr val="404040"/>
                 </a:solidFill>
                 <a:latin typeface="Century Gothic"/>
+                <a:ea typeface="DejaVu Sans"/>
               </a:rPr>
               <a:t>Consists of:</a:t>
             </a:r>
@@ -8133,7 +8150,7 @@
             </a:endParaRPr>
           </a:p>
           <a:p>
-            <a:pPr lvl="2" marL="1143000" indent="-227880">
+            <a:pPr lvl="2" marL="1143000" indent="-227520">
               <a:lnSpc>
                 <a:spcPct val="100000"/>
               </a:lnSpc>
@@ -8152,6 +8169,7 @@
                   <a:srgbClr val="404040"/>
                 </a:solidFill>
                 <a:latin typeface="Century Gothic"/>
+                <a:ea typeface="DejaVu Sans"/>
               </a:rPr>
               <a:t>Web based system for office personnel </a:t>
             </a:r>
@@ -8160,7 +8178,7 @@
             </a:endParaRPr>
           </a:p>
           <a:p>
-            <a:pPr lvl="6" marL="1512000" indent="-216000">
+            <a:pPr lvl="6" marL="1512000" indent="-215640">
               <a:lnSpc>
                 <a:spcPct val="100000"/>
               </a:lnSpc>
@@ -8180,6 +8198,7 @@
                   <a:srgbClr val="404040"/>
                 </a:solidFill>
                 <a:latin typeface="Century Gothic"/>
+                <a:ea typeface="DejaVu Sans"/>
               </a:rPr>
               <a:t>Create deliveries</a:t>
             </a:r>
@@ -8188,7 +8207,7 @@
             </a:endParaRPr>
           </a:p>
           <a:p>
-            <a:pPr lvl="6" marL="1512000" indent="-216000">
+            <a:pPr lvl="6" marL="1512000" indent="-215640">
               <a:lnSpc>
                 <a:spcPct val="100000"/>
               </a:lnSpc>
@@ -8208,6 +8227,7 @@
                   <a:srgbClr val="404040"/>
                 </a:solidFill>
                 <a:latin typeface="Century Gothic"/>
+                <a:ea typeface="DejaVu Sans"/>
               </a:rPr>
               <a:t>Assign drivers to deliveries</a:t>
             </a:r>
@@ -8216,7 +8236,7 @@
             </a:endParaRPr>
           </a:p>
           <a:p>
-            <a:pPr lvl="6" marL="1512000" indent="-216000">
+            <a:pPr lvl="6" marL="1512000" indent="-215640">
               <a:lnSpc>
                 <a:spcPct val="100000"/>
               </a:lnSpc>
@@ -8236,6 +8256,7 @@
                   <a:srgbClr val="404040"/>
                 </a:solidFill>
                 <a:latin typeface="Century Gothic"/>
+                <a:ea typeface="DejaVu Sans"/>
               </a:rPr>
               <a:t>View start and end time of delivery</a:t>
             </a:r>
@@ -8244,7 +8265,7 @@
             </a:endParaRPr>
           </a:p>
           <a:p>
-            <a:pPr lvl="6" marL="1512000" indent="-216000">
+            <a:pPr lvl="6" marL="1512000" indent="-215640">
               <a:lnSpc>
                 <a:spcPct val="100000"/>
               </a:lnSpc>
@@ -8264,6 +8285,7 @@
                   <a:srgbClr val="404040"/>
                 </a:solidFill>
                 <a:latin typeface="Century Gothic"/>
+                <a:ea typeface="DejaVu Sans"/>
               </a:rPr>
               <a:t>Track driver location during delivery</a:t>
             </a:r>
@@ -8272,7 +8294,7 @@
             </a:endParaRPr>
           </a:p>
           <a:p>
-            <a:pPr lvl="6" marL="1512000" indent="-216000">
+            <a:pPr lvl="6" marL="1512000" indent="-215640">
               <a:lnSpc>
                 <a:spcPct val="100000"/>
               </a:lnSpc>
@@ -8292,15 +8314,16 @@
                   <a:srgbClr val="404040"/>
                 </a:solidFill>
                 <a:latin typeface="Century Gothic"/>
+                <a:ea typeface="DejaVu Sans"/>
               </a:rPr>
-              <a:t>View details of the current delivery</a:t>
+              <a:t>View details of the previous delivery</a:t>
             </a:r>
             <a:endParaRPr b="0" lang="en-ZA" sz="1400" spc="-1" strike="noStrike">
               <a:latin typeface="Arial"/>
             </a:endParaRPr>
           </a:p>
           <a:p>
-            <a:pPr lvl="2" marL="1143000" indent="-227880">
+            <a:pPr lvl="2" marL="1143000" indent="-227520">
               <a:lnSpc>
                 <a:spcPct val="100000"/>
               </a:lnSpc>
@@ -8319,6 +8342,7 @@
                   <a:srgbClr val="404040"/>
                 </a:solidFill>
                 <a:latin typeface="Century Gothic"/>
+                <a:ea typeface="DejaVu Sans"/>
               </a:rPr>
               <a:t>Mobile application for drivers </a:t>
             </a:r>
@@ -8327,7 +8351,7 @@
             </a:endParaRPr>
           </a:p>
           <a:p>
-            <a:pPr lvl="6" marL="1512000" indent="-216000">
+            <a:pPr lvl="6" marL="1512000" indent="-215640">
               <a:lnSpc>
                 <a:spcPct val="100000"/>
               </a:lnSpc>
@@ -8347,6 +8371,7 @@
                   <a:srgbClr val="404040"/>
                 </a:solidFill>
                 <a:latin typeface="Century Gothic"/>
+                <a:ea typeface="DejaVu Sans"/>
               </a:rPr>
               <a:t>Receive delivery information</a:t>
             </a:r>
@@ -8355,7 +8380,7 @@
             </a:endParaRPr>
           </a:p>
           <a:p>
-            <a:pPr lvl="6" marL="1512000" indent="-216000">
+            <a:pPr lvl="6" marL="1512000" indent="-215640">
               <a:lnSpc>
                 <a:spcPct val="100000"/>
               </a:lnSpc>
@@ -8375,6 +8400,7 @@
                   <a:srgbClr val="404040"/>
                 </a:solidFill>
                 <a:latin typeface="Century Gothic"/>
+                <a:ea typeface="DejaVu Sans"/>
               </a:rPr>
               <a:t>Start and end trips</a:t>
             </a:r>

</xml_diff>